<commit_message>
Fix binary search currency conversion in Analytics and Dashboard
</commit_message>
<xml_diff>
--- a/documents/Zira - Presentation.pptx
+++ b/documents/Zira - Presentation.pptx
@@ -5,32 +5,33 @@
     <p:sldMasterId id="2147483660" r:id="rId1"/>
   </p:sldMasterIdLst>
   <p:notesMasterIdLst>
-    <p:notesMasterId r:id="rId8"/>
+    <p:notesMasterId r:id="rId9"/>
   </p:notesMasterIdLst>
   <p:sldIdLst>
     <p:sldId id="256" r:id="rId2"/>
     <p:sldId id="290" r:id="rId3"/>
     <p:sldId id="272" r:id="rId4"/>
-    <p:sldId id="293" r:id="rId5"/>
-    <p:sldId id="292" r:id="rId6"/>
-    <p:sldId id="291" r:id="rId7"/>
+    <p:sldId id="294" r:id="rId5"/>
+    <p:sldId id="293" r:id="rId6"/>
+    <p:sldId id="292" r:id="rId7"/>
+    <p:sldId id="291" r:id="rId8"/>
   </p:sldIdLst>
   <p:sldSz cx="9144000" cy="5143500" type="screen16x9"/>
   <p:notesSz cx="6858000" cy="9144000"/>
   <p:embeddedFontLst>
     <p:embeddedFont>
       <p:font typeface="Fira Sans" panose="020B0604020202020204" charset="0"/>
-      <p:regular r:id="rId9"/>
-      <p:bold r:id="rId10"/>
-      <p:italic r:id="rId11"/>
-      <p:boldItalic r:id="rId12"/>
+      <p:regular r:id="rId10"/>
+      <p:bold r:id="rId11"/>
+      <p:italic r:id="rId12"/>
+      <p:boldItalic r:id="rId13"/>
     </p:embeddedFont>
     <p:embeddedFont>
       <p:font typeface="Montserrat" panose="00000500000000000000" pitchFamily="2" charset="-52"/>
-      <p:regular r:id="rId13"/>
-      <p:bold r:id="rId14"/>
-      <p:italic r:id="rId15"/>
-      <p:boldItalic r:id="rId16"/>
+      <p:regular r:id="rId14"/>
+      <p:bold r:id="rId15"/>
+      <p:italic r:id="rId16"/>
+      <p:boldItalic r:id="rId17"/>
     </p:embeddedFont>
   </p:embeddedFontLst>
   <p:defaultTextStyle>
@@ -948,6 +949,115 @@
         </p:txBody>
       </p:sp>
     </p:spTree>
+  </p:cSld>
+  <p:clrMapOvr>
+    <a:masterClrMapping/>
+  </p:clrMapOvr>
+</p:notes>
+</file>
+
+<file path=ppt/notesSlides/notesSlide3.xml><?xml version="1.0" encoding="utf-8"?>
+<p:notes xmlns:a="http://schemas.openxmlformats.org/drawingml/2006/main" xmlns:r="http://schemas.openxmlformats.org/officeDocument/2006/relationships" xmlns:p="http://schemas.openxmlformats.org/presentationml/2006/main" showMasterSp="0" showMasterPhAnim="0">
+  <p:cSld>
+    <p:spTree>
+      <p:nvGrpSpPr>
+        <p:cNvPr id="1" name="Shape 911"/>
+        <p:cNvGrpSpPr/>
+        <p:nvPr/>
+      </p:nvGrpSpPr>
+      <p:grpSpPr>
+        <a:xfrm>
+          <a:off x="0" y="0"/>
+          <a:ext cx="0" cy="0"/>
+          <a:chOff x="0" y="0"/>
+          <a:chExt cx="0" cy="0"/>
+        </a:xfrm>
+      </p:grpSpPr>
+      <p:sp>
+        <p:nvSpPr>
+          <p:cNvPr id="912" name="Google Shape;912;g92701b84aa_0_221:notes"/>
+          <p:cNvSpPr>
+            <a:spLocks noGrp="1" noRot="1" noChangeAspect="1"/>
+          </p:cNvSpPr>
+          <p:nvPr>
+            <p:ph type="sldImg" idx="2"/>
+          </p:nvPr>
+        </p:nvSpPr>
+        <p:spPr>
+          <a:xfrm>
+            <a:off x="381000" y="685800"/>
+            <a:ext cx="6096000" cy="3429000"/>
+          </a:xfrm>
+          <a:custGeom>
+            <a:avLst/>
+            <a:gdLst/>
+            <a:ahLst/>
+            <a:cxnLst/>
+            <a:rect l="l" t="t" r="r" b="b"/>
+            <a:pathLst>
+              <a:path w="120000" h="120000" extrusionOk="0">
+                <a:moveTo>
+                  <a:pt x="0" y="0"/>
+                </a:moveTo>
+                <a:lnTo>
+                  <a:pt x="120000" y="0"/>
+                </a:lnTo>
+                <a:lnTo>
+                  <a:pt x="120000" y="120000"/>
+                </a:lnTo>
+                <a:lnTo>
+                  <a:pt x="0" y="120000"/>
+                </a:lnTo>
+                <a:close/>
+              </a:path>
+            </a:pathLst>
+          </a:custGeom>
+        </p:spPr>
+      </p:sp>
+      <p:sp>
+        <p:nvSpPr>
+          <p:cNvPr id="913" name="Google Shape;913;g92701b84aa_0_221:notes"/>
+          <p:cNvSpPr txBox="1">
+            <a:spLocks noGrp="1"/>
+          </p:cNvSpPr>
+          <p:nvPr>
+            <p:ph type="body" idx="1"/>
+          </p:nvPr>
+        </p:nvSpPr>
+        <p:spPr>
+          <a:xfrm>
+            <a:off x="685800" y="4343400"/>
+            <a:ext cx="5486400" cy="4114800"/>
+          </a:xfrm>
+          <a:prstGeom prst="rect">
+            <a:avLst/>
+          </a:prstGeom>
+        </p:spPr>
+        <p:txBody>
+          <a:bodyPr spcFirstLastPara="1" wrap="square" lIns="91425" tIns="91425" rIns="91425" bIns="91425" anchor="t" anchorCtr="0">
+            <a:noAutofit/>
+          </a:bodyPr>
+          <a:lstStyle/>
+          <a:p>
+            <a:pPr marL="0" lvl="0" indent="0" algn="l" rtl="0">
+              <a:spcBef>
+                <a:spcPts val="0"/>
+              </a:spcBef>
+              <a:spcAft>
+                <a:spcPts val="0"/>
+              </a:spcAft>
+              <a:buNone/>
+            </a:pPr>
+            <a:endParaRPr/>
+          </a:p>
+        </p:txBody>
+      </p:sp>
+    </p:spTree>
+    <p:extLst>
+      <p:ext uri="{BB962C8B-B14F-4D97-AF65-F5344CB8AC3E}">
+        <p14:creationId xmlns:p14="http://schemas.microsoft.com/office/powerpoint/2010/main" val="135952408"/>
+      </p:ext>
+    </p:extLst>
   </p:cSld>
   <p:clrMapOvr>
     <a:masterClrMapping/>
@@ -5754,7 +5864,7 @@
               <a:buNone/>
             </a:pPr>
             <a:r>
-              <a:rPr lang="en" sz="2000" b="1">
+              <a:rPr lang="en" sz="2000" b="1" dirty="0">
                 <a:solidFill>
                   <a:srgbClr val="4B85CF"/>
                 </a:solidFill>
@@ -5763,9 +5873,33 @@
                 <a:cs typeface="Fira Sans"/>
                 <a:sym typeface="Fira Sans"/>
               </a:rPr>
-              <a:t>10%</a:t>
+              <a:t>2</a:t>
             </a:r>
-            <a:endParaRPr sz="2000" b="1">
+            <a:r>
+              <a:rPr lang="en" sz="2000" b="1" dirty="0" smtClean="0">
+                <a:solidFill>
+                  <a:srgbClr val="4B85CF"/>
+                </a:solidFill>
+                <a:latin typeface="Fira Sans"/>
+                <a:ea typeface="Fira Sans"/>
+                <a:cs typeface="Fira Sans"/>
+                <a:sym typeface="Fira Sans"/>
+              </a:rPr>
+              <a:t>0</a:t>
+            </a:r>
+            <a:r>
+              <a:rPr lang="en" sz="2000" b="1" dirty="0">
+                <a:solidFill>
+                  <a:srgbClr val="4B85CF"/>
+                </a:solidFill>
+                <a:latin typeface="Fira Sans"/>
+                <a:ea typeface="Fira Sans"/>
+                <a:cs typeface="Fira Sans"/>
+                <a:sym typeface="Fira Sans"/>
+              </a:rPr>
+              <a:t>%</a:t>
+            </a:r>
+            <a:endParaRPr sz="2000" b="1" dirty="0">
               <a:solidFill>
                 <a:srgbClr val="4B85CF"/>
               </a:solidFill>
@@ -6360,6 +6494,13 @@
   <p:clrMapOvr>
     <a:masterClrMapping/>
   </p:clrMapOvr>
+  <p:timing>
+    <p:tnLst>
+      <p:par>
+        <p:cTn id="1" dur="indefinite" restart="never" nodeType="tmRoot"/>
+      </p:par>
+    </p:tnLst>
+  </p:timing>
 </p:sld>
 </file>
 
@@ -6482,7 +6623,16 @@
                 </a:solidFill>
                 <a:latin typeface="Montserrat" panose="00000500000000000000" pitchFamily="2" charset="-52"/>
               </a:rPr>
-              <a:t>Java </a:t>
+              <a:t>C#/Java</a:t>
+            </a:r>
+            <a:r>
+              <a:rPr lang="en-GB" sz="1600" dirty="0" smtClean="0">
+                <a:solidFill>
+                  <a:schemeClr val="tx1"/>
+                </a:solidFill>
+                <a:latin typeface="Montserrat" panose="00000500000000000000" pitchFamily="2" charset="-52"/>
+              </a:rPr>
+              <a:t> </a:t>
             </a:r>
             <a:r>
               <a:rPr lang="bg-BG" sz="1600" dirty="0" smtClean="0">
@@ -6558,7 +6708,7 @@
           </p:cNvPicPr>
           <p:nvPr/>
         </p:nvPicPr>
-        <p:blipFill>
+        <p:blipFill rotWithShape="1">
           <a:blip r:embed="rId2">
             <a:extLst>
               <a:ext uri="{28A0092B-C50C-407E-A947-70E740481C1C}">
@@ -6566,13 +6716,12 @@
               </a:ext>
             </a:extLst>
           </a:blip>
-          <a:stretch>
-            <a:fillRect/>
-          </a:stretch>
+          <a:srcRect l="771" t="3438" r="-771" b="-3438"/>
+          <a:stretch/>
         </p:blipFill>
         <p:spPr>
           <a:xfrm>
-            <a:off x="5668569" y="749940"/>
+            <a:off x="5688304" y="874930"/>
             <a:ext cx="2560563" cy="3636000"/>
           </a:xfrm>
           <a:prstGeom prst="rect">
@@ -6600,6 +6749,13 @@
   <p:clrMapOvr>
     <a:masterClrMapping/>
   </p:clrMapOvr>
+  <p:timing>
+    <p:tnLst>
+      <p:par>
+        <p:cTn id="1" dur="indefinite" restart="never" nodeType="tmRoot"/>
+      </p:par>
+    </p:tnLst>
+  </p:timing>
 </p:sld>
 </file>
 
@@ -9942,10 +10098,10 @@
         </p:nvGrpSpPr>
         <p:grpSpPr>
           <a:xfrm>
-            <a:off x="6605537" y="1857852"/>
-            <a:ext cx="2079900" cy="1313514"/>
-            <a:chOff x="6605537" y="1942824"/>
-            <a:chExt cx="2079900" cy="1313514"/>
+            <a:off x="6605537" y="1658763"/>
+            <a:ext cx="2079900" cy="1512603"/>
+            <a:chOff x="6605537" y="1743735"/>
+            <a:chExt cx="2079900" cy="1512603"/>
           </a:xfrm>
         </p:grpSpPr>
         <p:sp>
@@ -9956,7 +10112,7 @@
           </p:nvSpPr>
           <p:spPr>
             <a:xfrm>
-              <a:off x="7207775" y="1942824"/>
+              <a:off x="7198199" y="1743735"/>
               <a:ext cx="879370" cy="969523"/>
             </a:xfrm>
             <a:custGeom>
@@ -10211,9 +10367,9 @@
           </p:nvGrpSpPr>
           <p:grpSpPr>
             <a:xfrm>
-              <a:off x="7464798" y="2282688"/>
+              <a:off x="7464798" y="2103862"/>
               <a:ext cx="365344" cy="289753"/>
-              <a:chOff x="-62882850" y="1999375"/>
+              <a:chOff x="-62882850" y="1844774"/>
               <a:chExt cx="315850" cy="250500"/>
             </a:xfrm>
           </p:grpSpPr>
@@ -10225,7 +10381,7 @@
             </p:nvSpPr>
             <p:spPr>
               <a:xfrm>
-                <a:off x="-62882850" y="1999375"/>
+                <a:off x="-62882850" y="1844774"/>
                 <a:ext cx="315850" cy="250500"/>
               </a:xfrm>
               <a:custGeom>
@@ -10379,7 +10535,7 @@
             </p:nvSpPr>
             <p:spPr>
               <a:xfrm>
-                <a:off x="-62806475" y="2062375"/>
+                <a:off x="-62806475" y="1907774"/>
                 <a:ext cx="146525" cy="103800"/>
               </a:xfrm>
               <a:custGeom>
@@ -10746,6 +10902,4144 @@
 <file path=ppt/slides/slide4.xml><?xml version="1.0" encoding="utf-8"?>
 <p:sld xmlns:a="http://schemas.openxmlformats.org/drawingml/2006/main" xmlns:r="http://schemas.openxmlformats.org/officeDocument/2006/relationships" xmlns:p="http://schemas.openxmlformats.org/presentationml/2006/main">
   <p:cSld>
+    <p:bg>
+      <p:bgPr>
+        <a:solidFill>
+          <a:schemeClr val="lt1"/>
+        </a:solidFill>
+        <a:effectLst/>
+      </p:bgPr>
+    </p:bg>
+    <p:spTree>
+      <p:nvGrpSpPr>
+        <p:cNvPr id="1" name="Shape 914"/>
+        <p:cNvGrpSpPr/>
+        <p:nvPr/>
+      </p:nvGrpSpPr>
+      <p:grpSpPr>
+        <a:xfrm>
+          <a:off x="0" y="0"/>
+          <a:ext cx="0" cy="0"/>
+          <a:chOff x="0" y="0"/>
+          <a:chExt cx="0" cy="0"/>
+        </a:xfrm>
+      </p:grpSpPr>
+      <p:sp>
+        <p:nvSpPr>
+          <p:cNvPr id="915" name="Google Shape;915;p31"/>
+          <p:cNvSpPr/>
+          <p:nvPr/>
+        </p:nvSpPr>
+        <p:spPr>
+          <a:xfrm>
+            <a:off x="4059588" y="982449"/>
+            <a:ext cx="879370" cy="969523"/>
+          </a:xfrm>
+          <a:custGeom>
+            <a:avLst/>
+            <a:gdLst/>
+            <a:ahLst/>
+            <a:cxnLst/>
+            <a:rect l="l" t="t" r="r" b="b"/>
+            <a:pathLst>
+              <a:path w="28630" h="31560" extrusionOk="0">
+                <a:moveTo>
+                  <a:pt x="11895" y="635"/>
+                </a:moveTo>
+                <a:lnTo>
+                  <a:pt x="2215" y="6368"/>
+                </a:lnTo>
+                <a:lnTo>
+                  <a:pt x="1965" y="6520"/>
+                </a:lnTo>
+                <a:lnTo>
+                  <a:pt x="1501" y="6886"/>
+                </a:lnTo>
+                <a:lnTo>
+                  <a:pt x="1090" y="7305"/>
+                </a:lnTo>
+                <a:lnTo>
+                  <a:pt x="741" y="7770"/>
+                </a:lnTo>
+                <a:lnTo>
+                  <a:pt x="456" y="8270"/>
+                </a:lnTo>
+                <a:lnTo>
+                  <a:pt x="232" y="8815"/>
+                </a:lnTo>
+                <a:lnTo>
+                  <a:pt x="81" y="9377"/>
+                </a:lnTo>
+                <a:lnTo>
+                  <a:pt x="0" y="9958"/>
+                </a:lnTo>
+                <a:lnTo>
+                  <a:pt x="0" y="10261"/>
+                </a:lnTo>
+                <a:lnTo>
+                  <a:pt x="0" y="10261"/>
+                </a:lnTo>
+                <a:lnTo>
+                  <a:pt x="0" y="21477"/>
+                </a:lnTo>
+                <a:lnTo>
+                  <a:pt x="0" y="21781"/>
+                </a:lnTo>
+                <a:lnTo>
+                  <a:pt x="81" y="22370"/>
+                </a:lnTo>
+                <a:lnTo>
+                  <a:pt x="241" y="22942"/>
+                </a:lnTo>
+                <a:lnTo>
+                  <a:pt x="465" y="23486"/>
+                </a:lnTo>
+                <a:lnTo>
+                  <a:pt x="759" y="23995"/>
+                </a:lnTo>
+                <a:lnTo>
+                  <a:pt x="1117" y="24460"/>
+                </a:lnTo>
+                <a:lnTo>
+                  <a:pt x="1536" y="24879"/>
+                </a:lnTo>
+                <a:lnTo>
+                  <a:pt x="2010" y="25246"/>
+                </a:lnTo>
+                <a:lnTo>
+                  <a:pt x="2269" y="25406"/>
+                </a:lnTo>
+                <a:lnTo>
+                  <a:pt x="2269" y="25406"/>
+                </a:lnTo>
+                <a:lnTo>
+                  <a:pt x="11949" y="30961"/>
+                </a:lnTo>
+                <a:lnTo>
+                  <a:pt x="12208" y="31104"/>
+                </a:lnTo>
+                <a:lnTo>
+                  <a:pt x="12752" y="31327"/>
+                </a:lnTo>
+                <a:lnTo>
+                  <a:pt x="13324" y="31479"/>
+                </a:lnTo>
+                <a:lnTo>
+                  <a:pt x="13895" y="31550"/>
+                </a:lnTo>
+                <a:lnTo>
+                  <a:pt x="14476" y="31559"/>
+                </a:lnTo>
+                <a:lnTo>
+                  <a:pt x="15047" y="31488"/>
+                </a:lnTo>
+                <a:lnTo>
+                  <a:pt x="15619" y="31336"/>
+                </a:lnTo>
+                <a:lnTo>
+                  <a:pt x="16164" y="31122"/>
+                </a:lnTo>
+                <a:lnTo>
+                  <a:pt x="16423" y="30979"/>
+                </a:lnTo>
+                <a:lnTo>
+                  <a:pt x="16423" y="30979"/>
+                </a:lnTo>
+                <a:lnTo>
+                  <a:pt x="26326" y="25397"/>
+                </a:lnTo>
+                <a:lnTo>
+                  <a:pt x="26585" y="25246"/>
+                </a:lnTo>
+                <a:lnTo>
+                  <a:pt x="27067" y="24879"/>
+                </a:lnTo>
+                <a:lnTo>
+                  <a:pt x="27496" y="24460"/>
+                </a:lnTo>
+                <a:lnTo>
+                  <a:pt x="27853" y="23986"/>
+                </a:lnTo>
+                <a:lnTo>
+                  <a:pt x="28156" y="23477"/>
+                </a:lnTo>
+                <a:lnTo>
+                  <a:pt x="28389" y="22933"/>
+                </a:lnTo>
+                <a:lnTo>
+                  <a:pt x="28540" y="22352"/>
+                </a:lnTo>
+                <a:lnTo>
+                  <a:pt x="28621" y="21763"/>
+                </a:lnTo>
+                <a:lnTo>
+                  <a:pt x="28630" y="21450"/>
+                </a:lnTo>
+                <a:lnTo>
+                  <a:pt x="28630" y="21450"/>
+                </a:lnTo>
+                <a:lnTo>
+                  <a:pt x="28630" y="10288"/>
+                </a:lnTo>
+                <a:lnTo>
+                  <a:pt x="28621" y="9984"/>
+                </a:lnTo>
+                <a:lnTo>
+                  <a:pt x="28549" y="9395"/>
+                </a:lnTo>
+                <a:lnTo>
+                  <a:pt x="28389" y="8823"/>
+                </a:lnTo>
+                <a:lnTo>
+                  <a:pt x="28165" y="8288"/>
+                </a:lnTo>
+                <a:lnTo>
+                  <a:pt x="27880" y="7779"/>
+                </a:lnTo>
+                <a:lnTo>
+                  <a:pt x="27522" y="7314"/>
+                </a:lnTo>
+                <a:lnTo>
+                  <a:pt x="27103" y="6895"/>
+                </a:lnTo>
+                <a:lnTo>
+                  <a:pt x="26638" y="6528"/>
+                </a:lnTo>
+                <a:lnTo>
+                  <a:pt x="26379" y="6368"/>
+                </a:lnTo>
+                <a:lnTo>
+                  <a:pt x="26379" y="6368"/>
+                </a:lnTo>
+                <a:lnTo>
+                  <a:pt x="16485" y="608"/>
+                </a:lnTo>
+                <a:lnTo>
+                  <a:pt x="16217" y="465"/>
+                </a:lnTo>
+                <a:lnTo>
+                  <a:pt x="15663" y="233"/>
+                </a:lnTo>
+                <a:lnTo>
+                  <a:pt x="15083" y="81"/>
+                </a:lnTo>
+                <a:lnTo>
+                  <a:pt x="14503" y="1"/>
+                </a:lnTo>
+                <a:lnTo>
+                  <a:pt x="14208" y="1"/>
+                </a:lnTo>
+                <a:lnTo>
+                  <a:pt x="14208" y="1"/>
+                </a:lnTo>
+                <a:lnTo>
+                  <a:pt x="13904" y="1"/>
+                </a:lnTo>
+                <a:lnTo>
+                  <a:pt x="13306" y="81"/>
+                </a:lnTo>
+                <a:lnTo>
+                  <a:pt x="12726" y="242"/>
+                </a:lnTo>
+                <a:lnTo>
+                  <a:pt x="12163" y="483"/>
+                </a:lnTo>
+                <a:lnTo>
+                  <a:pt x="11895" y="635"/>
+                </a:lnTo>
+                <a:close/>
+              </a:path>
+            </a:pathLst>
+          </a:custGeom>
+          <a:solidFill>
+            <a:srgbClr val="49D47D"/>
+          </a:solidFill>
+          <a:ln>
+            <a:noFill/>
+          </a:ln>
+        </p:spPr>
+        <p:txBody>
+          <a:bodyPr spcFirstLastPara="1" wrap="square" lIns="91425" tIns="91425" rIns="91425" bIns="91425" anchor="ctr" anchorCtr="0">
+            <a:noAutofit/>
+          </a:bodyPr>
+          <a:lstStyle/>
+          <a:p>
+            <a:pPr marL="0" lvl="0" indent="0" algn="l" rtl="0">
+              <a:spcBef>
+                <a:spcPts val="0"/>
+              </a:spcBef>
+              <a:spcAft>
+                <a:spcPts val="0"/>
+              </a:spcAft>
+              <a:buNone/>
+            </a:pPr>
+            <a:endParaRPr>
+              <a:latin typeface="Montserrat" panose="00000500000000000000" pitchFamily="2" charset="-52"/>
+            </a:endParaRPr>
+          </a:p>
+        </p:txBody>
+      </p:sp>
+      <p:sp>
+        <p:nvSpPr>
+          <p:cNvPr id="916" name="Google Shape;916;p31"/>
+          <p:cNvSpPr txBox="1"/>
+          <p:nvPr/>
+        </p:nvSpPr>
+        <p:spPr>
+          <a:xfrm>
+            <a:off x="378550" y="99903"/>
+            <a:ext cx="8229600" cy="748780"/>
+          </a:xfrm>
+          <a:prstGeom prst="rect">
+            <a:avLst/>
+          </a:prstGeom>
+          <a:noFill/>
+          <a:ln>
+            <a:noFill/>
+          </a:ln>
+        </p:spPr>
+        <p:txBody>
+          <a:bodyPr spcFirstLastPara="1" wrap="square" lIns="91425" tIns="91425" rIns="91425" bIns="91425" anchor="ctr" anchorCtr="0">
+            <a:noAutofit/>
+          </a:bodyPr>
+          <a:lstStyle/>
+          <a:p>
+            <a:pPr lvl="0" algn="ctr"/>
+            <a:r>
+              <a:rPr lang="bg-BG" sz="3200" b="1" dirty="0">
+                <a:latin typeface="Montserrat" panose="00000500000000000000" pitchFamily="2" charset="-52"/>
+              </a:rPr>
+              <a:t>Тема на проекта</a:t>
+            </a:r>
+            <a:endParaRPr sz="2800" b="1" dirty="0">
+              <a:latin typeface="Montserrat" panose="00000500000000000000" pitchFamily="2" charset="-52"/>
+              <a:ea typeface="Fira Sans"/>
+              <a:cs typeface="Fira Sans"/>
+              <a:sym typeface="Fira Sans"/>
+            </a:endParaRPr>
+          </a:p>
+        </p:txBody>
+      </p:sp>
+      <p:sp>
+        <p:nvSpPr>
+          <p:cNvPr id="917" name="Google Shape;917;p31"/>
+          <p:cNvSpPr/>
+          <p:nvPr/>
+        </p:nvSpPr>
+        <p:spPr>
+          <a:xfrm>
+            <a:off x="2634113" y="4070994"/>
+            <a:ext cx="1831782" cy="2697746"/>
+          </a:xfrm>
+          <a:custGeom>
+            <a:avLst/>
+            <a:gdLst/>
+            <a:ahLst/>
+            <a:cxnLst/>
+            <a:rect l="l" t="t" r="r" b="b"/>
+            <a:pathLst>
+              <a:path w="47017" h="69244" extrusionOk="0">
+                <a:moveTo>
+                  <a:pt x="12547" y="1"/>
+                </a:moveTo>
+                <a:lnTo>
+                  <a:pt x="7412" y="3046"/>
+                </a:lnTo>
+                <a:lnTo>
+                  <a:pt x="6983" y="3305"/>
+                </a:lnTo>
+                <a:lnTo>
+                  <a:pt x="6162" y="3867"/>
+                </a:lnTo>
+                <a:lnTo>
+                  <a:pt x="5394" y="4475"/>
+                </a:lnTo>
+                <a:lnTo>
+                  <a:pt x="4662" y="5126"/>
+                </a:lnTo>
+                <a:lnTo>
+                  <a:pt x="3983" y="5823"/>
+                </a:lnTo>
+                <a:lnTo>
+                  <a:pt x="3349" y="6564"/>
+                </a:lnTo>
+                <a:lnTo>
+                  <a:pt x="2760" y="7332"/>
+                </a:lnTo>
+                <a:lnTo>
+                  <a:pt x="2233" y="8145"/>
+                </a:lnTo>
+                <a:lnTo>
+                  <a:pt x="1750" y="8984"/>
+                </a:lnTo>
+                <a:lnTo>
+                  <a:pt x="1322" y="9859"/>
+                </a:lnTo>
+                <a:lnTo>
+                  <a:pt x="956" y="10752"/>
+                </a:lnTo>
+                <a:lnTo>
+                  <a:pt x="643" y="11672"/>
+                </a:lnTo>
+                <a:lnTo>
+                  <a:pt x="393" y="12619"/>
+                </a:lnTo>
+                <a:lnTo>
+                  <a:pt x="206" y="13574"/>
+                </a:lnTo>
+                <a:lnTo>
+                  <a:pt x="72" y="14556"/>
+                </a:lnTo>
+                <a:lnTo>
+                  <a:pt x="9" y="15548"/>
+                </a:lnTo>
+                <a:lnTo>
+                  <a:pt x="0" y="16039"/>
+                </a:lnTo>
+                <a:lnTo>
+                  <a:pt x="0" y="53473"/>
+                </a:lnTo>
+                <a:lnTo>
+                  <a:pt x="9" y="53982"/>
+                </a:lnTo>
+                <a:lnTo>
+                  <a:pt x="81" y="54991"/>
+                </a:lnTo>
+                <a:lnTo>
+                  <a:pt x="206" y="55974"/>
+                </a:lnTo>
+                <a:lnTo>
+                  <a:pt x="402" y="56947"/>
+                </a:lnTo>
+                <a:lnTo>
+                  <a:pt x="661" y="57902"/>
+                </a:lnTo>
+                <a:lnTo>
+                  <a:pt x="983" y="58840"/>
+                </a:lnTo>
+                <a:lnTo>
+                  <a:pt x="1358" y="59742"/>
+                </a:lnTo>
+                <a:lnTo>
+                  <a:pt x="1795" y="60626"/>
+                </a:lnTo>
+                <a:lnTo>
+                  <a:pt x="2286" y="61474"/>
+                </a:lnTo>
+                <a:lnTo>
+                  <a:pt x="2831" y="62287"/>
+                </a:lnTo>
+                <a:lnTo>
+                  <a:pt x="3429" y="63064"/>
+                </a:lnTo>
+                <a:lnTo>
+                  <a:pt x="4081" y="63805"/>
+                </a:lnTo>
+                <a:lnTo>
+                  <a:pt x="4778" y="64502"/>
+                </a:lnTo>
+                <a:lnTo>
+                  <a:pt x="5528" y="65162"/>
+                </a:lnTo>
+                <a:lnTo>
+                  <a:pt x="6323" y="65770"/>
+                </a:lnTo>
+                <a:lnTo>
+                  <a:pt x="7153" y="66323"/>
+                </a:lnTo>
+                <a:lnTo>
+                  <a:pt x="7591" y="66582"/>
+                </a:lnTo>
+                <a:lnTo>
+                  <a:pt x="12225" y="69243"/>
+                </a:lnTo>
+                <a:lnTo>
+                  <a:pt x="47016" y="34461"/>
+                </a:lnTo>
+                <a:lnTo>
+                  <a:pt x="12547" y="1"/>
+                </a:lnTo>
+                <a:close/>
+              </a:path>
+            </a:pathLst>
+          </a:custGeom>
+          <a:solidFill>
+            <a:srgbClr val="1AAD7A"/>
+          </a:solidFill>
+          <a:ln>
+            <a:noFill/>
+          </a:ln>
+        </p:spPr>
+        <p:txBody>
+          <a:bodyPr spcFirstLastPara="1" wrap="square" lIns="91425" tIns="91425" rIns="91425" bIns="91425" anchor="ctr" anchorCtr="0">
+            <a:noAutofit/>
+          </a:bodyPr>
+          <a:lstStyle/>
+          <a:p>
+            <a:pPr marL="0" lvl="0" indent="0" algn="l" rtl="0">
+              <a:spcBef>
+                <a:spcPts val="0"/>
+              </a:spcBef>
+              <a:spcAft>
+                <a:spcPts val="0"/>
+              </a:spcAft>
+              <a:buNone/>
+            </a:pPr>
+            <a:endParaRPr>
+              <a:latin typeface="Montserrat" panose="00000500000000000000" pitchFamily="2" charset="-52"/>
+            </a:endParaRPr>
+          </a:p>
+        </p:txBody>
+      </p:sp>
+      <p:sp>
+        <p:nvSpPr>
+          <p:cNvPr id="918" name="Google Shape;918;p31"/>
+          <p:cNvSpPr/>
+          <p:nvPr/>
+        </p:nvSpPr>
+        <p:spPr>
+          <a:xfrm>
+            <a:off x="3148650" y="5443487"/>
+            <a:ext cx="2690772" cy="2022102"/>
+          </a:xfrm>
+          <a:custGeom>
+            <a:avLst/>
+            <a:gdLst/>
+            <a:ahLst/>
+            <a:cxnLst/>
+            <a:rect l="l" t="t" r="r" b="b"/>
+            <a:pathLst>
+              <a:path w="69065" h="51902" extrusionOk="0">
+                <a:moveTo>
+                  <a:pt x="34577" y="0"/>
+                </a:moveTo>
+                <a:lnTo>
+                  <a:pt x="1" y="34577"/>
+                </a:lnTo>
+                <a:lnTo>
+                  <a:pt x="26683" y="49892"/>
+                </a:lnTo>
+                <a:lnTo>
+                  <a:pt x="27121" y="50142"/>
+                </a:lnTo>
+                <a:lnTo>
+                  <a:pt x="28005" y="50571"/>
+                </a:lnTo>
+                <a:lnTo>
+                  <a:pt x="28916" y="50946"/>
+                </a:lnTo>
+                <a:lnTo>
+                  <a:pt x="29845" y="51258"/>
+                </a:lnTo>
+                <a:lnTo>
+                  <a:pt x="30791" y="51508"/>
+                </a:lnTo>
+                <a:lnTo>
+                  <a:pt x="31738" y="51705"/>
+                </a:lnTo>
+                <a:lnTo>
+                  <a:pt x="32702" y="51830"/>
+                </a:lnTo>
+                <a:lnTo>
+                  <a:pt x="33667" y="51892"/>
+                </a:lnTo>
+                <a:lnTo>
+                  <a:pt x="34631" y="51901"/>
+                </a:lnTo>
+                <a:lnTo>
+                  <a:pt x="35595" y="51839"/>
+                </a:lnTo>
+                <a:lnTo>
+                  <a:pt x="36560" y="51723"/>
+                </a:lnTo>
+                <a:lnTo>
+                  <a:pt x="37515" y="51535"/>
+                </a:lnTo>
+                <a:lnTo>
+                  <a:pt x="38453" y="51294"/>
+                </a:lnTo>
+                <a:lnTo>
+                  <a:pt x="39382" y="50990"/>
+                </a:lnTo>
+                <a:lnTo>
+                  <a:pt x="40293" y="50624"/>
+                </a:lnTo>
+                <a:lnTo>
+                  <a:pt x="41195" y="50196"/>
+                </a:lnTo>
+                <a:lnTo>
+                  <a:pt x="41623" y="49954"/>
+                </a:lnTo>
+                <a:lnTo>
+                  <a:pt x="69065" y="34488"/>
+                </a:lnTo>
+                <a:lnTo>
+                  <a:pt x="34577" y="0"/>
+                </a:lnTo>
+                <a:close/>
+              </a:path>
+            </a:pathLst>
+          </a:custGeom>
+          <a:solidFill>
+            <a:srgbClr val="4B85CF"/>
+          </a:solidFill>
+          <a:ln>
+            <a:noFill/>
+          </a:ln>
+        </p:spPr>
+        <p:txBody>
+          <a:bodyPr spcFirstLastPara="1" wrap="square" lIns="91425" tIns="91425" rIns="91425" bIns="91425" anchor="ctr" anchorCtr="0">
+            <a:noAutofit/>
+          </a:bodyPr>
+          <a:lstStyle/>
+          <a:p>
+            <a:pPr marL="0" lvl="0" indent="0" algn="l" rtl="0">
+              <a:spcBef>
+                <a:spcPts val="0"/>
+              </a:spcBef>
+              <a:spcAft>
+                <a:spcPts val="0"/>
+              </a:spcAft>
+              <a:buNone/>
+            </a:pPr>
+            <a:endParaRPr>
+              <a:latin typeface="Montserrat" panose="00000500000000000000" pitchFamily="2" charset="-52"/>
+            </a:endParaRPr>
+          </a:p>
+        </p:txBody>
+      </p:sp>
+      <p:sp>
+        <p:nvSpPr>
+          <p:cNvPr id="919" name="Google Shape;919;p31"/>
+          <p:cNvSpPr/>
+          <p:nvPr/>
+        </p:nvSpPr>
+        <p:spPr>
+          <a:xfrm>
+            <a:off x="4525670" y="4074149"/>
+            <a:ext cx="1831782" cy="2691474"/>
+          </a:xfrm>
+          <a:custGeom>
+            <a:avLst/>
+            <a:gdLst/>
+            <a:ahLst/>
+            <a:cxnLst/>
+            <a:rect l="l" t="t" r="r" b="b"/>
+            <a:pathLst>
+              <a:path w="47017" h="69083" extrusionOk="0">
+                <a:moveTo>
+                  <a:pt x="34381" y="0"/>
+                </a:moveTo>
+                <a:lnTo>
+                  <a:pt x="0" y="34380"/>
+                </a:lnTo>
+                <a:lnTo>
+                  <a:pt x="34702" y="69082"/>
+                </a:lnTo>
+                <a:lnTo>
+                  <a:pt x="39319" y="66483"/>
+                </a:lnTo>
+                <a:lnTo>
+                  <a:pt x="39766" y="66225"/>
+                </a:lnTo>
+                <a:lnTo>
+                  <a:pt x="40614" y="65671"/>
+                </a:lnTo>
+                <a:lnTo>
+                  <a:pt x="41418" y="65064"/>
+                </a:lnTo>
+                <a:lnTo>
+                  <a:pt x="42168" y="64403"/>
+                </a:lnTo>
+                <a:lnTo>
+                  <a:pt x="42873" y="63706"/>
+                </a:lnTo>
+                <a:lnTo>
+                  <a:pt x="43534" y="62965"/>
+                </a:lnTo>
+                <a:lnTo>
+                  <a:pt x="44141" y="62179"/>
+                </a:lnTo>
+                <a:lnTo>
+                  <a:pt x="44695" y="61367"/>
+                </a:lnTo>
+                <a:lnTo>
+                  <a:pt x="45195" y="60509"/>
+                </a:lnTo>
+                <a:lnTo>
+                  <a:pt x="45633" y="59625"/>
+                </a:lnTo>
+                <a:lnTo>
+                  <a:pt x="46017" y="58714"/>
+                </a:lnTo>
+                <a:lnTo>
+                  <a:pt x="46347" y="57777"/>
+                </a:lnTo>
+                <a:lnTo>
+                  <a:pt x="46606" y="56812"/>
+                </a:lnTo>
+                <a:lnTo>
+                  <a:pt x="46802" y="55839"/>
+                </a:lnTo>
+                <a:lnTo>
+                  <a:pt x="46936" y="54839"/>
+                </a:lnTo>
+                <a:lnTo>
+                  <a:pt x="47008" y="53830"/>
+                </a:lnTo>
+                <a:lnTo>
+                  <a:pt x="47017" y="53312"/>
+                </a:lnTo>
+                <a:lnTo>
+                  <a:pt x="47017" y="16038"/>
+                </a:lnTo>
+                <a:lnTo>
+                  <a:pt x="47008" y="15538"/>
+                </a:lnTo>
+                <a:lnTo>
+                  <a:pt x="46945" y="14538"/>
+                </a:lnTo>
+                <a:lnTo>
+                  <a:pt x="46811" y="13556"/>
+                </a:lnTo>
+                <a:lnTo>
+                  <a:pt x="46615" y="12591"/>
+                </a:lnTo>
+                <a:lnTo>
+                  <a:pt x="46356" y="11636"/>
+                </a:lnTo>
+                <a:lnTo>
+                  <a:pt x="46043" y="10716"/>
+                </a:lnTo>
+                <a:lnTo>
+                  <a:pt x="45668" y="9805"/>
+                </a:lnTo>
+                <a:lnTo>
+                  <a:pt x="45240" y="8930"/>
+                </a:lnTo>
+                <a:lnTo>
+                  <a:pt x="44757" y="8091"/>
+                </a:lnTo>
+                <a:lnTo>
+                  <a:pt x="44213" y="7278"/>
+                </a:lnTo>
+                <a:lnTo>
+                  <a:pt x="43623" y="6501"/>
+                </a:lnTo>
+                <a:lnTo>
+                  <a:pt x="42980" y="5760"/>
+                </a:lnTo>
+                <a:lnTo>
+                  <a:pt x="42284" y="5063"/>
+                </a:lnTo>
+                <a:lnTo>
+                  <a:pt x="41552" y="4403"/>
+                </a:lnTo>
+                <a:lnTo>
+                  <a:pt x="40766" y="3795"/>
+                </a:lnTo>
+                <a:lnTo>
+                  <a:pt x="39935" y="3242"/>
+                </a:lnTo>
+                <a:lnTo>
+                  <a:pt x="39498" y="2983"/>
+                </a:lnTo>
+                <a:lnTo>
+                  <a:pt x="34381" y="0"/>
+                </a:lnTo>
+                <a:close/>
+              </a:path>
+            </a:pathLst>
+          </a:custGeom>
+          <a:solidFill>
+            <a:srgbClr val="5EB2FC"/>
+          </a:solidFill>
+          <a:ln>
+            <a:noFill/>
+          </a:ln>
+        </p:spPr>
+        <p:txBody>
+          <a:bodyPr spcFirstLastPara="1" wrap="square" lIns="91425" tIns="91425" rIns="91425" bIns="91425" anchor="ctr" anchorCtr="0">
+            <a:noAutofit/>
+          </a:bodyPr>
+          <a:lstStyle/>
+          <a:p>
+            <a:pPr marL="0" lvl="0" indent="0" algn="l" rtl="0">
+              <a:spcBef>
+                <a:spcPts val="0"/>
+              </a:spcBef>
+              <a:spcAft>
+                <a:spcPts val="0"/>
+              </a:spcAft>
+              <a:buNone/>
+            </a:pPr>
+            <a:endParaRPr>
+              <a:latin typeface="Montserrat" panose="00000500000000000000" pitchFamily="2" charset="-52"/>
+            </a:endParaRPr>
+          </a:p>
+        </p:txBody>
+      </p:sp>
+      <p:sp>
+        <p:nvSpPr>
+          <p:cNvPr id="920" name="Google Shape;920;p31"/>
+          <p:cNvSpPr/>
+          <p:nvPr/>
+        </p:nvSpPr>
+        <p:spPr>
+          <a:xfrm>
+            <a:off x="3438469" y="4325670"/>
+            <a:ext cx="1058037" cy="1058037"/>
+          </a:xfrm>
+          <a:custGeom>
+            <a:avLst/>
+            <a:gdLst/>
+            <a:ahLst/>
+            <a:cxnLst/>
+            <a:rect l="l" t="t" r="r" b="b"/>
+            <a:pathLst>
+              <a:path w="27157" h="27157" extrusionOk="0">
+                <a:moveTo>
+                  <a:pt x="0" y="9"/>
+                </a:moveTo>
+                <a:lnTo>
+                  <a:pt x="27138" y="27156"/>
+                </a:lnTo>
+                <a:lnTo>
+                  <a:pt x="27156" y="27138"/>
+                </a:lnTo>
+                <a:lnTo>
+                  <a:pt x="9" y="0"/>
+                </a:lnTo>
+                <a:lnTo>
+                  <a:pt x="0" y="9"/>
+                </a:lnTo>
+                <a:close/>
+              </a:path>
+            </a:pathLst>
+          </a:custGeom>
+          <a:solidFill>
+            <a:srgbClr val="FFFFFF"/>
+          </a:solidFill>
+          <a:ln>
+            <a:noFill/>
+          </a:ln>
+        </p:spPr>
+        <p:txBody>
+          <a:bodyPr spcFirstLastPara="1" wrap="square" lIns="91425" tIns="91425" rIns="91425" bIns="91425" anchor="ctr" anchorCtr="0">
+            <a:noAutofit/>
+          </a:bodyPr>
+          <a:lstStyle/>
+          <a:p>
+            <a:pPr marL="0" lvl="0" indent="0" algn="l" rtl="0">
+              <a:spcBef>
+                <a:spcPts val="0"/>
+              </a:spcBef>
+              <a:spcAft>
+                <a:spcPts val="0"/>
+              </a:spcAft>
+              <a:buNone/>
+            </a:pPr>
+            <a:endParaRPr>
+              <a:latin typeface="Montserrat" panose="00000500000000000000" pitchFamily="2" charset="-52"/>
+            </a:endParaRPr>
+          </a:p>
+        </p:txBody>
+      </p:sp>
+      <p:sp>
+        <p:nvSpPr>
+          <p:cNvPr id="921" name="Google Shape;921;p31"/>
+          <p:cNvSpPr/>
+          <p:nvPr/>
+        </p:nvSpPr>
+        <p:spPr>
+          <a:xfrm>
+            <a:off x="3438820" y="3803461"/>
+            <a:ext cx="2109061" cy="1579555"/>
+          </a:xfrm>
+          <a:custGeom>
+            <a:avLst/>
+            <a:gdLst/>
+            <a:ahLst/>
+            <a:cxnLst/>
+            <a:rect l="l" t="t" r="r" b="b"/>
+            <a:pathLst>
+              <a:path w="54134" h="40543" extrusionOk="0">
+                <a:moveTo>
+                  <a:pt x="19057" y="2117"/>
+                </a:moveTo>
+                <a:lnTo>
+                  <a:pt x="0" y="13404"/>
+                </a:lnTo>
+                <a:lnTo>
+                  <a:pt x="27147" y="40542"/>
+                </a:lnTo>
+                <a:lnTo>
+                  <a:pt x="54134" y="13556"/>
+                </a:lnTo>
+                <a:lnTo>
+                  <a:pt x="34363" y="2054"/>
+                </a:lnTo>
+                <a:lnTo>
+                  <a:pt x="33916" y="1804"/>
+                </a:lnTo>
+                <a:lnTo>
+                  <a:pt x="33014" y="1349"/>
+                </a:lnTo>
+                <a:lnTo>
+                  <a:pt x="32086" y="965"/>
+                </a:lnTo>
+                <a:lnTo>
+                  <a:pt x="31139" y="652"/>
+                </a:lnTo>
+                <a:lnTo>
+                  <a:pt x="30184" y="393"/>
+                </a:lnTo>
+                <a:lnTo>
+                  <a:pt x="29210" y="197"/>
+                </a:lnTo>
+                <a:lnTo>
+                  <a:pt x="28237" y="72"/>
+                </a:lnTo>
+                <a:lnTo>
+                  <a:pt x="27254" y="9"/>
+                </a:lnTo>
+                <a:lnTo>
+                  <a:pt x="26763" y="1"/>
+                </a:lnTo>
+                <a:lnTo>
+                  <a:pt x="26763" y="1"/>
+                </a:lnTo>
+                <a:lnTo>
+                  <a:pt x="26263" y="9"/>
+                </a:lnTo>
+                <a:lnTo>
+                  <a:pt x="25263" y="72"/>
+                </a:lnTo>
+                <a:lnTo>
+                  <a:pt x="24272" y="206"/>
+                </a:lnTo>
+                <a:lnTo>
+                  <a:pt x="23290" y="402"/>
+                </a:lnTo>
+                <a:lnTo>
+                  <a:pt x="22316" y="670"/>
+                </a:lnTo>
+                <a:lnTo>
+                  <a:pt x="21361" y="1001"/>
+                </a:lnTo>
+                <a:lnTo>
+                  <a:pt x="20423" y="1394"/>
+                </a:lnTo>
+                <a:lnTo>
+                  <a:pt x="19503" y="1858"/>
+                </a:lnTo>
+                <a:lnTo>
+                  <a:pt x="19057" y="2117"/>
+                </a:lnTo>
+                <a:close/>
+              </a:path>
+            </a:pathLst>
+          </a:custGeom>
+          <a:solidFill>
+            <a:srgbClr val="49D47D"/>
+          </a:solidFill>
+          <a:ln>
+            <a:noFill/>
+          </a:ln>
+        </p:spPr>
+        <p:txBody>
+          <a:bodyPr spcFirstLastPara="1" wrap="square" lIns="91425" tIns="91425" rIns="91425" bIns="91425" anchor="ctr" anchorCtr="0">
+            <a:noAutofit/>
+          </a:bodyPr>
+          <a:lstStyle/>
+          <a:p>
+            <a:pPr marL="0" lvl="0" indent="0" algn="l" rtl="0">
+              <a:spcBef>
+                <a:spcPts val="0"/>
+              </a:spcBef>
+              <a:spcAft>
+                <a:spcPts val="0"/>
+              </a:spcAft>
+              <a:buNone/>
+            </a:pPr>
+            <a:endParaRPr>
+              <a:latin typeface="Montserrat" panose="00000500000000000000" pitchFamily="2" charset="-52"/>
+            </a:endParaRPr>
+          </a:p>
+        </p:txBody>
+      </p:sp>
+      <p:sp>
+        <p:nvSpPr>
+          <p:cNvPr id="922" name="Google Shape;922;p31"/>
+          <p:cNvSpPr/>
+          <p:nvPr/>
+        </p:nvSpPr>
+        <p:spPr>
+          <a:xfrm>
+            <a:off x="3411364" y="3797539"/>
+            <a:ext cx="2109061" cy="1579205"/>
+          </a:xfrm>
+          <a:custGeom>
+            <a:avLst/>
+            <a:gdLst/>
+            <a:ahLst/>
+            <a:cxnLst/>
+            <a:rect l="l" t="t" r="r" b="b"/>
+            <a:pathLst>
+              <a:path w="54134" h="40534" extrusionOk="0">
+                <a:moveTo>
+                  <a:pt x="26201" y="0"/>
+                </a:moveTo>
+                <a:lnTo>
+                  <a:pt x="25218" y="72"/>
+                </a:lnTo>
+                <a:lnTo>
+                  <a:pt x="24227" y="206"/>
+                </a:lnTo>
+                <a:lnTo>
+                  <a:pt x="23254" y="402"/>
+                </a:lnTo>
+                <a:lnTo>
+                  <a:pt x="22289" y="670"/>
+                </a:lnTo>
+                <a:lnTo>
+                  <a:pt x="21343" y="992"/>
+                </a:lnTo>
+                <a:lnTo>
+                  <a:pt x="20414" y="1394"/>
+                </a:lnTo>
+                <a:lnTo>
+                  <a:pt x="19503" y="1849"/>
+                </a:lnTo>
+                <a:lnTo>
+                  <a:pt x="19057" y="2108"/>
+                </a:lnTo>
+                <a:lnTo>
+                  <a:pt x="0" y="13395"/>
+                </a:lnTo>
+                <a:lnTo>
+                  <a:pt x="27147" y="40533"/>
+                </a:lnTo>
+                <a:lnTo>
+                  <a:pt x="54134" y="13547"/>
+                </a:lnTo>
+                <a:lnTo>
+                  <a:pt x="34363" y="2045"/>
+                </a:lnTo>
+                <a:lnTo>
+                  <a:pt x="33916" y="1786"/>
+                </a:lnTo>
+                <a:lnTo>
+                  <a:pt x="33005" y="1340"/>
+                </a:lnTo>
+                <a:lnTo>
+                  <a:pt x="32068" y="956"/>
+                </a:lnTo>
+                <a:lnTo>
+                  <a:pt x="31121" y="635"/>
+                </a:lnTo>
+                <a:lnTo>
+                  <a:pt x="30148" y="376"/>
+                </a:lnTo>
+                <a:lnTo>
+                  <a:pt x="29174" y="188"/>
+                </a:lnTo>
+                <a:lnTo>
+                  <a:pt x="28183" y="54"/>
+                </a:lnTo>
+                <a:lnTo>
+                  <a:pt x="27201" y="0"/>
+                </a:lnTo>
+                <a:close/>
+              </a:path>
+            </a:pathLst>
+          </a:custGeom>
+          <a:gradFill>
+            <a:gsLst>
+              <a:gs pos="0">
+                <a:srgbClr val="FFFFFF">
+                  <a:alpha val="35686"/>
+                </a:srgbClr>
+              </a:gs>
+              <a:gs pos="100000">
+                <a:srgbClr val="FFFFFF">
+                  <a:alpha val="0"/>
+                </a:srgbClr>
+              </a:gs>
+            </a:gsLst>
+            <a:lin ang="10800025" scaled="0"/>
+          </a:gradFill>
+          <a:ln>
+            <a:noFill/>
+          </a:ln>
+        </p:spPr>
+        <p:txBody>
+          <a:bodyPr spcFirstLastPara="1" wrap="square" lIns="91425" tIns="91425" rIns="91425" bIns="91425" anchor="ctr" anchorCtr="0">
+            <a:noAutofit/>
+          </a:bodyPr>
+          <a:lstStyle/>
+          <a:p>
+            <a:pPr marL="0" lvl="0" indent="0" algn="l" rtl="0">
+              <a:spcBef>
+                <a:spcPts val="0"/>
+              </a:spcBef>
+              <a:spcAft>
+                <a:spcPts val="0"/>
+              </a:spcAft>
+              <a:buNone/>
+            </a:pPr>
+            <a:endParaRPr>
+              <a:latin typeface="Montserrat" panose="00000500000000000000" pitchFamily="2" charset="-52"/>
+            </a:endParaRPr>
+          </a:p>
+        </p:txBody>
+      </p:sp>
+      <p:sp>
+        <p:nvSpPr>
+          <p:cNvPr id="923" name="Google Shape;923;p31"/>
+          <p:cNvSpPr/>
+          <p:nvPr/>
+        </p:nvSpPr>
+        <p:spPr>
+          <a:xfrm>
+            <a:off x="4496451" y="4325670"/>
+            <a:ext cx="1579205" cy="2108710"/>
+          </a:xfrm>
+          <a:custGeom>
+            <a:avLst/>
+            <a:gdLst/>
+            <a:ahLst/>
+            <a:cxnLst/>
+            <a:rect l="l" t="t" r="r" b="b"/>
+            <a:pathLst>
+              <a:path w="40534" h="54125" extrusionOk="0">
+                <a:moveTo>
+                  <a:pt x="27130" y="0"/>
+                </a:moveTo>
+                <a:lnTo>
+                  <a:pt x="0" y="27138"/>
+                </a:lnTo>
+                <a:lnTo>
+                  <a:pt x="26987" y="54125"/>
+                </a:lnTo>
+                <a:lnTo>
+                  <a:pt x="38488" y="34354"/>
+                </a:lnTo>
+                <a:lnTo>
+                  <a:pt x="38739" y="33907"/>
+                </a:lnTo>
+                <a:lnTo>
+                  <a:pt x="39194" y="32997"/>
+                </a:lnTo>
+                <a:lnTo>
+                  <a:pt x="39578" y="32068"/>
+                </a:lnTo>
+                <a:lnTo>
+                  <a:pt x="39899" y="31112"/>
+                </a:lnTo>
+                <a:lnTo>
+                  <a:pt x="40158" y="30148"/>
+                </a:lnTo>
+                <a:lnTo>
+                  <a:pt x="40346" y="29166"/>
+                </a:lnTo>
+                <a:lnTo>
+                  <a:pt x="40471" y="28183"/>
+                </a:lnTo>
+                <a:lnTo>
+                  <a:pt x="40533" y="27192"/>
+                </a:lnTo>
+                <a:lnTo>
+                  <a:pt x="40525" y="26201"/>
+                </a:lnTo>
+                <a:lnTo>
+                  <a:pt x="40462" y="25210"/>
+                </a:lnTo>
+                <a:lnTo>
+                  <a:pt x="40328" y="24227"/>
+                </a:lnTo>
+                <a:lnTo>
+                  <a:pt x="40123" y="23254"/>
+                </a:lnTo>
+                <a:lnTo>
+                  <a:pt x="39864" y="22290"/>
+                </a:lnTo>
+                <a:lnTo>
+                  <a:pt x="39533" y="21334"/>
+                </a:lnTo>
+                <a:lnTo>
+                  <a:pt x="39140" y="20405"/>
+                </a:lnTo>
+                <a:lnTo>
+                  <a:pt x="38685" y="19494"/>
+                </a:lnTo>
+                <a:lnTo>
+                  <a:pt x="38426" y="19057"/>
+                </a:lnTo>
+                <a:lnTo>
+                  <a:pt x="27130" y="0"/>
+                </a:lnTo>
+                <a:close/>
+              </a:path>
+            </a:pathLst>
+          </a:custGeom>
+          <a:gradFill>
+            <a:gsLst>
+              <a:gs pos="0">
+                <a:srgbClr val="FFFFFF">
+                  <a:alpha val="35686"/>
+                </a:srgbClr>
+              </a:gs>
+              <a:gs pos="100000">
+                <a:srgbClr val="FFFFFF">
+                  <a:alpha val="0"/>
+                </a:srgbClr>
+              </a:gs>
+            </a:gsLst>
+            <a:lin ang="10800025" scaled="0"/>
+          </a:gradFill>
+          <a:ln>
+            <a:noFill/>
+          </a:ln>
+        </p:spPr>
+        <p:txBody>
+          <a:bodyPr spcFirstLastPara="1" wrap="square" lIns="91425" tIns="91425" rIns="91425" bIns="91425" anchor="ctr" anchorCtr="0">
+            <a:noAutofit/>
+          </a:bodyPr>
+          <a:lstStyle/>
+          <a:p>
+            <a:pPr marL="0" lvl="0" indent="0" algn="l" rtl="0">
+              <a:spcBef>
+                <a:spcPts val="0"/>
+              </a:spcBef>
+              <a:spcAft>
+                <a:spcPts val="0"/>
+              </a:spcAft>
+              <a:buNone/>
+            </a:pPr>
+            <a:endParaRPr>
+              <a:latin typeface="Montserrat" panose="00000500000000000000" pitchFamily="2" charset="-52"/>
+            </a:endParaRPr>
+          </a:p>
+        </p:txBody>
+      </p:sp>
+      <p:sp>
+        <p:nvSpPr>
+          <p:cNvPr id="924" name="Google Shape;924;p31"/>
+          <p:cNvSpPr/>
+          <p:nvPr/>
+        </p:nvSpPr>
+        <p:spPr>
+          <a:xfrm>
+            <a:off x="3444742" y="5382944"/>
+            <a:ext cx="2109061" cy="1579205"/>
+          </a:xfrm>
+          <a:custGeom>
+            <a:avLst/>
+            <a:gdLst/>
+            <a:ahLst/>
+            <a:cxnLst/>
+            <a:rect l="l" t="t" r="r" b="b"/>
+            <a:pathLst>
+              <a:path w="54134" h="40534" extrusionOk="0">
+                <a:moveTo>
+                  <a:pt x="26995" y="0"/>
+                </a:moveTo>
+                <a:lnTo>
+                  <a:pt x="0" y="26987"/>
+                </a:lnTo>
+                <a:lnTo>
+                  <a:pt x="19771" y="38489"/>
+                </a:lnTo>
+                <a:lnTo>
+                  <a:pt x="20217" y="38748"/>
+                </a:lnTo>
+                <a:lnTo>
+                  <a:pt x="21128" y="39194"/>
+                </a:lnTo>
+                <a:lnTo>
+                  <a:pt x="22066" y="39578"/>
+                </a:lnTo>
+                <a:lnTo>
+                  <a:pt x="23021" y="39899"/>
+                </a:lnTo>
+                <a:lnTo>
+                  <a:pt x="23986" y="40158"/>
+                </a:lnTo>
+                <a:lnTo>
+                  <a:pt x="24959" y="40346"/>
+                </a:lnTo>
+                <a:lnTo>
+                  <a:pt x="25951" y="40480"/>
+                </a:lnTo>
+                <a:lnTo>
+                  <a:pt x="26942" y="40533"/>
+                </a:lnTo>
+                <a:lnTo>
+                  <a:pt x="27933" y="40533"/>
+                </a:lnTo>
+                <a:lnTo>
+                  <a:pt x="28915" y="40462"/>
+                </a:lnTo>
+                <a:lnTo>
+                  <a:pt x="29907" y="40328"/>
+                </a:lnTo>
+                <a:lnTo>
+                  <a:pt x="30880" y="40132"/>
+                </a:lnTo>
+                <a:lnTo>
+                  <a:pt x="31844" y="39864"/>
+                </a:lnTo>
+                <a:lnTo>
+                  <a:pt x="32791" y="39542"/>
+                </a:lnTo>
+                <a:lnTo>
+                  <a:pt x="33720" y="39140"/>
+                </a:lnTo>
+                <a:lnTo>
+                  <a:pt x="34630" y="38685"/>
+                </a:lnTo>
+                <a:lnTo>
+                  <a:pt x="35077" y="38426"/>
+                </a:lnTo>
+                <a:lnTo>
+                  <a:pt x="54134" y="27139"/>
+                </a:lnTo>
+                <a:lnTo>
+                  <a:pt x="26995" y="0"/>
+                </a:lnTo>
+                <a:close/>
+              </a:path>
+            </a:pathLst>
+          </a:custGeom>
+          <a:gradFill>
+            <a:gsLst>
+              <a:gs pos="0">
+                <a:srgbClr val="FFFFFF">
+                  <a:alpha val="35686"/>
+                </a:srgbClr>
+              </a:gs>
+              <a:gs pos="100000">
+                <a:srgbClr val="FFFFFF">
+                  <a:alpha val="0"/>
+                </a:srgbClr>
+              </a:gs>
+            </a:gsLst>
+            <a:lin ang="10800025" scaled="0"/>
+          </a:gradFill>
+          <a:ln>
+            <a:noFill/>
+          </a:ln>
+        </p:spPr>
+        <p:txBody>
+          <a:bodyPr spcFirstLastPara="1" wrap="square" lIns="91425" tIns="91425" rIns="91425" bIns="91425" anchor="ctr" anchorCtr="0">
+            <a:noAutofit/>
+          </a:bodyPr>
+          <a:lstStyle/>
+          <a:p>
+            <a:pPr marL="0" lvl="0" indent="0" algn="l" rtl="0">
+              <a:spcBef>
+                <a:spcPts val="0"/>
+              </a:spcBef>
+              <a:spcAft>
+                <a:spcPts val="0"/>
+              </a:spcAft>
+              <a:buNone/>
+            </a:pPr>
+            <a:endParaRPr>
+              <a:latin typeface="Montserrat" panose="00000500000000000000" pitchFamily="2" charset="-52"/>
+            </a:endParaRPr>
+          </a:p>
+        </p:txBody>
+      </p:sp>
+      <p:sp>
+        <p:nvSpPr>
+          <p:cNvPr id="925" name="Google Shape;925;p31"/>
+          <p:cNvSpPr/>
+          <p:nvPr/>
+        </p:nvSpPr>
+        <p:spPr>
+          <a:xfrm>
+            <a:off x="2916958" y="4331592"/>
+            <a:ext cx="1579555" cy="2108710"/>
+          </a:xfrm>
+          <a:custGeom>
+            <a:avLst/>
+            <a:gdLst/>
+            <a:ahLst/>
+            <a:cxnLst/>
+            <a:rect l="l" t="t" r="r" b="b"/>
+            <a:pathLst>
+              <a:path w="40543" h="54125" extrusionOk="0">
+                <a:moveTo>
+                  <a:pt x="13547" y="0"/>
+                </a:moveTo>
+                <a:lnTo>
+                  <a:pt x="2045" y="19771"/>
+                </a:lnTo>
+                <a:lnTo>
+                  <a:pt x="1795" y="20218"/>
+                </a:lnTo>
+                <a:lnTo>
+                  <a:pt x="1340" y="21128"/>
+                </a:lnTo>
+                <a:lnTo>
+                  <a:pt x="956" y="22057"/>
+                </a:lnTo>
+                <a:lnTo>
+                  <a:pt x="634" y="23013"/>
+                </a:lnTo>
+                <a:lnTo>
+                  <a:pt x="375" y="23977"/>
+                </a:lnTo>
+                <a:lnTo>
+                  <a:pt x="188" y="24959"/>
+                </a:lnTo>
+                <a:lnTo>
+                  <a:pt x="63" y="25942"/>
+                </a:lnTo>
+                <a:lnTo>
+                  <a:pt x="0" y="26933"/>
+                </a:lnTo>
+                <a:lnTo>
+                  <a:pt x="9" y="27924"/>
+                </a:lnTo>
+                <a:lnTo>
+                  <a:pt x="72" y="28915"/>
+                </a:lnTo>
+                <a:lnTo>
+                  <a:pt x="206" y="29898"/>
+                </a:lnTo>
+                <a:lnTo>
+                  <a:pt x="411" y="30880"/>
+                </a:lnTo>
+                <a:lnTo>
+                  <a:pt x="670" y="31835"/>
+                </a:lnTo>
+                <a:lnTo>
+                  <a:pt x="1000" y="32791"/>
+                </a:lnTo>
+                <a:lnTo>
+                  <a:pt x="1393" y="33720"/>
+                </a:lnTo>
+                <a:lnTo>
+                  <a:pt x="1849" y="34631"/>
+                </a:lnTo>
+                <a:lnTo>
+                  <a:pt x="2108" y="35068"/>
+                </a:lnTo>
+                <a:lnTo>
+                  <a:pt x="13404" y="54125"/>
+                </a:lnTo>
+                <a:lnTo>
+                  <a:pt x="40542" y="26986"/>
+                </a:lnTo>
+                <a:lnTo>
+                  <a:pt x="13547" y="0"/>
+                </a:lnTo>
+                <a:close/>
+              </a:path>
+            </a:pathLst>
+          </a:custGeom>
+          <a:gradFill>
+            <a:gsLst>
+              <a:gs pos="0">
+                <a:srgbClr val="FFFFFF">
+                  <a:alpha val="35686"/>
+                </a:srgbClr>
+              </a:gs>
+              <a:gs pos="100000">
+                <a:srgbClr val="FFFFFF">
+                  <a:alpha val="0"/>
+                </a:srgbClr>
+              </a:gs>
+            </a:gsLst>
+            <a:lin ang="5400012" scaled="0"/>
+          </a:gradFill>
+          <a:ln>
+            <a:noFill/>
+          </a:ln>
+        </p:spPr>
+        <p:txBody>
+          <a:bodyPr spcFirstLastPara="1" wrap="square" lIns="91425" tIns="91425" rIns="91425" bIns="91425" anchor="ctr" anchorCtr="0">
+            <a:noAutofit/>
+          </a:bodyPr>
+          <a:lstStyle/>
+          <a:p>
+            <a:pPr marL="0" lvl="0" indent="0" algn="l" rtl="0">
+              <a:spcBef>
+                <a:spcPts val="0"/>
+              </a:spcBef>
+              <a:spcAft>
+                <a:spcPts val="0"/>
+              </a:spcAft>
+              <a:buNone/>
+            </a:pPr>
+            <a:endParaRPr>
+              <a:latin typeface="Montserrat" panose="00000500000000000000" pitchFamily="2" charset="-52"/>
+            </a:endParaRPr>
+          </a:p>
+        </p:txBody>
+      </p:sp>
+      <p:sp>
+        <p:nvSpPr>
+          <p:cNvPr id="926" name="Google Shape;926;p31"/>
+          <p:cNvSpPr/>
+          <p:nvPr/>
+        </p:nvSpPr>
+        <p:spPr>
+          <a:xfrm>
+            <a:off x="3160844" y="3360222"/>
+            <a:ext cx="2668526" cy="1542699"/>
+          </a:xfrm>
+          <a:custGeom>
+            <a:avLst/>
+            <a:gdLst/>
+            <a:ahLst/>
+            <a:cxnLst/>
+            <a:rect l="l" t="t" r="r" b="b"/>
+            <a:pathLst>
+              <a:path w="68494" h="39597" extrusionOk="0">
+                <a:moveTo>
+                  <a:pt x="34363" y="1"/>
+                </a:moveTo>
+                <a:lnTo>
+                  <a:pt x="33363" y="10"/>
+                </a:lnTo>
+                <a:lnTo>
+                  <a:pt x="32380" y="81"/>
+                </a:lnTo>
+                <a:lnTo>
+                  <a:pt x="31389" y="215"/>
+                </a:lnTo>
+                <a:lnTo>
+                  <a:pt x="30416" y="412"/>
+                </a:lnTo>
+                <a:lnTo>
+                  <a:pt x="29451" y="671"/>
+                </a:lnTo>
+                <a:lnTo>
+                  <a:pt x="28496" y="1001"/>
+                </a:lnTo>
+                <a:lnTo>
+                  <a:pt x="27567" y="1394"/>
+                </a:lnTo>
+                <a:lnTo>
+                  <a:pt x="26656" y="1858"/>
+                </a:lnTo>
+                <a:lnTo>
+                  <a:pt x="26210" y="2117"/>
+                </a:lnTo>
+                <a:lnTo>
+                  <a:pt x="0" y="17646"/>
+                </a:lnTo>
+                <a:lnTo>
+                  <a:pt x="7135" y="24781"/>
+                </a:lnTo>
+                <a:lnTo>
+                  <a:pt x="26192" y="13494"/>
+                </a:lnTo>
+                <a:lnTo>
+                  <a:pt x="26638" y="13235"/>
+                </a:lnTo>
+                <a:lnTo>
+                  <a:pt x="27549" y="12780"/>
+                </a:lnTo>
+                <a:lnTo>
+                  <a:pt x="28478" y="12378"/>
+                </a:lnTo>
+                <a:lnTo>
+                  <a:pt x="29424" y="12056"/>
+                </a:lnTo>
+                <a:lnTo>
+                  <a:pt x="30389" y="11788"/>
+                </a:lnTo>
+                <a:lnTo>
+                  <a:pt x="31362" y="11592"/>
+                </a:lnTo>
+                <a:lnTo>
+                  <a:pt x="32353" y="11458"/>
+                </a:lnTo>
+                <a:lnTo>
+                  <a:pt x="33336" y="11386"/>
+                </a:lnTo>
+                <a:lnTo>
+                  <a:pt x="34336" y="11386"/>
+                </a:lnTo>
+                <a:lnTo>
+                  <a:pt x="35318" y="11440"/>
+                </a:lnTo>
+                <a:lnTo>
+                  <a:pt x="36309" y="11574"/>
+                </a:lnTo>
+                <a:lnTo>
+                  <a:pt x="37283" y="11762"/>
+                </a:lnTo>
+                <a:lnTo>
+                  <a:pt x="38256" y="12021"/>
+                </a:lnTo>
+                <a:lnTo>
+                  <a:pt x="39203" y="12342"/>
+                </a:lnTo>
+                <a:lnTo>
+                  <a:pt x="40140" y="12726"/>
+                </a:lnTo>
+                <a:lnTo>
+                  <a:pt x="41051" y="13172"/>
+                </a:lnTo>
+                <a:lnTo>
+                  <a:pt x="41498" y="13431"/>
+                </a:lnTo>
+                <a:lnTo>
+                  <a:pt x="61269" y="24933"/>
+                </a:lnTo>
+                <a:lnTo>
+                  <a:pt x="46615" y="39587"/>
+                </a:lnTo>
+                <a:lnTo>
+                  <a:pt x="46632" y="39596"/>
+                </a:lnTo>
+                <a:lnTo>
+                  <a:pt x="68493" y="17736"/>
+                </a:lnTo>
+                <a:lnTo>
+                  <a:pt x="41525" y="2055"/>
+                </a:lnTo>
+                <a:lnTo>
+                  <a:pt x="41078" y="1796"/>
+                </a:lnTo>
+                <a:lnTo>
+                  <a:pt x="40167" y="1349"/>
+                </a:lnTo>
+                <a:lnTo>
+                  <a:pt x="39238" y="956"/>
+                </a:lnTo>
+                <a:lnTo>
+                  <a:pt x="38283" y="635"/>
+                </a:lnTo>
+                <a:lnTo>
+                  <a:pt x="37319" y="385"/>
+                </a:lnTo>
+                <a:lnTo>
+                  <a:pt x="36336" y="188"/>
+                </a:lnTo>
+                <a:lnTo>
+                  <a:pt x="35354" y="63"/>
+                </a:lnTo>
+                <a:lnTo>
+                  <a:pt x="34363" y="1"/>
+                </a:lnTo>
+                <a:close/>
+              </a:path>
+            </a:pathLst>
+          </a:custGeom>
+          <a:solidFill>
+            <a:srgbClr val="49D47D"/>
+          </a:solidFill>
+          <a:ln>
+            <a:noFill/>
+          </a:ln>
+        </p:spPr>
+        <p:txBody>
+          <a:bodyPr spcFirstLastPara="1" wrap="square" lIns="91425" tIns="91425" rIns="91425" bIns="91425" anchor="ctr" anchorCtr="0">
+            <a:noAutofit/>
+          </a:bodyPr>
+          <a:lstStyle/>
+          <a:p>
+            <a:pPr marL="0" lvl="0" indent="0" algn="l" rtl="0">
+              <a:spcBef>
+                <a:spcPts val="0"/>
+              </a:spcBef>
+              <a:spcAft>
+                <a:spcPts val="0"/>
+              </a:spcAft>
+              <a:buNone/>
+            </a:pPr>
+            <a:endParaRPr>
+              <a:latin typeface="Montserrat" panose="00000500000000000000" pitchFamily="2" charset="-52"/>
+            </a:endParaRPr>
+          </a:p>
+        </p:txBody>
+      </p:sp>
+      <p:sp>
+        <p:nvSpPr>
+          <p:cNvPr id="927" name="Google Shape;927;p31"/>
+          <p:cNvSpPr/>
+          <p:nvPr/>
+        </p:nvSpPr>
+        <p:spPr>
+          <a:xfrm>
+            <a:off x="3806558" y="4654096"/>
+            <a:ext cx="1378444" cy="1519011"/>
+          </a:xfrm>
+          <a:custGeom>
+            <a:avLst/>
+            <a:gdLst/>
+            <a:ahLst/>
+            <a:cxnLst/>
+            <a:rect l="l" t="t" r="r" b="b"/>
+            <a:pathLst>
+              <a:path w="35381" h="38989" extrusionOk="0">
+                <a:moveTo>
+                  <a:pt x="17164" y="0"/>
+                </a:moveTo>
+                <a:lnTo>
+                  <a:pt x="16431" y="98"/>
+                </a:lnTo>
+                <a:lnTo>
+                  <a:pt x="15717" y="295"/>
+                </a:lnTo>
+                <a:lnTo>
+                  <a:pt x="15029" y="590"/>
+                </a:lnTo>
+                <a:lnTo>
+                  <a:pt x="14699" y="777"/>
+                </a:lnTo>
+                <a:lnTo>
+                  <a:pt x="2742" y="7859"/>
+                </a:lnTo>
+                <a:lnTo>
+                  <a:pt x="2429" y="8055"/>
+                </a:lnTo>
+                <a:lnTo>
+                  <a:pt x="1858" y="8511"/>
+                </a:lnTo>
+                <a:lnTo>
+                  <a:pt x="1349" y="9020"/>
+                </a:lnTo>
+                <a:lnTo>
+                  <a:pt x="920" y="9600"/>
+                </a:lnTo>
+                <a:lnTo>
+                  <a:pt x="563" y="10216"/>
+                </a:lnTo>
+                <a:lnTo>
+                  <a:pt x="286" y="10886"/>
+                </a:lnTo>
+                <a:lnTo>
+                  <a:pt x="107" y="11582"/>
+                </a:lnTo>
+                <a:lnTo>
+                  <a:pt x="9" y="12306"/>
+                </a:lnTo>
+                <a:lnTo>
+                  <a:pt x="0" y="12672"/>
+                </a:lnTo>
+                <a:lnTo>
+                  <a:pt x="0" y="26531"/>
+                </a:lnTo>
+                <a:lnTo>
+                  <a:pt x="9" y="26906"/>
+                </a:lnTo>
+                <a:lnTo>
+                  <a:pt x="107" y="27638"/>
+                </a:lnTo>
+                <a:lnTo>
+                  <a:pt x="295" y="28344"/>
+                </a:lnTo>
+                <a:lnTo>
+                  <a:pt x="581" y="29023"/>
+                </a:lnTo>
+                <a:lnTo>
+                  <a:pt x="938" y="29648"/>
+                </a:lnTo>
+                <a:lnTo>
+                  <a:pt x="1384" y="30228"/>
+                </a:lnTo>
+                <a:lnTo>
+                  <a:pt x="1902" y="30746"/>
+                </a:lnTo>
+                <a:lnTo>
+                  <a:pt x="2492" y="31193"/>
+                </a:lnTo>
+                <a:lnTo>
+                  <a:pt x="2813" y="31389"/>
+                </a:lnTo>
+                <a:lnTo>
+                  <a:pt x="14770" y="38256"/>
+                </a:lnTo>
+                <a:lnTo>
+                  <a:pt x="15092" y="38426"/>
+                </a:lnTo>
+                <a:lnTo>
+                  <a:pt x="15762" y="38703"/>
+                </a:lnTo>
+                <a:lnTo>
+                  <a:pt x="16467" y="38890"/>
+                </a:lnTo>
+                <a:lnTo>
+                  <a:pt x="17173" y="38988"/>
+                </a:lnTo>
+                <a:lnTo>
+                  <a:pt x="17887" y="38988"/>
+                </a:lnTo>
+                <a:lnTo>
+                  <a:pt x="18601" y="38899"/>
+                </a:lnTo>
+                <a:lnTo>
+                  <a:pt x="19298" y="38720"/>
+                </a:lnTo>
+                <a:lnTo>
+                  <a:pt x="19977" y="38444"/>
+                </a:lnTo>
+                <a:lnTo>
+                  <a:pt x="20298" y="38274"/>
+                </a:lnTo>
+                <a:lnTo>
+                  <a:pt x="32532" y="31380"/>
+                </a:lnTo>
+                <a:lnTo>
+                  <a:pt x="32862" y="31184"/>
+                </a:lnTo>
+                <a:lnTo>
+                  <a:pt x="33452" y="30737"/>
+                </a:lnTo>
+                <a:lnTo>
+                  <a:pt x="33979" y="30219"/>
+                </a:lnTo>
+                <a:lnTo>
+                  <a:pt x="34425" y="29639"/>
+                </a:lnTo>
+                <a:lnTo>
+                  <a:pt x="34791" y="29005"/>
+                </a:lnTo>
+                <a:lnTo>
+                  <a:pt x="35077" y="28335"/>
+                </a:lnTo>
+                <a:lnTo>
+                  <a:pt x="35274" y="27621"/>
+                </a:lnTo>
+                <a:lnTo>
+                  <a:pt x="35372" y="26879"/>
+                </a:lnTo>
+                <a:lnTo>
+                  <a:pt x="35381" y="26504"/>
+                </a:lnTo>
+                <a:lnTo>
+                  <a:pt x="35381" y="12708"/>
+                </a:lnTo>
+                <a:lnTo>
+                  <a:pt x="35372" y="12333"/>
+                </a:lnTo>
+                <a:lnTo>
+                  <a:pt x="35274" y="11600"/>
+                </a:lnTo>
+                <a:lnTo>
+                  <a:pt x="35086" y="10904"/>
+                </a:lnTo>
+                <a:lnTo>
+                  <a:pt x="34809" y="10234"/>
+                </a:lnTo>
+                <a:lnTo>
+                  <a:pt x="34452" y="9609"/>
+                </a:lnTo>
+                <a:lnTo>
+                  <a:pt x="34014" y="9028"/>
+                </a:lnTo>
+                <a:lnTo>
+                  <a:pt x="33497" y="8511"/>
+                </a:lnTo>
+                <a:lnTo>
+                  <a:pt x="32916" y="8064"/>
+                </a:lnTo>
+                <a:lnTo>
+                  <a:pt x="32604" y="7868"/>
+                </a:lnTo>
+                <a:lnTo>
+                  <a:pt x="20369" y="750"/>
+                </a:lnTo>
+                <a:lnTo>
+                  <a:pt x="20039" y="572"/>
+                </a:lnTo>
+                <a:lnTo>
+                  <a:pt x="19343" y="277"/>
+                </a:lnTo>
+                <a:lnTo>
+                  <a:pt x="18628" y="90"/>
+                </a:lnTo>
+                <a:lnTo>
+                  <a:pt x="17896" y="0"/>
+                </a:lnTo>
+                <a:close/>
+              </a:path>
+            </a:pathLst>
+          </a:custGeom>
+          <a:solidFill>
+            <a:srgbClr val="FFFFFF"/>
+          </a:solidFill>
+          <a:ln>
+            <a:noFill/>
+          </a:ln>
+        </p:spPr>
+        <p:txBody>
+          <a:bodyPr spcFirstLastPara="1" wrap="square" lIns="91425" tIns="91425" rIns="91425" bIns="91425" anchor="ctr" anchorCtr="0">
+            <a:noAutofit/>
+          </a:bodyPr>
+          <a:lstStyle/>
+          <a:p>
+            <a:pPr marL="0" lvl="0" indent="0" algn="l" rtl="0">
+              <a:spcBef>
+                <a:spcPts val="0"/>
+              </a:spcBef>
+              <a:spcAft>
+                <a:spcPts val="0"/>
+              </a:spcAft>
+              <a:buNone/>
+            </a:pPr>
+            <a:endParaRPr>
+              <a:latin typeface="Montserrat" panose="00000500000000000000" pitchFamily="2" charset="-52"/>
+            </a:endParaRPr>
+          </a:p>
+        </p:txBody>
+      </p:sp>
+      <p:grpSp>
+        <p:nvGrpSpPr>
+          <p:cNvPr id="928" name="Google Shape;928;p31"/>
+          <p:cNvGrpSpPr/>
+          <p:nvPr/>
+        </p:nvGrpSpPr>
+        <p:grpSpPr>
+          <a:xfrm>
+            <a:off x="4347357" y="1321129"/>
+            <a:ext cx="368091" cy="334402"/>
+            <a:chOff x="-62518200" y="2692475"/>
+            <a:chExt cx="318225" cy="289100"/>
+          </a:xfrm>
+        </p:grpSpPr>
+        <p:sp>
+          <p:nvSpPr>
+            <p:cNvPr id="929" name="Google Shape;929;p31"/>
+            <p:cNvSpPr/>
+            <p:nvPr/>
+          </p:nvSpPr>
+          <p:spPr>
+            <a:xfrm>
+              <a:off x="-62518200" y="2692475"/>
+              <a:ext cx="318225" cy="289100"/>
+            </a:xfrm>
+            <a:custGeom>
+              <a:avLst/>
+              <a:gdLst/>
+              <a:ahLst/>
+              <a:cxnLst/>
+              <a:rect l="l" t="t" r="r" b="b"/>
+              <a:pathLst>
+                <a:path w="12729" h="11564" extrusionOk="0">
+                  <a:moveTo>
+                    <a:pt x="3750" y="851"/>
+                  </a:moveTo>
+                  <a:cubicBezTo>
+                    <a:pt x="5420" y="851"/>
+                    <a:pt x="6617" y="1513"/>
+                    <a:pt x="6617" y="2112"/>
+                  </a:cubicBezTo>
+                  <a:cubicBezTo>
+                    <a:pt x="6617" y="2679"/>
+                    <a:pt x="5420" y="3309"/>
+                    <a:pt x="3750" y="3309"/>
+                  </a:cubicBezTo>
+                  <a:cubicBezTo>
+                    <a:pt x="2206" y="3309"/>
+                    <a:pt x="851" y="2679"/>
+                    <a:pt x="851" y="2112"/>
+                  </a:cubicBezTo>
+                  <a:cubicBezTo>
+                    <a:pt x="851" y="1481"/>
+                    <a:pt x="2112" y="851"/>
+                    <a:pt x="3750" y="851"/>
+                  </a:cubicBezTo>
+                  <a:close/>
+                  <a:moveTo>
+                    <a:pt x="6617" y="3403"/>
+                  </a:moveTo>
+                  <a:lnTo>
+                    <a:pt x="6617" y="3781"/>
+                  </a:lnTo>
+                  <a:cubicBezTo>
+                    <a:pt x="5829" y="4222"/>
+                    <a:pt x="5199" y="4884"/>
+                    <a:pt x="4821" y="5672"/>
+                  </a:cubicBezTo>
+                  <a:cubicBezTo>
+                    <a:pt x="4475" y="5766"/>
+                    <a:pt x="4096" y="5766"/>
+                    <a:pt x="3750" y="5766"/>
+                  </a:cubicBezTo>
+                  <a:cubicBezTo>
+                    <a:pt x="2206" y="5766"/>
+                    <a:pt x="851" y="5136"/>
+                    <a:pt x="851" y="4506"/>
+                  </a:cubicBezTo>
+                  <a:lnTo>
+                    <a:pt x="851" y="3403"/>
+                  </a:lnTo>
+                  <a:cubicBezTo>
+                    <a:pt x="1639" y="3939"/>
+                    <a:pt x="2742" y="4159"/>
+                    <a:pt x="3750" y="4159"/>
+                  </a:cubicBezTo>
+                  <a:cubicBezTo>
+                    <a:pt x="4727" y="4159"/>
+                    <a:pt x="5829" y="3939"/>
+                    <a:pt x="6617" y="3403"/>
+                  </a:cubicBezTo>
+                  <a:close/>
+                  <a:moveTo>
+                    <a:pt x="883" y="5913"/>
+                  </a:moveTo>
+                  <a:cubicBezTo>
+                    <a:pt x="1396" y="6254"/>
+                    <a:pt x="2361" y="6617"/>
+                    <a:pt x="3750" y="6617"/>
+                  </a:cubicBezTo>
+                  <a:cubicBezTo>
+                    <a:pt x="4033" y="6617"/>
+                    <a:pt x="4254" y="6617"/>
+                    <a:pt x="4538" y="6585"/>
+                  </a:cubicBezTo>
+                  <a:lnTo>
+                    <a:pt x="4538" y="6585"/>
+                  </a:lnTo>
+                  <a:cubicBezTo>
+                    <a:pt x="4475" y="6869"/>
+                    <a:pt x="4475" y="7184"/>
+                    <a:pt x="4475" y="7467"/>
+                  </a:cubicBezTo>
+                  <a:cubicBezTo>
+                    <a:pt x="4475" y="7719"/>
+                    <a:pt x="4506" y="7971"/>
+                    <a:pt x="4538" y="8255"/>
+                  </a:cubicBezTo>
+                  <a:cubicBezTo>
+                    <a:pt x="4317" y="8287"/>
+                    <a:pt x="4033" y="8287"/>
+                    <a:pt x="3781" y="8287"/>
+                  </a:cubicBezTo>
+                  <a:cubicBezTo>
+                    <a:pt x="2269" y="8287"/>
+                    <a:pt x="883" y="7656"/>
+                    <a:pt x="883" y="7026"/>
+                  </a:cubicBezTo>
+                  <a:lnTo>
+                    <a:pt x="883" y="5913"/>
+                  </a:lnTo>
+                  <a:close/>
+                  <a:moveTo>
+                    <a:pt x="851" y="8350"/>
+                  </a:moveTo>
+                  <a:cubicBezTo>
+                    <a:pt x="1639" y="8917"/>
+                    <a:pt x="2773" y="9106"/>
+                    <a:pt x="3750" y="9106"/>
+                  </a:cubicBezTo>
+                  <a:cubicBezTo>
+                    <a:pt x="4096" y="9106"/>
+                    <a:pt x="4412" y="9074"/>
+                    <a:pt x="4727" y="9043"/>
+                  </a:cubicBezTo>
+                  <a:cubicBezTo>
+                    <a:pt x="4979" y="9547"/>
+                    <a:pt x="5294" y="10019"/>
+                    <a:pt x="5672" y="10397"/>
+                  </a:cubicBezTo>
+                  <a:cubicBezTo>
+                    <a:pt x="5136" y="10649"/>
+                    <a:pt x="4475" y="10775"/>
+                    <a:pt x="3750" y="10775"/>
+                  </a:cubicBezTo>
+                  <a:cubicBezTo>
+                    <a:pt x="2112" y="10775"/>
+                    <a:pt x="851" y="10082"/>
+                    <a:pt x="851" y="9547"/>
+                  </a:cubicBezTo>
+                  <a:lnTo>
+                    <a:pt x="851" y="8350"/>
+                  </a:lnTo>
+                  <a:close/>
+                  <a:moveTo>
+                    <a:pt x="8570" y="4159"/>
+                  </a:moveTo>
+                  <a:cubicBezTo>
+                    <a:pt x="10366" y="4159"/>
+                    <a:pt x="11878" y="5640"/>
+                    <a:pt x="11878" y="7467"/>
+                  </a:cubicBezTo>
+                  <a:cubicBezTo>
+                    <a:pt x="11878" y="9263"/>
+                    <a:pt x="10366" y="10775"/>
+                    <a:pt x="8570" y="10775"/>
+                  </a:cubicBezTo>
+                  <a:cubicBezTo>
+                    <a:pt x="6743" y="10775"/>
+                    <a:pt x="5262" y="9263"/>
+                    <a:pt x="5262" y="7467"/>
+                  </a:cubicBezTo>
+                  <a:cubicBezTo>
+                    <a:pt x="5262" y="5609"/>
+                    <a:pt x="6743" y="4159"/>
+                    <a:pt x="8570" y="4159"/>
+                  </a:cubicBezTo>
+                  <a:close/>
+                  <a:moveTo>
+                    <a:pt x="3781" y="1"/>
+                  </a:moveTo>
+                  <a:cubicBezTo>
+                    <a:pt x="1797" y="1"/>
+                    <a:pt x="64" y="851"/>
+                    <a:pt x="64" y="2112"/>
+                  </a:cubicBezTo>
+                  <a:lnTo>
+                    <a:pt x="64" y="9547"/>
+                  </a:lnTo>
+                  <a:cubicBezTo>
+                    <a:pt x="1" y="10082"/>
+                    <a:pt x="442" y="10649"/>
+                    <a:pt x="1230" y="11027"/>
+                  </a:cubicBezTo>
+                  <a:cubicBezTo>
+                    <a:pt x="1891" y="11405"/>
+                    <a:pt x="2805" y="11563"/>
+                    <a:pt x="3750" y="11563"/>
+                  </a:cubicBezTo>
+                  <a:cubicBezTo>
+                    <a:pt x="4790" y="11563"/>
+                    <a:pt x="5735" y="11311"/>
+                    <a:pt x="6428" y="10964"/>
+                  </a:cubicBezTo>
+                  <a:cubicBezTo>
+                    <a:pt x="7058" y="11342"/>
+                    <a:pt x="7814" y="11563"/>
+                    <a:pt x="8602" y="11563"/>
+                  </a:cubicBezTo>
+                  <a:cubicBezTo>
+                    <a:pt x="10870" y="11563"/>
+                    <a:pt x="12729" y="9704"/>
+                    <a:pt x="12729" y="7404"/>
+                  </a:cubicBezTo>
+                  <a:cubicBezTo>
+                    <a:pt x="12729" y="5136"/>
+                    <a:pt x="10870" y="3277"/>
+                    <a:pt x="8602" y="3277"/>
+                  </a:cubicBezTo>
+                  <a:cubicBezTo>
+                    <a:pt x="8192" y="3277"/>
+                    <a:pt x="7846" y="3309"/>
+                    <a:pt x="7499" y="3435"/>
+                  </a:cubicBezTo>
+                  <a:lnTo>
+                    <a:pt x="7499" y="2049"/>
+                  </a:lnTo>
+                  <a:cubicBezTo>
+                    <a:pt x="7499" y="1481"/>
+                    <a:pt x="7058" y="914"/>
+                    <a:pt x="6302" y="536"/>
+                  </a:cubicBezTo>
+                  <a:cubicBezTo>
+                    <a:pt x="5640" y="158"/>
+                    <a:pt x="4727" y="1"/>
+                    <a:pt x="3781" y="1"/>
+                  </a:cubicBezTo>
+                  <a:close/>
+                </a:path>
+              </a:pathLst>
+            </a:custGeom>
+            <a:solidFill>
+              <a:srgbClr val="FFFFFF"/>
+            </a:solidFill>
+            <a:ln>
+              <a:noFill/>
+            </a:ln>
+          </p:spPr>
+          <p:txBody>
+            <a:bodyPr spcFirstLastPara="1" wrap="square" lIns="91425" tIns="91425" rIns="91425" bIns="91425" anchor="ctr" anchorCtr="0">
+              <a:noAutofit/>
+            </a:bodyPr>
+            <a:lstStyle/>
+            <a:p>
+              <a:pPr marL="0" lvl="0" indent="0" algn="l" rtl="0">
+                <a:spcBef>
+                  <a:spcPts val="0"/>
+                </a:spcBef>
+                <a:spcAft>
+                  <a:spcPts val="0"/>
+                </a:spcAft>
+                <a:buNone/>
+              </a:pPr>
+              <a:endParaRPr>
+                <a:latin typeface="Montserrat" panose="00000500000000000000" pitchFamily="2" charset="-52"/>
+              </a:endParaRPr>
+            </a:p>
+          </p:txBody>
+        </p:sp>
+        <p:sp>
+          <p:nvSpPr>
+            <p:cNvPr id="930" name="Google Shape;930;p31"/>
+            <p:cNvSpPr/>
+            <p:nvPr/>
+          </p:nvSpPr>
+          <p:spPr>
+            <a:xfrm>
+              <a:off x="-62335475" y="2804325"/>
+              <a:ext cx="62250" cy="146525"/>
+            </a:xfrm>
+            <a:custGeom>
+              <a:avLst/>
+              <a:gdLst/>
+              <a:ahLst/>
+              <a:cxnLst/>
+              <a:rect l="l" t="t" r="r" b="b"/>
+              <a:pathLst>
+                <a:path w="2490" h="5861" extrusionOk="0">
+                  <a:moveTo>
+                    <a:pt x="1261" y="0"/>
+                  </a:moveTo>
+                  <a:cubicBezTo>
+                    <a:pt x="1009" y="0"/>
+                    <a:pt x="820" y="189"/>
+                    <a:pt x="820" y="410"/>
+                  </a:cubicBezTo>
+                  <a:lnTo>
+                    <a:pt x="820" y="694"/>
+                  </a:lnTo>
+                  <a:cubicBezTo>
+                    <a:pt x="348" y="851"/>
+                    <a:pt x="1" y="1324"/>
+                    <a:pt x="1" y="1891"/>
+                  </a:cubicBezTo>
+                  <a:cubicBezTo>
+                    <a:pt x="1" y="2552"/>
+                    <a:pt x="537" y="2930"/>
+                    <a:pt x="978" y="3245"/>
+                  </a:cubicBezTo>
+                  <a:cubicBezTo>
+                    <a:pt x="1293" y="3497"/>
+                    <a:pt x="1639" y="3718"/>
+                    <a:pt x="1639" y="3970"/>
+                  </a:cubicBezTo>
+                  <a:cubicBezTo>
+                    <a:pt x="1671" y="4254"/>
+                    <a:pt x="1482" y="4411"/>
+                    <a:pt x="1261" y="4411"/>
+                  </a:cubicBezTo>
+                  <a:cubicBezTo>
+                    <a:pt x="1009" y="4411"/>
+                    <a:pt x="820" y="4191"/>
+                    <a:pt x="820" y="3970"/>
+                  </a:cubicBezTo>
+                  <a:cubicBezTo>
+                    <a:pt x="820" y="3718"/>
+                    <a:pt x="631" y="3529"/>
+                    <a:pt x="411" y="3529"/>
+                  </a:cubicBezTo>
+                  <a:cubicBezTo>
+                    <a:pt x="190" y="3529"/>
+                    <a:pt x="1" y="3718"/>
+                    <a:pt x="1" y="3970"/>
+                  </a:cubicBezTo>
+                  <a:cubicBezTo>
+                    <a:pt x="1" y="4506"/>
+                    <a:pt x="348" y="4947"/>
+                    <a:pt x="820" y="5136"/>
+                  </a:cubicBezTo>
+                  <a:lnTo>
+                    <a:pt x="820" y="5419"/>
+                  </a:lnTo>
+                  <a:cubicBezTo>
+                    <a:pt x="820" y="5671"/>
+                    <a:pt x="1009" y="5860"/>
+                    <a:pt x="1261" y="5860"/>
+                  </a:cubicBezTo>
+                  <a:cubicBezTo>
+                    <a:pt x="1482" y="5860"/>
+                    <a:pt x="1639" y="5671"/>
+                    <a:pt x="1639" y="5419"/>
+                  </a:cubicBezTo>
+                  <a:lnTo>
+                    <a:pt x="1639" y="5136"/>
+                  </a:lnTo>
+                  <a:cubicBezTo>
+                    <a:pt x="2112" y="4978"/>
+                    <a:pt x="2458" y="4506"/>
+                    <a:pt x="2458" y="3970"/>
+                  </a:cubicBezTo>
+                  <a:cubicBezTo>
+                    <a:pt x="2458" y="3308"/>
+                    <a:pt x="1923" y="2899"/>
+                    <a:pt x="1482" y="2584"/>
+                  </a:cubicBezTo>
+                  <a:cubicBezTo>
+                    <a:pt x="1167" y="2363"/>
+                    <a:pt x="820" y="2111"/>
+                    <a:pt x="820" y="1891"/>
+                  </a:cubicBezTo>
+                  <a:cubicBezTo>
+                    <a:pt x="820" y="1639"/>
+                    <a:pt x="1009" y="1450"/>
+                    <a:pt x="1261" y="1450"/>
+                  </a:cubicBezTo>
+                  <a:cubicBezTo>
+                    <a:pt x="1482" y="1450"/>
+                    <a:pt x="1639" y="1639"/>
+                    <a:pt x="1639" y="1891"/>
+                  </a:cubicBezTo>
+                  <a:cubicBezTo>
+                    <a:pt x="1639" y="2111"/>
+                    <a:pt x="1860" y="2300"/>
+                    <a:pt x="2049" y="2300"/>
+                  </a:cubicBezTo>
+                  <a:cubicBezTo>
+                    <a:pt x="2269" y="2300"/>
+                    <a:pt x="2490" y="2111"/>
+                    <a:pt x="2490" y="1891"/>
+                  </a:cubicBezTo>
+                  <a:cubicBezTo>
+                    <a:pt x="2490" y="1324"/>
+                    <a:pt x="2112" y="883"/>
+                    <a:pt x="1639" y="694"/>
+                  </a:cubicBezTo>
+                  <a:lnTo>
+                    <a:pt x="1639" y="410"/>
+                  </a:lnTo>
+                  <a:cubicBezTo>
+                    <a:pt x="1639" y="189"/>
+                    <a:pt x="1450" y="0"/>
+                    <a:pt x="1261" y="0"/>
+                  </a:cubicBezTo>
+                  <a:close/>
+                </a:path>
+              </a:pathLst>
+            </a:custGeom>
+            <a:solidFill>
+              <a:srgbClr val="FFFFFF"/>
+            </a:solidFill>
+            <a:ln>
+              <a:noFill/>
+            </a:ln>
+          </p:spPr>
+          <p:txBody>
+            <a:bodyPr spcFirstLastPara="1" wrap="square" lIns="91425" tIns="91425" rIns="91425" bIns="91425" anchor="ctr" anchorCtr="0">
+              <a:noAutofit/>
+            </a:bodyPr>
+            <a:lstStyle/>
+            <a:p>
+              <a:pPr marL="0" lvl="0" indent="0" algn="l" rtl="0">
+                <a:spcBef>
+                  <a:spcPts val="0"/>
+                </a:spcBef>
+                <a:spcAft>
+                  <a:spcPts val="0"/>
+                </a:spcAft>
+                <a:buNone/>
+              </a:pPr>
+              <a:endParaRPr>
+                <a:latin typeface="Montserrat" panose="00000500000000000000" pitchFamily="2" charset="-52"/>
+              </a:endParaRPr>
+            </a:p>
+          </p:txBody>
+        </p:sp>
+      </p:grpSp>
+      <p:sp>
+        <p:nvSpPr>
+          <p:cNvPr id="931" name="Google Shape;931;p31"/>
+          <p:cNvSpPr txBox="1"/>
+          <p:nvPr/>
+        </p:nvSpPr>
+        <p:spPr>
+          <a:xfrm>
+            <a:off x="3453400" y="1996075"/>
+            <a:ext cx="2079900" cy="294900"/>
+          </a:xfrm>
+          <a:prstGeom prst="rect">
+            <a:avLst/>
+          </a:prstGeom>
+          <a:noFill/>
+          <a:ln>
+            <a:noFill/>
+          </a:ln>
+        </p:spPr>
+        <p:txBody>
+          <a:bodyPr spcFirstLastPara="1" wrap="square" lIns="91425" tIns="91425" rIns="91425" bIns="91425" anchor="ctr" anchorCtr="0">
+            <a:noAutofit/>
+          </a:bodyPr>
+          <a:lstStyle/>
+          <a:p>
+            <a:pPr lvl="0" algn="ctr"/>
+            <a:r>
+              <a:rPr lang="bg-BG" sz="1700" b="1" dirty="0" smtClean="0">
+                <a:solidFill>
+                  <a:srgbClr val="22C45E"/>
+                </a:solidFill>
+                <a:latin typeface="Montserrat" panose="00000500000000000000" pitchFamily="2" charset="-52"/>
+                <a:ea typeface="Fira Sans"/>
+                <a:cs typeface="Fira Sans"/>
+                <a:sym typeface="Fira Sans"/>
+              </a:rPr>
+              <a:t>Напомяния</a:t>
+            </a:r>
+            <a:endParaRPr sz="1700" b="1" dirty="0">
+              <a:solidFill>
+                <a:srgbClr val="22C45E"/>
+              </a:solidFill>
+              <a:latin typeface="Montserrat" panose="00000500000000000000" pitchFamily="2" charset="-52"/>
+              <a:ea typeface="Fira Sans"/>
+              <a:cs typeface="Fira Sans"/>
+              <a:sym typeface="Fira Sans"/>
+            </a:endParaRPr>
+          </a:p>
+        </p:txBody>
+      </p:sp>
+      <p:grpSp>
+        <p:nvGrpSpPr>
+          <p:cNvPr id="932" name="Google Shape;932;p31"/>
+          <p:cNvGrpSpPr/>
+          <p:nvPr/>
+        </p:nvGrpSpPr>
+        <p:grpSpPr>
+          <a:xfrm>
+            <a:off x="457188" y="1857852"/>
+            <a:ext cx="2079900" cy="1398486"/>
+            <a:chOff x="457188" y="1857852"/>
+            <a:chExt cx="2079900" cy="1398486"/>
+          </a:xfrm>
+        </p:grpSpPr>
+        <p:sp>
+          <p:nvSpPr>
+            <p:cNvPr id="933" name="Google Shape;933;p31"/>
+            <p:cNvSpPr/>
+            <p:nvPr/>
+          </p:nvSpPr>
+          <p:spPr>
+            <a:xfrm>
+              <a:off x="1057449" y="1857852"/>
+              <a:ext cx="879370" cy="969414"/>
+            </a:xfrm>
+            <a:custGeom>
+              <a:avLst/>
+              <a:gdLst/>
+              <a:ahLst/>
+              <a:cxnLst/>
+              <a:rect l="l" t="t" r="r" b="b"/>
+              <a:pathLst>
+                <a:path w="28630" h="31559" extrusionOk="0">
+                  <a:moveTo>
+                    <a:pt x="11895" y="634"/>
+                  </a:moveTo>
+                  <a:lnTo>
+                    <a:pt x="2215" y="6367"/>
+                  </a:lnTo>
+                  <a:lnTo>
+                    <a:pt x="1965" y="6519"/>
+                  </a:lnTo>
+                  <a:lnTo>
+                    <a:pt x="1500" y="6885"/>
+                  </a:lnTo>
+                  <a:lnTo>
+                    <a:pt x="1090" y="7305"/>
+                  </a:lnTo>
+                  <a:lnTo>
+                    <a:pt x="741" y="7769"/>
+                  </a:lnTo>
+                  <a:lnTo>
+                    <a:pt x="456" y="8278"/>
+                  </a:lnTo>
+                  <a:lnTo>
+                    <a:pt x="232" y="8814"/>
+                  </a:lnTo>
+                  <a:lnTo>
+                    <a:pt x="81" y="9377"/>
+                  </a:lnTo>
+                  <a:lnTo>
+                    <a:pt x="9" y="9957"/>
+                  </a:lnTo>
+                  <a:lnTo>
+                    <a:pt x="0" y="10261"/>
+                  </a:lnTo>
+                  <a:lnTo>
+                    <a:pt x="0" y="10261"/>
+                  </a:lnTo>
+                  <a:lnTo>
+                    <a:pt x="0" y="21477"/>
+                  </a:lnTo>
+                  <a:lnTo>
+                    <a:pt x="9" y="21780"/>
+                  </a:lnTo>
+                  <a:lnTo>
+                    <a:pt x="81" y="22370"/>
+                  </a:lnTo>
+                  <a:lnTo>
+                    <a:pt x="241" y="22941"/>
+                  </a:lnTo>
+                  <a:lnTo>
+                    <a:pt x="465" y="23486"/>
+                  </a:lnTo>
+                  <a:lnTo>
+                    <a:pt x="759" y="23995"/>
+                  </a:lnTo>
+                  <a:lnTo>
+                    <a:pt x="1116" y="24459"/>
+                  </a:lnTo>
+                  <a:lnTo>
+                    <a:pt x="1536" y="24879"/>
+                  </a:lnTo>
+                  <a:lnTo>
+                    <a:pt x="2009" y="25245"/>
+                  </a:lnTo>
+                  <a:lnTo>
+                    <a:pt x="2268" y="25406"/>
+                  </a:lnTo>
+                  <a:lnTo>
+                    <a:pt x="2268" y="25406"/>
+                  </a:lnTo>
+                  <a:lnTo>
+                    <a:pt x="11948" y="30960"/>
+                  </a:lnTo>
+                  <a:lnTo>
+                    <a:pt x="12216" y="31103"/>
+                  </a:lnTo>
+                  <a:lnTo>
+                    <a:pt x="12761" y="31326"/>
+                  </a:lnTo>
+                  <a:lnTo>
+                    <a:pt x="13324" y="31478"/>
+                  </a:lnTo>
+                  <a:lnTo>
+                    <a:pt x="13895" y="31550"/>
+                  </a:lnTo>
+                  <a:lnTo>
+                    <a:pt x="14476" y="31559"/>
+                  </a:lnTo>
+                  <a:lnTo>
+                    <a:pt x="15056" y="31487"/>
+                  </a:lnTo>
+                  <a:lnTo>
+                    <a:pt x="15619" y="31335"/>
+                  </a:lnTo>
+                  <a:lnTo>
+                    <a:pt x="16163" y="31121"/>
+                  </a:lnTo>
+                  <a:lnTo>
+                    <a:pt x="16431" y="30978"/>
+                  </a:lnTo>
+                  <a:lnTo>
+                    <a:pt x="16431" y="30978"/>
+                  </a:lnTo>
+                  <a:lnTo>
+                    <a:pt x="26326" y="25397"/>
+                  </a:lnTo>
+                  <a:lnTo>
+                    <a:pt x="26594" y="25245"/>
+                  </a:lnTo>
+                  <a:lnTo>
+                    <a:pt x="27067" y="24879"/>
+                  </a:lnTo>
+                  <a:lnTo>
+                    <a:pt x="27496" y="24459"/>
+                  </a:lnTo>
+                  <a:lnTo>
+                    <a:pt x="27862" y="23986"/>
+                  </a:lnTo>
+                  <a:lnTo>
+                    <a:pt x="28156" y="23477"/>
+                  </a:lnTo>
+                  <a:lnTo>
+                    <a:pt x="28389" y="22932"/>
+                  </a:lnTo>
+                  <a:lnTo>
+                    <a:pt x="28540" y="22352"/>
+                  </a:lnTo>
+                  <a:lnTo>
+                    <a:pt x="28621" y="21762"/>
+                  </a:lnTo>
+                  <a:lnTo>
+                    <a:pt x="28630" y="21450"/>
+                  </a:lnTo>
+                  <a:lnTo>
+                    <a:pt x="28630" y="21450"/>
+                  </a:lnTo>
+                  <a:lnTo>
+                    <a:pt x="28630" y="10287"/>
+                  </a:lnTo>
+                  <a:lnTo>
+                    <a:pt x="28621" y="9984"/>
+                  </a:lnTo>
+                  <a:lnTo>
+                    <a:pt x="28549" y="9394"/>
+                  </a:lnTo>
+                  <a:lnTo>
+                    <a:pt x="28397" y="8823"/>
+                  </a:lnTo>
+                  <a:lnTo>
+                    <a:pt x="28165" y="8287"/>
+                  </a:lnTo>
+                  <a:lnTo>
+                    <a:pt x="27880" y="7778"/>
+                  </a:lnTo>
+                  <a:lnTo>
+                    <a:pt x="27522" y="7314"/>
+                  </a:lnTo>
+                  <a:lnTo>
+                    <a:pt x="27112" y="6894"/>
+                  </a:lnTo>
+                  <a:lnTo>
+                    <a:pt x="26638" y="6528"/>
+                  </a:lnTo>
+                  <a:lnTo>
+                    <a:pt x="26379" y="6367"/>
+                  </a:lnTo>
+                  <a:lnTo>
+                    <a:pt x="26379" y="6367"/>
+                  </a:lnTo>
+                  <a:lnTo>
+                    <a:pt x="16485" y="607"/>
+                  </a:lnTo>
+                  <a:lnTo>
+                    <a:pt x="16217" y="465"/>
+                  </a:lnTo>
+                  <a:lnTo>
+                    <a:pt x="15663" y="232"/>
+                  </a:lnTo>
+                  <a:lnTo>
+                    <a:pt x="15083" y="81"/>
+                  </a:lnTo>
+                  <a:lnTo>
+                    <a:pt x="14502" y="0"/>
+                  </a:lnTo>
+                  <a:lnTo>
+                    <a:pt x="14208" y="0"/>
+                  </a:lnTo>
+                  <a:lnTo>
+                    <a:pt x="14208" y="0"/>
+                  </a:lnTo>
+                  <a:lnTo>
+                    <a:pt x="13904" y="0"/>
+                  </a:lnTo>
+                  <a:lnTo>
+                    <a:pt x="13315" y="81"/>
+                  </a:lnTo>
+                  <a:lnTo>
+                    <a:pt x="12725" y="241"/>
+                  </a:lnTo>
+                  <a:lnTo>
+                    <a:pt x="12163" y="482"/>
+                  </a:lnTo>
+                  <a:lnTo>
+                    <a:pt x="11895" y="634"/>
+                  </a:lnTo>
+                  <a:close/>
+                </a:path>
+              </a:pathLst>
+            </a:custGeom>
+            <a:solidFill>
+              <a:srgbClr val="1AAD7A"/>
+            </a:solidFill>
+            <a:ln>
+              <a:noFill/>
+            </a:ln>
+          </p:spPr>
+          <p:txBody>
+            <a:bodyPr spcFirstLastPara="1" wrap="square" lIns="91425" tIns="91425" rIns="91425" bIns="91425" anchor="ctr" anchorCtr="0">
+              <a:noAutofit/>
+            </a:bodyPr>
+            <a:lstStyle/>
+            <a:p>
+              <a:pPr marL="0" lvl="0" indent="0" algn="l" rtl="0">
+                <a:spcBef>
+                  <a:spcPts val="0"/>
+                </a:spcBef>
+                <a:spcAft>
+                  <a:spcPts val="0"/>
+                </a:spcAft>
+                <a:buNone/>
+              </a:pPr>
+              <a:endParaRPr>
+                <a:latin typeface="Montserrat" panose="00000500000000000000" pitchFamily="2" charset="-52"/>
+              </a:endParaRPr>
+            </a:p>
+          </p:txBody>
+        </p:sp>
+        <p:grpSp>
+          <p:nvGrpSpPr>
+            <p:cNvPr id="934" name="Google Shape;934;p31"/>
+            <p:cNvGrpSpPr/>
+            <p:nvPr/>
+          </p:nvGrpSpPr>
+          <p:grpSpPr>
+            <a:xfrm>
+              <a:off x="1313997" y="2162608"/>
+              <a:ext cx="366269" cy="359907"/>
+              <a:chOff x="-60988625" y="2310475"/>
+              <a:chExt cx="316650" cy="311150"/>
+            </a:xfrm>
+          </p:grpSpPr>
+          <p:sp>
+            <p:nvSpPr>
+              <p:cNvPr id="935" name="Google Shape;935;p31"/>
+              <p:cNvSpPr/>
+              <p:nvPr/>
+            </p:nvSpPr>
+            <p:spPr>
+              <a:xfrm>
+                <a:off x="-60988625" y="2310475"/>
+                <a:ext cx="311125" cy="311150"/>
+              </a:xfrm>
+              <a:custGeom>
+                <a:avLst/>
+                <a:gdLst/>
+                <a:ahLst/>
+                <a:cxnLst/>
+                <a:rect l="l" t="t" r="r" b="b"/>
+                <a:pathLst>
+                  <a:path w="12445" h="12446" extrusionOk="0">
+                    <a:moveTo>
+                      <a:pt x="7877" y="883"/>
+                    </a:moveTo>
+                    <a:cubicBezTo>
+                      <a:pt x="8097" y="883"/>
+                      <a:pt x="8318" y="1072"/>
+                      <a:pt x="8318" y="1324"/>
+                    </a:cubicBezTo>
+                    <a:lnTo>
+                      <a:pt x="8318" y="10398"/>
+                    </a:lnTo>
+                    <a:cubicBezTo>
+                      <a:pt x="8318" y="10870"/>
+                      <a:pt x="8444" y="11311"/>
+                      <a:pt x="8727" y="11626"/>
+                    </a:cubicBezTo>
+                    <a:lnTo>
+                      <a:pt x="2111" y="11626"/>
+                    </a:lnTo>
+                    <a:cubicBezTo>
+                      <a:pt x="1450" y="11626"/>
+                      <a:pt x="851" y="11091"/>
+                      <a:pt x="851" y="10398"/>
+                    </a:cubicBezTo>
+                    <a:lnTo>
+                      <a:pt x="851" y="1324"/>
+                    </a:lnTo>
+                    <a:lnTo>
+                      <a:pt x="820" y="1324"/>
+                    </a:lnTo>
+                    <a:cubicBezTo>
+                      <a:pt x="820" y="1072"/>
+                      <a:pt x="1009" y="883"/>
+                      <a:pt x="1261" y="883"/>
+                    </a:cubicBezTo>
+                    <a:close/>
+                    <a:moveTo>
+                      <a:pt x="11500" y="10807"/>
+                    </a:moveTo>
+                    <a:cubicBezTo>
+                      <a:pt x="11342" y="11280"/>
+                      <a:pt x="10870" y="11626"/>
+                      <a:pt x="10303" y="11626"/>
+                    </a:cubicBezTo>
+                    <a:cubicBezTo>
+                      <a:pt x="9767" y="11626"/>
+                      <a:pt x="9326" y="11280"/>
+                      <a:pt x="9137" y="10807"/>
+                    </a:cubicBezTo>
+                    <a:close/>
+                    <a:moveTo>
+                      <a:pt x="1261" y="1"/>
+                    </a:moveTo>
+                    <a:cubicBezTo>
+                      <a:pt x="568" y="1"/>
+                      <a:pt x="32" y="568"/>
+                      <a:pt x="32" y="1230"/>
+                    </a:cubicBezTo>
+                    <a:lnTo>
+                      <a:pt x="32" y="10334"/>
+                    </a:lnTo>
+                    <a:cubicBezTo>
+                      <a:pt x="0" y="11563"/>
+                      <a:pt x="946" y="12445"/>
+                      <a:pt x="2080" y="12445"/>
+                    </a:cubicBezTo>
+                    <a:lnTo>
+                      <a:pt x="10334" y="12445"/>
+                    </a:lnTo>
+                    <a:cubicBezTo>
+                      <a:pt x="11500" y="12445"/>
+                      <a:pt x="12445" y="11500"/>
+                      <a:pt x="12445" y="10366"/>
+                    </a:cubicBezTo>
+                    <a:cubicBezTo>
+                      <a:pt x="12445" y="10145"/>
+                      <a:pt x="12224" y="9925"/>
+                      <a:pt x="12004" y="9925"/>
+                    </a:cubicBezTo>
+                    <a:lnTo>
+                      <a:pt x="9074" y="9925"/>
+                    </a:lnTo>
+                    <a:lnTo>
+                      <a:pt x="9074" y="1230"/>
+                    </a:lnTo>
+                    <a:cubicBezTo>
+                      <a:pt x="9074" y="568"/>
+                      <a:pt x="8538" y="1"/>
+                      <a:pt x="7877" y="1"/>
+                    </a:cubicBezTo>
+                    <a:close/>
+                  </a:path>
+                </a:pathLst>
+              </a:custGeom>
+              <a:solidFill>
+                <a:srgbClr val="FFFFFF"/>
+              </a:solidFill>
+              <a:ln>
+                <a:noFill/>
+              </a:ln>
+            </p:spPr>
+            <p:txBody>
+              <a:bodyPr spcFirstLastPara="1" wrap="square" lIns="91425" tIns="91425" rIns="91425" bIns="91425" anchor="ctr" anchorCtr="0">
+                <a:noAutofit/>
+              </a:bodyPr>
+              <a:lstStyle/>
+              <a:p>
+                <a:pPr marL="0" lvl="0" indent="0" algn="l" rtl="0">
+                  <a:spcBef>
+                    <a:spcPts val="0"/>
+                  </a:spcBef>
+                  <a:spcAft>
+                    <a:spcPts val="0"/>
+                  </a:spcAft>
+                  <a:buNone/>
+                </a:pPr>
+                <a:endParaRPr>
+                  <a:latin typeface="Montserrat" panose="00000500000000000000" pitchFamily="2" charset="-52"/>
+                </a:endParaRPr>
+              </a:p>
+            </p:txBody>
+          </p:sp>
+          <p:sp>
+            <p:nvSpPr>
+              <p:cNvPr id="936" name="Google Shape;936;p31"/>
+              <p:cNvSpPr/>
+              <p:nvPr/>
+            </p:nvSpPr>
+            <p:spPr>
+              <a:xfrm>
+                <a:off x="-60947675" y="2353025"/>
+                <a:ext cx="145725" cy="20500"/>
+              </a:xfrm>
+              <a:custGeom>
+                <a:avLst/>
+                <a:gdLst/>
+                <a:ahLst/>
+                <a:cxnLst/>
+                <a:rect l="l" t="t" r="r" b="b"/>
+                <a:pathLst>
+                  <a:path w="5829" h="820" extrusionOk="0">
+                    <a:moveTo>
+                      <a:pt x="442" y="0"/>
+                    </a:moveTo>
+                    <a:cubicBezTo>
+                      <a:pt x="190" y="0"/>
+                      <a:pt x="1" y="189"/>
+                      <a:pt x="1" y="441"/>
+                    </a:cubicBezTo>
+                    <a:cubicBezTo>
+                      <a:pt x="1" y="630"/>
+                      <a:pt x="190" y="819"/>
+                      <a:pt x="442" y="819"/>
+                    </a:cubicBezTo>
+                    <a:lnTo>
+                      <a:pt x="5388" y="819"/>
+                    </a:lnTo>
+                    <a:cubicBezTo>
+                      <a:pt x="5640" y="819"/>
+                      <a:pt x="5829" y="630"/>
+                      <a:pt x="5829" y="441"/>
+                    </a:cubicBezTo>
+                    <a:cubicBezTo>
+                      <a:pt x="5829" y="189"/>
+                      <a:pt x="5640" y="0"/>
+                      <a:pt x="5388" y="0"/>
+                    </a:cubicBezTo>
+                    <a:close/>
+                  </a:path>
+                </a:pathLst>
+              </a:custGeom>
+              <a:solidFill>
+                <a:srgbClr val="FFFFFF"/>
+              </a:solidFill>
+              <a:ln>
+                <a:noFill/>
+              </a:ln>
+            </p:spPr>
+            <p:txBody>
+              <a:bodyPr spcFirstLastPara="1" wrap="square" lIns="91425" tIns="91425" rIns="91425" bIns="91425" anchor="ctr" anchorCtr="0">
+                <a:noAutofit/>
+              </a:bodyPr>
+              <a:lstStyle/>
+              <a:p>
+                <a:pPr marL="0" lvl="0" indent="0" algn="l" rtl="0">
+                  <a:spcBef>
+                    <a:spcPts val="0"/>
+                  </a:spcBef>
+                  <a:spcAft>
+                    <a:spcPts val="0"/>
+                  </a:spcAft>
+                  <a:buNone/>
+                </a:pPr>
+                <a:endParaRPr>
+                  <a:latin typeface="Montserrat" panose="00000500000000000000" pitchFamily="2" charset="-52"/>
+                </a:endParaRPr>
+              </a:p>
+            </p:txBody>
+          </p:sp>
+          <p:sp>
+            <p:nvSpPr>
+              <p:cNvPr id="937" name="Google Shape;937;p31"/>
+              <p:cNvSpPr/>
+              <p:nvPr/>
+            </p:nvSpPr>
+            <p:spPr>
+              <a:xfrm>
+                <a:off x="-60947675" y="2415250"/>
+                <a:ext cx="145725" cy="20500"/>
+              </a:xfrm>
+              <a:custGeom>
+                <a:avLst/>
+                <a:gdLst/>
+                <a:ahLst/>
+                <a:cxnLst/>
+                <a:rect l="l" t="t" r="r" b="b"/>
+                <a:pathLst>
+                  <a:path w="5829" h="820" extrusionOk="0">
+                    <a:moveTo>
+                      <a:pt x="442" y="0"/>
+                    </a:moveTo>
+                    <a:cubicBezTo>
+                      <a:pt x="190" y="0"/>
+                      <a:pt x="1" y="189"/>
+                      <a:pt x="1" y="378"/>
+                    </a:cubicBezTo>
+                    <a:cubicBezTo>
+                      <a:pt x="1" y="630"/>
+                      <a:pt x="190" y="819"/>
+                      <a:pt x="442" y="819"/>
+                    </a:cubicBezTo>
+                    <a:lnTo>
+                      <a:pt x="5388" y="819"/>
+                    </a:lnTo>
+                    <a:cubicBezTo>
+                      <a:pt x="5640" y="819"/>
+                      <a:pt x="5829" y="630"/>
+                      <a:pt x="5829" y="378"/>
+                    </a:cubicBezTo>
+                    <a:cubicBezTo>
+                      <a:pt x="5829" y="158"/>
+                      <a:pt x="5640" y="0"/>
+                      <a:pt x="5388" y="0"/>
+                    </a:cubicBezTo>
+                    <a:close/>
+                  </a:path>
+                </a:pathLst>
+              </a:custGeom>
+              <a:solidFill>
+                <a:srgbClr val="FFFFFF"/>
+              </a:solidFill>
+              <a:ln>
+                <a:noFill/>
+              </a:ln>
+            </p:spPr>
+            <p:txBody>
+              <a:bodyPr spcFirstLastPara="1" wrap="square" lIns="91425" tIns="91425" rIns="91425" bIns="91425" anchor="ctr" anchorCtr="0">
+                <a:noAutofit/>
+              </a:bodyPr>
+              <a:lstStyle/>
+              <a:p>
+                <a:pPr marL="0" lvl="0" indent="0" algn="l" rtl="0">
+                  <a:spcBef>
+                    <a:spcPts val="0"/>
+                  </a:spcBef>
+                  <a:spcAft>
+                    <a:spcPts val="0"/>
+                  </a:spcAft>
+                  <a:buNone/>
+                </a:pPr>
+                <a:endParaRPr>
+                  <a:latin typeface="Montserrat" panose="00000500000000000000" pitchFamily="2" charset="-52"/>
+                </a:endParaRPr>
+              </a:p>
+            </p:txBody>
+          </p:sp>
+          <p:sp>
+            <p:nvSpPr>
+              <p:cNvPr id="938" name="Google Shape;938;p31"/>
+              <p:cNvSpPr/>
+              <p:nvPr/>
+            </p:nvSpPr>
+            <p:spPr>
+              <a:xfrm>
+                <a:off x="-60947675" y="2475875"/>
+                <a:ext cx="145725" cy="22100"/>
+              </a:xfrm>
+              <a:custGeom>
+                <a:avLst/>
+                <a:gdLst/>
+                <a:ahLst/>
+                <a:cxnLst/>
+                <a:rect l="l" t="t" r="r" b="b"/>
+                <a:pathLst>
+                  <a:path w="5829" h="884" extrusionOk="0">
+                    <a:moveTo>
+                      <a:pt x="442" y="1"/>
+                    </a:moveTo>
+                    <a:cubicBezTo>
+                      <a:pt x="190" y="1"/>
+                      <a:pt x="1" y="221"/>
+                      <a:pt x="1" y="442"/>
+                    </a:cubicBezTo>
+                    <a:cubicBezTo>
+                      <a:pt x="1" y="694"/>
+                      <a:pt x="190" y="883"/>
+                      <a:pt x="442" y="883"/>
+                    </a:cubicBezTo>
+                    <a:lnTo>
+                      <a:pt x="5388" y="883"/>
+                    </a:lnTo>
+                    <a:cubicBezTo>
+                      <a:pt x="5640" y="883"/>
+                      <a:pt x="5829" y="694"/>
+                      <a:pt x="5829" y="442"/>
+                    </a:cubicBezTo>
+                    <a:cubicBezTo>
+                      <a:pt x="5829" y="221"/>
+                      <a:pt x="5640" y="1"/>
+                      <a:pt x="5388" y="1"/>
+                    </a:cubicBezTo>
+                    <a:close/>
+                  </a:path>
+                </a:pathLst>
+              </a:custGeom>
+              <a:solidFill>
+                <a:srgbClr val="FFFFFF"/>
+              </a:solidFill>
+              <a:ln>
+                <a:noFill/>
+              </a:ln>
+            </p:spPr>
+            <p:txBody>
+              <a:bodyPr spcFirstLastPara="1" wrap="square" lIns="91425" tIns="91425" rIns="91425" bIns="91425" anchor="ctr" anchorCtr="0">
+                <a:noAutofit/>
+              </a:bodyPr>
+              <a:lstStyle/>
+              <a:p>
+                <a:pPr marL="0" lvl="0" indent="0" algn="l" rtl="0">
+                  <a:spcBef>
+                    <a:spcPts val="0"/>
+                  </a:spcBef>
+                  <a:spcAft>
+                    <a:spcPts val="0"/>
+                  </a:spcAft>
+                  <a:buNone/>
+                </a:pPr>
+                <a:endParaRPr>
+                  <a:latin typeface="Montserrat" panose="00000500000000000000" pitchFamily="2" charset="-52"/>
+                </a:endParaRPr>
+              </a:p>
+            </p:txBody>
+          </p:sp>
+          <p:sp>
+            <p:nvSpPr>
+              <p:cNvPr id="939" name="Google Shape;939;p31"/>
+              <p:cNvSpPr/>
+              <p:nvPr/>
+            </p:nvSpPr>
+            <p:spPr>
+              <a:xfrm>
+                <a:off x="-60947675" y="2538100"/>
+                <a:ext cx="145725" cy="22075"/>
+              </a:xfrm>
+              <a:custGeom>
+                <a:avLst/>
+                <a:gdLst/>
+                <a:ahLst/>
+                <a:cxnLst/>
+                <a:rect l="l" t="t" r="r" b="b"/>
+                <a:pathLst>
+                  <a:path w="5829" h="883" extrusionOk="0">
+                    <a:moveTo>
+                      <a:pt x="442" y="1"/>
+                    </a:moveTo>
+                    <a:cubicBezTo>
+                      <a:pt x="190" y="1"/>
+                      <a:pt x="1" y="190"/>
+                      <a:pt x="1" y="442"/>
+                    </a:cubicBezTo>
+                    <a:cubicBezTo>
+                      <a:pt x="1" y="662"/>
+                      <a:pt x="190" y="883"/>
+                      <a:pt x="442" y="883"/>
+                    </a:cubicBezTo>
+                    <a:lnTo>
+                      <a:pt x="5388" y="883"/>
+                    </a:lnTo>
+                    <a:cubicBezTo>
+                      <a:pt x="5640" y="883"/>
+                      <a:pt x="5829" y="662"/>
+                      <a:pt x="5829" y="442"/>
+                    </a:cubicBezTo>
+                    <a:cubicBezTo>
+                      <a:pt x="5829" y="190"/>
+                      <a:pt x="5640" y="1"/>
+                      <a:pt x="5388" y="1"/>
+                    </a:cubicBezTo>
+                    <a:close/>
+                  </a:path>
+                </a:pathLst>
+              </a:custGeom>
+              <a:solidFill>
+                <a:srgbClr val="FFFFFF"/>
+              </a:solidFill>
+              <a:ln>
+                <a:noFill/>
+              </a:ln>
+            </p:spPr>
+            <p:txBody>
+              <a:bodyPr spcFirstLastPara="1" wrap="square" lIns="91425" tIns="91425" rIns="91425" bIns="91425" anchor="ctr" anchorCtr="0">
+                <a:noAutofit/>
+              </a:bodyPr>
+              <a:lstStyle/>
+              <a:p>
+                <a:pPr marL="0" lvl="0" indent="0" algn="l" rtl="0">
+                  <a:spcBef>
+                    <a:spcPts val="0"/>
+                  </a:spcBef>
+                  <a:spcAft>
+                    <a:spcPts val="0"/>
+                  </a:spcAft>
+                  <a:buNone/>
+                </a:pPr>
+                <a:endParaRPr>
+                  <a:latin typeface="Montserrat" panose="00000500000000000000" pitchFamily="2" charset="-52"/>
+                </a:endParaRPr>
+              </a:p>
+            </p:txBody>
+          </p:sp>
+          <p:sp>
+            <p:nvSpPr>
+              <p:cNvPr id="940" name="Google Shape;940;p31"/>
+              <p:cNvSpPr/>
+              <p:nvPr/>
+            </p:nvSpPr>
+            <p:spPr>
+              <a:xfrm>
+                <a:off x="-60740525" y="2312050"/>
+                <a:ext cx="68550" cy="233950"/>
+              </a:xfrm>
+              <a:custGeom>
+                <a:avLst/>
+                <a:gdLst/>
+                <a:ahLst/>
+                <a:cxnLst/>
+                <a:rect l="l" t="t" r="r" b="b"/>
+                <a:pathLst>
+                  <a:path w="2742" h="9358" extrusionOk="0">
+                    <a:moveTo>
+                      <a:pt x="1796" y="789"/>
+                    </a:moveTo>
+                    <a:cubicBezTo>
+                      <a:pt x="1891" y="789"/>
+                      <a:pt x="1922" y="852"/>
+                      <a:pt x="1922" y="946"/>
+                    </a:cubicBezTo>
+                    <a:lnTo>
+                      <a:pt x="1922" y="1639"/>
+                    </a:lnTo>
+                    <a:lnTo>
+                      <a:pt x="820" y="1639"/>
+                    </a:lnTo>
+                    <a:lnTo>
+                      <a:pt x="820" y="946"/>
+                    </a:lnTo>
+                    <a:cubicBezTo>
+                      <a:pt x="820" y="852"/>
+                      <a:pt x="883" y="789"/>
+                      <a:pt x="977" y="789"/>
+                    </a:cubicBezTo>
+                    <a:close/>
+                    <a:moveTo>
+                      <a:pt x="1922" y="2458"/>
+                    </a:moveTo>
+                    <a:lnTo>
+                      <a:pt x="1922" y="6617"/>
+                    </a:lnTo>
+                    <a:lnTo>
+                      <a:pt x="820" y="6617"/>
+                    </a:lnTo>
+                    <a:lnTo>
+                      <a:pt x="820" y="2458"/>
+                    </a:lnTo>
+                    <a:close/>
+                    <a:moveTo>
+                      <a:pt x="1639" y="7436"/>
+                    </a:moveTo>
+                    <a:lnTo>
+                      <a:pt x="1355" y="8035"/>
+                    </a:lnTo>
+                    <a:lnTo>
+                      <a:pt x="1040" y="7436"/>
+                    </a:lnTo>
+                    <a:close/>
+                    <a:moveTo>
+                      <a:pt x="977" y="1"/>
+                    </a:moveTo>
+                    <a:cubicBezTo>
+                      <a:pt x="410" y="1"/>
+                      <a:pt x="1" y="410"/>
+                      <a:pt x="1" y="946"/>
+                    </a:cubicBezTo>
+                    <a:lnTo>
+                      <a:pt x="1" y="6995"/>
+                    </a:lnTo>
+                    <a:cubicBezTo>
+                      <a:pt x="1" y="7090"/>
+                      <a:pt x="1" y="7121"/>
+                      <a:pt x="32" y="7184"/>
+                    </a:cubicBezTo>
+                    <a:lnTo>
+                      <a:pt x="1009" y="9137"/>
+                    </a:lnTo>
+                    <a:cubicBezTo>
+                      <a:pt x="1103" y="9295"/>
+                      <a:pt x="1198" y="9358"/>
+                      <a:pt x="1355" y="9358"/>
+                    </a:cubicBezTo>
+                    <a:cubicBezTo>
+                      <a:pt x="1513" y="9358"/>
+                      <a:pt x="1670" y="9295"/>
+                      <a:pt x="1733" y="9137"/>
+                    </a:cubicBezTo>
+                    <a:lnTo>
+                      <a:pt x="2678" y="7184"/>
+                    </a:lnTo>
+                    <a:cubicBezTo>
+                      <a:pt x="2710" y="7153"/>
+                      <a:pt x="2710" y="7090"/>
+                      <a:pt x="2710" y="6995"/>
+                    </a:cubicBezTo>
+                    <a:lnTo>
+                      <a:pt x="2710" y="946"/>
+                    </a:lnTo>
+                    <a:cubicBezTo>
+                      <a:pt x="2741" y="410"/>
+                      <a:pt x="2300" y="1"/>
+                      <a:pt x="1796" y="1"/>
+                    </a:cubicBezTo>
+                    <a:close/>
+                  </a:path>
+                </a:pathLst>
+              </a:custGeom>
+              <a:solidFill>
+                <a:srgbClr val="FFFFFF"/>
+              </a:solidFill>
+              <a:ln>
+                <a:noFill/>
+              </a:ln>
+            </p:spPr>
+            <p:txBody>
+              <a:bodyPr spcFirstLastPara="1" wrap="square" lIns="91425" tIns="91425" rIns="91425" bIns="91425" anchor="ctr" anchorCtr="0">
+                <a:noAutofit/>
+              </a:bodyPr>
+              <a:lstStyle/>
+              <a:p>
+                <a:pPr marL="0" lvl="0" indent="0" algn="l" rtl="0">
+                  <a:spcBef>
+                    <a:spcPts val="0"/>
+                  </a:spcBef>
+                  <a:spcAft>
+                    <a:spcPts val="0"/>
+                  </a:spcAft>
+                  <a:buNone/>
+                </a:pPr>
+                <a:endParaRPr>
+                  <a:latin typeface="Montserrat" panose="00000500000000000000" pitchFamily="2" charset="-52"/>
+                </a:endParaRPr>
+              </a:p>
+            </p:txBody>
+          </p:sp>
+        </p:grpSp>
+        <p:sp>
+          <p:nvSpPr>
+            <p:cNvPr id="941" name="Google Shape;941;p31"/>
+            <p:cNvSpPr txBox="1"/>
+            <p:nvPr/>
+          </p:nvSpPr>
+          <p:spPr>
+            <a:xfrm>
+              <a:off x="457188" y="2961438"/>
+              <a:ext cx="2079900" cy="294900"/>
+            </a:xfrm>
+            <a:prstGeom prst="rect">
+              <a:avLst/>
+            </a:prstGeom>
+            <a:noFill/>
+            <a:ln>
+              <a:noFill/>
+            </a:ln>
+          </p:spPr>
+          <p:txBody>
+            <a:bodyPr spcFirstLastPara="1" wrap="square" lIns="91425" tIns="91425" rIns="91425" bIns="91425" anchor="ctr" anchorCtr="0">
+              <a:noAutofit/>
+            </a:bodyPr>
+            <a:lstStyle/>
+            <a:p>
+              <a:pPr marL="0" lvl="0" indent="0" algn="ctr" rtl="0">
+                <a:spcBef>
+                  <a:spcPts val="0"/>
+                </a:spcBef>
+                <a:spcAft>
+                  <a:spcPts val="0"/>
+                </a:spcAft>
+                <a:buNone/>
+              </a:pPr>
+              <a:r>
+                <a:rPr lang="bg-BG" sz="1700" b="1" dirty="0" smtClean="0">
+                  <a:solidFill>
+                    <a:srgbClr val="1AAD7A"/>
+                  </a:solidFill>
+                  <a:latin typeface="Montserrat" panose="00000500000000000000" pitchFamily="2" charset="-52"/>
+                  <a:ea typeface="Fira Sans"/>
+                  <a:cs typeface="Fira Sans"/>
+                  <a:sym typeface="Fira Sans"/>
+                </a:rPr>
+                <a:t>Известия</a:t>
+              </a:r>
+              <a:endParaRPr sz="1700" b="1" dirty="0">
+                <a:solidFill>
+                  <a:srgbClr val="1AAD7A"/>
+                </a:solidFill>
+                <a:latin typeface="Montserrat" panose="00000500000000000000" pitchFamily="2" charset="-52"/>
+                <a:ea typeface="Fira Sans"/>
+                <a:cs typeface="Fira Sans"/>
+                <a:sym typeface="Fira Sans"/>
+              </a:endParaRPr>
+            </a:p>
+          </p:txBody>
+        </p:sp>
+      </p:grpSp>
+      <p:grpSp>
+        <p:nvGrpSpPr>
+          <p:cNvPr id="942" name="Google Shape;942;p31"/>
+          <p:cNvGrpSpPr/>
+          <p:nvPr/>
+        </p:nvGrpSpPr>
+        <p:grpSpPr>
+          <a:xfrm>
+            <a:off x="6605549" y="1658763"/>
+            <a:ext cx="2242421" cy="1544456"/>
+            <a:chOff x="6605537" y="1711882"/>
+            <a:chExt cx="2079900" cy="1544456"/>
+          </a:xfrm>
+        </p:grpSpPr>
+        <p:sp>
+          <p:nvSpPr>
+            <p:cNvPr id="943" name="Google Shape;943;p31"/>
+            <p:cNvSpPr/>
+            <p:nvPr/>
+          </p:nvSpPr>
+          <p:spPr>
+            <a:xfrm>
+              <a:off x="7205802" y="1711882"/>
+              <a:ext cx="879370" cy="969523"/>
+            </a:xfrm>
+            <a:custGeom>
+              <a:avLst/>
+              <a:gdLst/>
+              <a:ahLst/>
+              <a:cxnLst/>
+              <a:rect l="l" t="t" r="r" b="b"/>
+              <a:pathLst>
+                <a:path w="28630" h="31560" extrusionOk="0">
+                  <a:moveTo>
+                    <a:pt x="11895" y="635"/>
+                  </a:moveTo>
+                  <a:lnTo>
+                    <a:pt x="2215" y="6368"/>
+                  </a:lnTo>
+                  <a:lnTo>
+                    <a:pt x="1965" y="6520"/>
+                  </a:lnTo>
+                  <a:lnTo>
+                    <a:pt x="1501" y="6886"/>
+                  </a:lnTo>
+                  <a:lnTo>
+                    <a:pt x="1090" y="7305"/>
+                  </a:lnTo>
+                  <a:lnTo>
+                    <a:pt x="741" y="7770"/>
+                  </a:lnTo>
+                  <a:lnTo>
+                    <a:pt x="456" y="8270"/>
+                  </a:lnTo>
+                  <a:lnTo>
+                    <a:pt x="232" y="8815"/>
+                  </a:lnTo>
+                  <a:lnTo>
+                    <a:pt x="81" y="9377"/>
+                  </a:lnTo>
+                  <a:lnTo>
+                    <a:pt x="0" y="9958"/>
+                  </a:lnTo>
+                  <a:lnTo>
+                    <a:pt x="0" y="10261"/>
+                  </a:lnTo>
+                  <a:lnTo>
+                    <a:pt x="0" y="10261"/>
+                  </a:lnTo>
+                  <a:lnTo>
+                    <a:pt x="0" y="21477"/>
+                  </a:lnTo>
+                  <a:lnTo>
+                    <a:pt x="0" y="21781"/>
+                  </a:lnTo>
+                  <a:lnTo>
+                    <a:pt x="81" y="22370"/>
+                  </a:lnTo>
+                  <a:lnTo>
+                    <a:pt x="241" y="22942"/>
+                  </a:lnTo>
+                  <a:lnTo>
+                    <a:pt x="465" y="23486"/>
+                  </a:lnTo>
+                  <a:lnTo>
+                    <a:pt x="759" y="23995"/>
+                  </a:lnTo>
+                  <a:lnTo>
+                    <a:pt x="1117" y="24460"/>
+                  </a:lnTo>
+                  <a:lnTo>
+                    <a:pt x="1536" y="24879"/>
+                  </a:lnTo>
+                  <a:lnTo>
+                    <a:pt x="2010" y="25246"/>
+                  </a:lnTo>
+                  <a:lnTo>
+                    <a:pt x="2269" y="25406"/>
+                  </a:lnTo>
+                  <a:lnTo>
+                    <a:pt x="2269" y="25406"/>
+                  </a:lnTo>
+                  <a:lnTo>
+                    <a:pt x="11949" y="30961"/>
+                  </a:lnTo>
+                  <a:lnTo>
+                    <a:pt x="12208" y="31104"/>
+                  </a:lnTo>
+                  <a:lnTo>
+                    <a:pt x="12752" y="31327"/>
+                  </a:lnTo>
+                  <a:lnTo>
+                    <a:pt x="13324" y="31479"/>
+                  </a:lnTo>
+                  <a:lnTo>
+                    <a:pt x="13895" y="31550"/>
+                  </a:lnTo>
+                  <a:lnTo>
+                    <a:pt x="14476" y="31559"/>
+                  </a:lnTo>
+                  <a:lnTo>
+                    <a:pt x="15047" y="31488"/>
+                  </a:lnTo>
+                  <a:lnTo>
+                    <a:pt x="15619" y="31336"/>
+                  </a:lnTo>
+                  <a:lnTo>
+                    <a:pt x="16164" y="31122"/>
+                  </a:lnTo>
+                  <a:lnTo>
+                    <a:pt x="16423" y="30979"/>
+                  </a:lnTo>
+                  <a:lnTo>
+                    <a:pt x="16423" y="30979"/>
+                  </a:lnTo>
+                  <a:lnTo>
+                    <a:pt x="26326" y="25397"/>
+                  </a:lnTo>
+                  <a:lnTo>
+                    <a:pt x="26585" y="25246"/>
+                  </a:lnTo>
+                  <a:lnTo>
+                    <a:pt x="27067" y="24879"/>
+                  </a:lnTo>
+                  <a:lnTo>
+                    <a:pt x="27496" y="24460"/>
+                  </a:lnTo>
+                  <a:lnTo>
+                    <a:pt x="27853" y="23986"/>
+                  </a:lnTo>
+                  <a:lnTo>
+                    <a:pt x="28156" y="23477"/>
+                  </a:lnTo>
+                  <a:lnTo>
+                    <a:pt x="28389" y="22933"/>
+                  </a:lnTo>
+                  <a:lnTo>
+                    <a:pt x="28540" y="22352"/>
+                  </a:lnTo>
+                  <a:lnTo>
+                    <a:pt x="28621" y="21763"/>
+                  </a:lnTo>
+                  <a:lnTo>
+                    <a:pt x="28630" y="21450"/>
+                  </a:lnTo>
+                  <a:lnTo>
+                    <a:pt x="28630" y="21450"/>
+                  </a:lnTo>
+                  <a:lnTo>
+                    <a:pt x="28630" y="10288"/>
+                  </a:lnTo>
+                  <a:lnTo>
+                    <a:pt x="28621" y="9984"/>
+                  </a:lnTo>
+                  <a:lnTo>
+                    <a:pt x="28549" y="9395"/>
+                  </a:lnTo>
+                  <a:lnTo>
+                    <a:pt x="28389" y="8823"/>
+                  </a:lnTo>
+                  <a:lnTo>
+                    <a:pt x="28165" y="8288"/>
+                  </a:lnTo>
+                  <a:lnTo>
+                    <a:pt x="27880" y="7779"/>
+                  </a:lnTo>
+                  <a:lnTo>
+                    <a:pt x="27522" y="7314"/>
+                  </a:lnTo>
+                  <a:lnTo>
+                    <a:pt x="27103" y="6895"/>
+                  </a:lnTo>
+                  <a:lnTo>
+                    <a:pt x="26638" y="6528"/>
+                  </a:lnTo>
+                  <a:lnTo>
+                    <a:pt x="26379" y="6368"/>
+                  </a:lnTo>
+                  <a:lnTo>
+                    <a:pt x="26379" y="6368"/>
+                  </a:lnTo>
+                  <a:lnTo>
+                    <a:pt x="16485" y="608"/>
+                  </a:lnTo>
+                  <a:lnTo>
+                    <a:pt x="16217" y="465"/>
+                  </a:lnTo>
+                  <a:lnTo>
+                    <a:pt x="15663" y="233"/>
+                  </a:lnTo>
+                  <a:lnTo>
+                    <a:pt x="15083" y="81"/>
+                  </a:lnTo>
+                  <a:lnTo>
+                    <a:pt x="14503" y="1"/>
+                  </a:lnTo>
+                  <a:lnTo>
+                    <a:pt x="14208" y="1"/>
+                  </a:lnTo>
+                  <a:lnTo>
+                    <a:pt x="14208" y="1"/>
+                  </a:lnTo>
+                  <a:lnTo>
+                    <a:pt x="13904" y="1"/>
+                  </a:lnTo>
+                  <a:lnTo>
+                    <a:pt x="13306" y="81"/>
+                  </a:lnTo>
+                  <a:lnTo>
+                    <a:pt x="12726" y="242"/>
+                  </a:lnTo>
+                  <a:lnTo>
+                    <a:pt x="12163" y="483"/>
+                  </a:lnTo>
+                  <a:lnTo>
+                    <a:pt x="11895" y="635"/>
+                  </a:lnTo>
+                  <a:close/>
+                </a:path>
+              </a:pathLst>
+            </a:custGeom>
+            <a:solidFill>
+              <a:srgbClr val="5EB2FC"/>
+            </a:solidFill>
+            <a:ln>
+              <a:noFill/>
+            </a:ln>
+          </p:spPr>
+          <p:txBody>
+            <a:bodyPr spcFirstLastPara="1" wrap="square" lIns="91425" tIns="91425" rIns="91425" bIns="91425" anchor="ctr" anchorCtr="0">
+              <a:noAutofit/>
+            </a:bodyPr>
+            <a:lstStyle/>
+            <a:p>
+              <a:pPr marL="0" lvl="0" indent="0" algn="l" rtl="0">
+                <a:spcBef>
+                  <a:spcPts val="0"/>
+                </a:spcBef>
+                <a:spcAft>
+                  <a:spcPts val="0"/>
+                </a:spcAft>
+                <a:buNone/>
+              </a:pPr>
+              <a:endParaRPr>
+                <a:latin typeface="Montserrat" panose="00000500000000000000" pitchFamily="2" charset="-52"/>
+              </a:endParaRPr>
+            </a:p>
+          </p:txBody>
+        </p:sp>
+        <p:grpSp>
+          <p:nvGrpSpPr>
+            <p:cNvPr id="944" name="Google Shape;944;p31"/>
+            <p:cNvGrpSpPr/>
+            <p:nvPr/>
+          </p:nvGrpSpPr>
+          <p:grpSpPr>
+            <a:xfrm>
+              <a:off x="7464798" y="2072008"/>
+              <a:ext cx="365344" cy="289753"/>
+              <a:chOff x="-62882850" y="1817236"/>
+              <a:chExt cx="315850" cy="250500"/>
+            </a:xfrm>
+          </p:grpSpPr>
+          <p:sp>
+            <p:nvSpPr>
+              <p:cNvPr id="945" name="Google Shape;945;p31"/>
+              <p:cNvSpPr/>
+              <p:nvPr/>
+            </p:nvSpPr>
+            <p:spPr>
+              <a:xfrm>
+                <a:off x="-62882850" y="1817236"/>
+                <a:ext cx="315850" cy="250500"/>
+              </a:xfrm>
+              <a:custGeom>
+                <a:avLst/>
+                <a:gdLst/>
+                <a:ahLst/>
+                <a:cxnLst/>
+                <a:rect l="l" t="t" r="r" b="b"/>
+                <a:pathLst>
+                  <a:path w="12634" h="10020" extrusionOk="0">
+                    <a:moveTo>
+                      <a:pt x="10586" y="851"/>
+                    </a:moveTo>
+                    <a:cubicBezTo>
+                      <a:pt x="10838" y="851"/>
+                      <a:pt x="11027" y="1040"/>
+                      <a:pt x="11027" y="1261"/>
+                    </a:cubicBezTo>
+                    <a:lnTo>
+                      <a:pt x="11027" y="7499"/>
+                    </a:lnTo>
+                    <a:lnTo>
+                      <a:pt x="1638" y="7499"/>
+                    </a:lnTo>
+                    <a:lnTo>
+                      <a:pt x="1638" y="1261"/>
+                    </a:lnTo>
+                    <a:lnTo>
+                      <a:pt x="1607" y="1261"/>
+                    </a:lnTo>
+                    <a:cubicBezTo>
+                      <a:pt x="1607" y="1040"/>
+                      <a:pt x="1796" y="851"/>
+                      <a:pt x="2048" y="851"/>
+                    </a:cubicBezTo>
+                    <a:close/>
+                    <a:moveTo>
+                      <a:pt x="11814" y="8318"/>
+                    </a:moveTo>
+                    <a:lnTo>
+                      <a:pt x="11814" y="8727"/>
+                    </a:lnTo>
+                    <a:cubicBezTo>
+                      <a:pt x="11814" y="8948"/>
+                      <a:pt x="11594" y="9137"/>
+                      <a:pt x="11405" y="9137"/>
+                    </a:cubicBezTo>
+                    <a:lnTo>
+                      <a:pt x="1197" y="9137"/>
+                    </a:lnTo>
+                    <a:cubicBezTo>
+                      <a:pt x="977" y="9137"/>
+                      <a:pt x="788" y="8948"/>
+                      <a:pt x="788" y="8727"/>
+                    </a:cubicBezTo>
+                    <a:lnTo>
+                      <a:pt x="788" y="8318"/>
+                    </a:lnTo>
+                    <a:close/>
+                    <a:moveTo>
+                      <a:pt x="2048" y="1"/>
+                    </a:moveTo>
+                    <a:cubicBezTo>
+                      <a:pt x="1355" y="1"/>
+                      <a:pt x="788" y="568"/>
+                      <a:pt x="788" y="1261"/>
+                    </a:cubicBezTo>
+                    <a:lnTo>
+                      <a:pt x="788" y="7499"/>
+                    </a:lnTo>
+                    <a:lnTo>
+                      <a:pt x="378" y="7499"/>
+                    </a:lnTo>
+                    <a:cubicBezTo>
+                      <a:pt x="158" y="7499"/>
+                      <a:pt x="0" y="7688"/>
+                      <a:pt x="0" y="7940"/>
+                    </a:cubicBezTo>
+                    <a:lnTo>
+                      <a:pt x="0" y="8759"/>
+                    </a:lnTo>
+                    <a:cubicBezTo>
+                      <a:pt x="0" y="9420"/>
+                      <a:pt x="536" y="10019"/>
+                      <a:pt x="1197" y="10019"/>
+                    </a:cubicBezTo>
+                    <a:lnTo>
+                      <a:pt x="11405" y="10019"/>
+                    </a:lnTo>
+                    <a:cubicBezTo>
+                      <a:pt x="12066" y="10019"/>
+                      <a:pt x="12634" y="9452"/>
+                      <a:pt x="12634" y="8759"/>
+                    </a:cubicBezTo>
+                    <a:lnTo>
+                      <a:pt x="12634" y="7940"/>
+                    </a:lnTo>
+                    <a:cubicBezTo>
+                      <a:pt x="12634" y="7656"/>
+                      <a:pt x="12444" y="7499"/>
+                      <a:pt x="12224" y="7499"/>
+                    </a:cubicBezTo>
+                    <a:lnTo>
+                      <a:pt x="11814" y="7499"/>
+                    </a:lnTo>
+                    <a:lnTo>
+                      <a:pt x="11814" y="1261"/>
+                    </a:lnTo>
+                    <a:cubicBezTo>
+                      <a:pt x="11814" y="599"/>
+                      <a:pt x="11247" y="1"/>
+                      <a:pt x="10586" y="1"/>
+                    </a:cubicBezTo>
+                    <a:close/>
+                  </a:path>
+                </a:pathLst>
+              </a:custGeom>
+              <a:solidFill>
+                <a:srgbClr val="FFFFFF"/>
+              </a:solidFill>
+              <a:ln>
+                <a:noFill/>
+              </a:ln>
+            </p:spPr>
+            <p:txBody>
+              <a:bodyPr spcFirstLastPara="1" wrap="square" lIns="91425" tIns="91425" rIns="91425" bIns="91425" anchor="ctr" anchorCtr="0">
+                <a:noAutofit/>
+              </a:bodyPr>
+              <a:lstStyle/>
+              <a:p>
+                <a:pPr marL="0" lvl="0" indent="0" algn="l" rtl="0">
+                  <a:spcBef>
+                    <a:spcPts val="0"/>
+                  </a:spcBef>
+                  <a:spcAft>
+                    <a:spcPts val="0"/>
+                  </a:spcAft>
+                  <a:buNone/>
+                </a:pPr>
+                <a:endParaRPr>
+                  <a:latin typeface="Montserrat" panose="00000500000000000000" pitchFamily="2" charset="-52"/>
+                </a:endParaRPr>
+              </a:p>
+            </p:txBody>
+          </p:sp>
+          <p:sp>
+            <p:nvSpPr>
+              <p:cNvPr id="946" name="Google Shape;946;p31"/>
+              <p:cNvSpPr/>
+              <p:nvPr/>
+            </p:nvSpPr>
+            <p:spPr>
+              <a:xfrm>
+                <a:off x="-62806475" y="1880236"/>
+                <a:ext cx="146525" cy="103800"/>
+              </a:xfrm>
+              <a:custGeom>
+                <a:avLst/>
+                <a:gdLst/>
+                <a:ahLst/>
+                <a:cxnLst/>
+                <a:rect l="l" t="t" r="r" b="b"/>
+                <a:pathLst>
+                  <a:path w="5861" h="4152" extrusionOk="0">
+                    <a:moveTo>
+                      <a:pt x="3782" y="1"/>
+                    </a:moveTo>
+                    <a:cubicBezTo>
+                      <a:pt x="3561" y="1"/>
+                      <a:pt x="3341" y="221"/>
+                      <a:pt x="3341" y="410"/>
+                    </a:cubicBezTo>
+                    <a:cubicBezTo>
+                      <a:pt x="3341" y="631"/>
+                      <a:pt x="3561" y="852"/>
+                      <a:pt x="3782" y="852"/>
+                    </a:cubicBezTo>
+                    <a:lnTo>
+                      <a:pt x="4443" y="852"/>
+                    </a:lnTo>
+                    <a:lnTo>
+                      <a:pt x="2962" y="2332"/>
+                    </a:lnTo>
+                    <a:lnTo>
+                      <a:pt x="2395" y="1765"/>
+                    </a:lnTo>
+                    <a:cubicBezTo>
+                      <a:pt x="2332" y="1686"/>
+                      <a:pt x="2230" y="1647"/>
+                      <a:pt x="2124" y="1647"/>
+                    </a:cubicBezTo>
+                    <a:cubicBezTo>
+                      <a:pt x="2017" y="1647"/>
+                      <a:pt x="1907" y="1686"/>
+                      <a:pt x="1828" y="1765"/>
+                    </a:cubicBezTo>
+                    <a:lnTo>
+                      <a:pt x="159" y="3435"/>
+                    </a:lnTo>
+                    <a:cubicBezTo>
+                      <a:pt x="1" y="3592"/>
+                      <a:pt x="1" y="3876"/>
+                      <a:pt x="159" y="4034"/>
+                    </a:cubicBezTo>
+                    <a:cubicBezTo>
+                      <a:pt x="237" y="4112"/>
+                      <a:pt x="348" y="4152"/>
+                      <a:pt x="458" y="4152"/>
+                    </a:cubicBezTo>
+                    <a:cubicBezTo>
+                      <a:pt x="568" y="4152"/>
+                      <a:pt x="678" y="4112"/>
+                      <a:pt x="757" y="4034"/>
+                    </a:cubicBezTo>
+                    <a:lnTo>
+                      <a:pt x="2143" y="2647"/>
+                    </a:lnTo>
+                    <a:lnTo>
+                      <a:pt x="2679" y="3183"/>
+                    </a:lnTo>
+                    <a:cubicBezTo>
+                      <a:pt x="2758" y="3262"/>
+                      <a:pt x="2868" y="3301"/>
+                      <a:pt x="2978" y="3301"/>
+                    </a:cubicBezTo>
+                    <a:cubicBezTo>
+                      <a:pt x="3088" y="3301"/>
+                      <a:pt x="3199" y="3262"/>
+                      <a:pt x="3278" y="3183"/>
+                    </a:cubicBezTo>
+                    <a:lnTo>
+                      <a:pt x="5042" y="1419"/>
+                    </a:lnTo>
+                    <a:lnTo>
+                      <a:pt x="5042" y="2080"/>
+                    </a:lnTo>
+                    <a:cubicBezTo>
+                      <a:pt x="5042" y="2332"/>
+                      <a:pt x="5231" y="2521"/>
+                      <a:pt x="5451" y="2521"/>
+                    </a:cubicBezTo>
+                    <a:cubicBezTo>
+                      <a:pt x="5640" y="2521"/>
+                      <a:pt x="5861" y="2332"/>
+                      <a:pt x="5861" y="2080"/>
+                    </a:cubicBezTo>
+                    <a:lnTo>
+                      <a:pt x="5861" y="442"/>
+                    </a:lnTo>
+                    <a:cubicBezTo>
+                      <a:pt x="5861" y="158"/>
+                      <a:pt x="5672" y="1"/>
+                      <a:pt x="5451" y="1"/>
+                    </a:cubicBezTo>
+                    <a:close/>
+                  </a:path>
+                </a:pathLst>
+              </a:custGeom>
+              <a:solidFill>
+                <a:srgbClr val="FFFFFF"/>
+              </a:solidFill>
+              <a:ln>
+                <a:noFill/>
+              </a:ln>
+            </p:spPr>
+            <p:txBody>
+              <a:bodyPr spcFirstLastPara="1" wrap="square" lIns="91425" tIns="91425" rIns="91425" bIns="91425" anchor="ctr" anchorCtr="0">
+                <a:noAutofit/>
+              </a:bodyPr>
+              <a:lstStyle/>
+              <a:p>
+                <a:pPr marL="0" lvl="0" indent="0" algn="l" rtl="0">
+                  <a:spcBef>
+                    <a:spcPts val="0"/>
+                  </a:spcBef>
+                  <a:spcAft>
+                    <a:spcPts val="0"/>
+                  </a:spcAft>
+                  <a:buNone/>
+                </a:pPr>
+                <a:endParaRPr>
+                  <a:latin typeface="Montserrat" panose="00000500000000000000" pitchFamily="2" charset="-52"/>
+                </a:endParaRPr>
+              </a:p>
+            </p:txBody>
+          </p:sp>
+        </p:grpSp>
+        <p:sp>
+          <p:nvSpPr>
+            <p:cNvPr id="947" name="Google Shape;947;p31"/>
+            <p:cNvSpPr txBox="1"/>
+            <p:nvPr/>
+          </p:nvSpPr>
+          <p:spPr>
+            <a:xfrm>
+              <a:off x="6605537" y="2961438"/>
+              <a:ext cx="2079900" cy="294900"/>
+            </a:xfrm>
+            <a:prstGeom prst="rect">
+              <a:avLst/>
+            </a:prstGeom>
+            <a:noFill/>
+            <a:ln>
+              <a:noFill/>
+            </a:ln>
+          </p:spPr>
+          <p:txBody>
+            <a:bodyPr spcFirstLastPara="1" wrap="square" lIns="91425" tIns="91425" rIns="91425" bIns="91425" anchor="ctr" anchorCtr="0">
+              <a:noAutofit/>
+            </a:bodyPr>
+            <a:lstStyle/>
+            <a:p>
+              <a:pPr marL="0" lvl="0" indent="0" algn="ctr" rtl="0">
+                <a:spcBef>
+                  <a:spcPts val="0"/>
+                </a:spcBef>
+                <a:spcAft>
+                  <a:spcPts val="0"/>
+                </a:spcAft>
+                <a:buNone/>
+              </a:pPr>
+              <a:r>
+                <a:rPr lang="bg-BG" sz="1700" b="1" dirty="0" smtClean="0">
+                  <a:solidFill>
+                    <a:srgbClr val="5EB2FC"/>
+                  </a:solidFill>
+                  <a:latin typeface="Montserrat" panose="00000500000000000000" pitchFamily="2" charset="-52"/>
+                  <a:ea typeface="Fira Sans"/>
+                  <a:cs typeface="Fira Sans"/>
+                  <a:sym typeface="Fira Sans"/>
+                </a:rPr>
+                <a:t>Избор на валута</a:t>
+              </a:r>
+              <a:endParaRPr sz="1700" b="1" dirty="0">
+                <a:solidFill>
+                  <a:srgbClr val="5EB2FC"/>
+                </a:solidFill>
+                <a:latin typeface="Montserrat" panose="00000500000000000000" pitchFamily="2" charset="-52"/>
+                <a:ea typeface="Fira Sans"/>
+                <a:cs typeface="Fira Sans"/>
+                <a:sym typeface="Fira Sans"/>
+              </a:endParaRPr>
+            </a:p>
+          </p:txBody>
+        </p:sp>
+      </p:grpSp>
+      <p:sp>
+        <p:nvSpPr>
+          <p:cNvPr id="948" name="Google Shape;948;p31"/>
+          <p:cNvSpPr txBox="1"/>
+          <p:nvPr/>
+        </p:nvSpPr>
+        <p:spPr>
+          <a:xfrm>
+            <a:off x="457175" y="3356575"/>
+            <a:ext cx="2177100" cy="699600"/>
+          </a:xfrm>
+          <a:prstGeom prst="rect">
+            <a:avLst/>
+          </a:prstGeom>
+          <a:noFill/>
+          <a:ln>
+            <a:noFill/>
+          </a:ln>
+        </p:spPr>
+        <p:txBody>
+          <a:bodyPr spcFirstLastPara="1" wrap="square" lIns="91425" tIns="91425" rIns="91425" bIns="91425" anchor="ctr" anchorCtr="0">
+            <a:noAutofit/>
+          </a:bodyPr>
+          <a:lstStyle/>
+          <a:p>
+            <a:pPr marL="0" lvl="0" indent="0" algn="l" rtl="0">
+              <a:spcBef>
+                <a:spcPts val="0"/>
+              </a:spcBef>
+              <a:spcAft>
+                <a:spcPts val="0"/>
+              </a:spcAft>
+              <a:buNone/>
+            </a:pPr>
+            <a:r>
+              <a:rPr lang="bg-BG" dirty="0" smtClean="0">
+                <a:latin typeface="Montserrat" panose="00000500000000000000" pitchFamily="2" charset="-52"/>
+                <a:ea typeface="Fira Sans"/>
+                <a:cs typeface="Fira Sans"/>
+                <a:sym typeface="Fira Sans"/>
+              </a:rPr>
+              <a:t>Известия за сметки и надвишаване на бюджета </a:t>
+            </a:r>
+            <a:endParaRPr dirty="0">
+              <a:latin typeface="Montserrat" panose="00000500000000000000" pitchFamily="2" charset="-52"/>
+              <a:ea typeface="Fira Sans"/>
+              <a:cs typeface="Fira Sans"/>
+              <a:sym typeface="Fira Sans"/>
+            </a:endParaRPr>
+          </a:p>
+        </p:txBody>
+      </p:sp>
+      <p:sp>
+        <p:nvSpPr>
+          <p:cNvPr id="949" name="Google Shape;949;p31"/>
+          <p:cNvSpPr txBox="1"/>
+          <p:nvPr/>
+        </p:nvSpPr>
+        <p:spPr>
+          <a:xfrm>
+            <a:off x="6357450" y="3279075"/>
+            <a:ext cx="2328000" cy="839014"/>
+          </a:xfrm>
+          <a:prstGeom prst="rect">
+            <a:avLst/>
+          </a:prstGeom>
+          <a:noFill/>
+          <a:ln>
+            <a:noFill/>
+          </a:ln>
+        </p:spPr>
+        <p:txBody>
+          <a:bodyPr spcFirstLastPara="1" wrap="square" lIns="91425" tIns="91425" rIns="91425" bIns="91425" anchor="ctr" anchorCtr="0">
+            <a:noAutofit/>
+          </a:bodyPr>
+          <a:lstStyle/>
+          <a:p>
+            <a:pPr lvl="0" algn="r"/>
+            <a:r>
+              <a:rPr lang="bg-BG" dirty="0" smtClean="0">
+                <a:latin typeface="Montserrat" panose="00000500000000000000" pitchFamily="2" charset="-52"/>
+                <a:ea typeface="Fira Sans"/>
+                <a:cs typeface="Fira Sans"/>
+                <a:sym typeface="Fira Sans"/>
+              </a:rPr>
+              <a:t>Поддръжка </a:t>
+            </a:r>
+            <a:r>
+              <a:rPr lang="bg-BG" dirty="0">
+                <a:latin typeface="Montserrat" panose="00000500000000000000" pitchFamily="2" charset="-52"/>
+                <a:ea typeface="Fira Sans"/>
+                <a:cs typeface="Fira Sans"/>
+                <a:sym typeface="Fira Sans"/>
+              </a:rPr>
+              <a:t>на множество валути</a:t>
+            </a:r>
+            <a:endParaRPr sz="1200" dirty="0">
+              <a:latin typeface="Montserrat" panose="00000500000000000000" pitchFamily="2" charset="-52"/>
+              <a:ea typeface="Fira Sans"/>
+              <a:cs typeface="Fira Sans"/>
+              <a:sym typeface="Fira Sans"/>
+            </a:endParaRPr>
+          </a:p>
+        </p:txBody>
+      </p:sp>
+      <p:sp>
+        <p:nvSpPr>
+          <p:cNvPr id="950" name="Google Shape;950;p31"/>
+          <p:cNvSpPr txBox="1"/>
+          <p:nvPr/>
+        </p:nvSpPr>
+        <p:spPr>
+          <a:xfrm>
+            <a:off x="3368613" y="2379688"/>
+            <a:ext cx="2253000" cy="699600"/>
+          </a:xfrm>
+          <a:prstGeom prst="rect">
+            <a:avLst/>
+          </a:prstGeom>
+          <a:noFill/>
+          <a:ln>
+            <a:noFill/>
+          </a:ln>
+        </p:spPr>
+        <p:txBody>
+          <a:bodyPr spcFirstLastPara="1" wrap="square" lIns="91425" tIns="91425" rIns="91425" bIns="91425" anchor="ctr" anchorCtr="0">
+            <a:noAutofit/>
+          </a:bodyPr>
+          <a:lstStyle/>
+          <a:p>
+            <a:pPr marL="0" lvl="0" indent="0" algn="ctr" rtl="0">
+              <a:spcBef>
+                <a:spcPts val="0"/>
+              </a:spcBef>
+              <a:spcAft>
+                <a:spcPts val="0"/>
+              </a:spcAft>
+              <a:buNone/>
+            </a:pPr>
+            <a:r>
+              <a:rPr lang="bg-BG" dirty="0" smtClean="0">
+                <a:latin typeface="Montserrat" panose="00000500000000000000" pitchFamily="2" charset="-52"/>
+                <a:ea typeface="Fira Sans"/>
+                <a:cs typeface="Fira Sans"/>
+                <a:sym typeface="Fira Sans"/>
+              </a:rPr>
+              <a:t>Имейли за напомняния за предстоящи сметки</a:t>
+            </a:r>
+            <a:endParaRPr dirty="0">
+              <a:latin typeface="Montserrat" panose="00000500000000000000" pitchFamily="2" charset="-52"/>
+              <a:ea typeface="Fira Sans"/>
+              <a:cs typeface="Fira Sans"/>
+              <a:sym typeface="Fira Sans"/>
+            </a:endParaRPr>
+          </a:p>
+        </p:txBody>
+      </p:sp>
+    </p:spTree>
+    <p:extLst>
+      <p:ext uri="{BB962C8B-B14F-4D97-AF65-F5344CB8AC3E}">
+        <p14:creationId xmlns:p14="http://schemas.microsoft.com/office/powerpoint/2010/main" val="1930450516"/>
+      </p:ext>
+    </p:extLst>
+  </p:cSld>
+  <p:clrMapOvr>
+    <a:masterClrMapping/>
+  </p:clrMapOvr>
+  <p:timing>
+    <p:tnLst>
+      <p:par>
+        <p:cTn id="1" dur="indefinite" restart="never" nodeType="tmRoot"/>
+      </p:par>
+    </p:tnLst>
+  </p:timing>
+</p:sld>
+</file>
+
+<file path=ppt/slides/slide5.xml><?xml version="1.0" encoding="utf-8"?>
+<p:sld xmlns:a="http://schemas.openxmlformats.org/drawingml/2006/main" xmlns:r="http://schemas.openxmlformats.org/officeDocument/2006/relationships" xmlns:p="http://schemas.openxmlformats.org/presentationml/2006/main">
+  <p:cSld>
     <p:spTree>
       <p:nvGrpSpPr>
         <p:cNvPr id="1" name=""/>
@@ -10898,7 +15192,7 @@
         </p:blipFill>
         <p:spPr>
           <a:xfrm>
-            <a:off x="2062828" y="1935891"/>
+            <a:off x="765992" y="1909302"/>
             <a:ext cx="892798" cy="1004400"/>
           </a:xfrm>
           <a:prstGeom prst="rect">
@@ -10928,76 +15222,12 @@
         </p:blipFill>
         <p:spPr>
           <a:xfrm>
-            <a:off x="5670645" y="1915173"/>
+            <a:off x="4131247" y="1909476"/>
             <a:ext cx="1004226" cy="1004226"/>
           </a:xfrm>
           <a:prstGeom prst="rect">
             <a:avLst/>
           </a:prstGeom>
-        </p:spPr>
-      </p:pic>
-      <p:pic>
-        <p:nvPicPr>
-          <p:cNvPr id="7" name="Picture 6"/>
-          <p:cNvPicPr>
-            <a:picLocks noChangeAspect="1"/>
-          </p:cNvPicPr>
-          <p:nvPr/>
-        </p:nvPicPr>
-        <p:blipFill rotWithShape="1">
-          <a:blip r:embed="rId4"/>
-          <a:srcRect r="53453"/>
-          <a:stretch/>
-        </p:blipFill>
-        <p:spPr>
-          <a:xfrm>
-            <a:off x="3816291" y="1909302"/>
-            <a:ext cx="972416" cy="1005385"/>
-          </a:xfrm>
-          <a:prstGeom prst="rect">
-            <a:avLst/>
-          </a:prstGeom>
-        </p:spPr>
-      </p:pic>
-      <p:pic>
-        <p:nvPicPr>
-          <p:cNvPr id="8" name="Picture 6" descr="File:JetBrains Rider Icon.svg"/>
-          <p:cNvPicPr>
-            <a:picLocks noChangeAspect="1" noChangeArrowheads="1"/>
-          </p:cNvPicPr>
-          <p:nvPr/>
-        </p:nvPicPr>
-        <p:blipFill>
-          <a:blip r:embed="rId5">
-            <a:extLst>
-              <a:ext uri="{28A0092B-C50C-407E-A947-70E740481C1C}">
-                <a14:useLocalDpi xmlns:a14="http://schemas.microsoft.com/office/drawing/2010/main" val="0"/>
-              </a:ext>
-            </a:extLst>
-          </a:blip>
-          <a:srcRect/>
-          <a:stretch>
-            <a:fillRect/>
-          </a:stretch>
-        </p:blipFill>
-        <p:spPr bwMode="auto">
-          <a:xfrm>
-            <a:off x="462759" y="1909302"/>
-            <a:ext cx="1005385" cy="1005385"/>
-          </a:xfrm>
-          <a:prstGeom prst="rect">
-            <a:avLst/>
-          </a:prstGeom>
-          <a:noFill/>
-          <a:extLst>
-            <a:ext uri="{909E8E84-426E-40DD-AFC4-6F175D3DCCD1}">
-              <a14:hiddenFill xmlns:a14="http://schemas.microsoft.com/office/drawing/2010/main">
-                <a:solidFill>
-                  <a:srgbClr val="FFFFFF"/>
-                </a:solidFill>
-              </a14:hiddenFill>
-            </a:ext>
-          </a:extLst>
         </p:spPr>
       </p:pic>
       <p:pic>
@@ -11009,11 +15239,11 @@
           <p:nvPr/>
         </p:nvPicPr>
         <p:blipFill>
-          <a:blip r:embed="rId6">
+          <a:blip r:embed="rId4">
             <a:extLst>
               <a:ext uri="{BEBA8EAE-BF5A-486C-A8C5-ECC9F3942E4B}">
                 <a14:imgProps xmlns:a14="http://schemas.microsoft.com/office/drawing/2010/main">
-                  <a14:imgLayer r:embed="rId7">
+                  <a14:imgLayer r:embed="rId5">
                     <a14:imgEffect>
                       <a14:backgroundRemoval t="0" b="100000" l="0" r="100000"/>
                     </a14:imgEffect>
@@ -11028,106 +15258,8 @@
         </p:blipFill>
         <p:spPr>
           <a:xfrm>
-            <a:off x="6525691" y="3350893"/>
+            <a:off x="5738101" y="3535089"/>
             <a:ext cx="1057748" cy="842893"/>
-          </a:xfrm>
-          <a:prstGeom prst="rect">
-            <a:avLst/>
-          </a:prstGeom>
-        </p:spPr>
-      </p:pic>
-      <p:pic>
-        <p:nvPicPr>
-          <p:cNvPr id="10" name="Picture 9"/>
-          <p:cNvPicPr>
-            <a:picLocks noChangeAspect="1"/>
-          </p:cNvPicPr>
-          <p:nvPr/>
-        </p:nvPicPr>
-        <p:blipFill>
-          <a:blip r:embed="rId8">
-            <a:extLst>
-              <a:ext uri="{BEBA8EAE-BF5A-486C-A8C5-ECC9F3942E4B}">
-                <a14:imgProps xmlns:a14="http://schemas.microsoft.com/office/drawing/2010/main">
-                  <a14:imgLayer r:embed="rId9">
-                    <a14:imgEffect>
-                      <a14:backgroundRemoval t="9896" b="100000" l="9896" r="89974"/>
-                    </a14:imgEffect>
-                  </a14:imgLayer>
-                </a14:imgProps>
-              </a:ext>
-              <a:ext uri="{28A0092B-C50C-407E-A947-70E740481C1C}">
-                <a14:useLocalDpi xmlns:a14="http://schemas.microsoft.com/office/drawing/2010/main" val="0"/>
-              </a:ext>
-            </a:extLst>
-          </a:blip>
-          <a:stretch>
-            <a:fillRect/>
-          </a:stretch>
-        </p:blipFill>
-        <p:spPr>
-          <a:xfrm>
-            <a:off x="1125695" y="3163944"/>
-            <a:ext cx="1083745" cy="1083745"/>
-          </a:xfrm>
-          <a:prstGeom prst="rect">
-            <a:avLst/>
-          </a:prstGeom>
-        </p:spPr>
-      </p:pic>
-      <p:pic>
-        <p:nvPicPr>
-          <p:cNvPr id="11" name="Picture 10"/>
-          <p:cNvPicPr>
-            <a:picLocks noChangeAspect="1"/>
-          </p:cNvPicPr>
-          <p:nvPr/>
-        </p:nvPicPr>
-        <p:blipFill>
-          <a:blip r:embed="rId10">
-            <a:extLst>
-              <a:ext uri="{28A0092B-C50C-407E-A947-70E740481C1C}">
-                <a14:useLocalDpi xmlns:a14="http://schemas.microsoft.com/office/drawing/2010/main" val="0"/>
-              </a:ext>
-            </a:extLst>
-          </a:blip>
-          <a:stretch>
-            <a:fillRect/>
-          </a:stretch>
-        </p:blipFill>
-        <p:spPr>
-          <a:xfrm>
-            <a:off x="2930595" y="3361993"/>
-            <a:ext cx="885696" cy="885696"/>
-          </a:xfrm>
-          <a:prstGeom prst="rect">
-            <a:avLst/>
-          </a:prstGeom>
-        </p:spPr>
-      </p:pic>
-      <p:pic>
-        <p:nvPicPr>
-          <p:cNvPr id="12" name="Picture 11"/>
-          <p:cNvPicPr>
-            <a:picLocks noChangeAspect="1"/>
-          </p:cNvPicPr>
-          <p:nvPr/>
-        </p:nvPicPr>
-        <p:blipFill rotWithShape="1">
-          <a:blip r:embed="rId11">
-            <a:extLst>
-              <a:ext uri="{28A0092B-C50C-407E-A947-70E740481C1C}">
-                <a14:useLocalDpi xmlns:a14="http://schemas.microsoft.com/office/drawing/2010/main" val="0"/>
-              </a:ext>
-            </a:extLst>
-          </a:blip>
-          <a:srcRect t="16890"/>
-          <a:stretch/>
-        </p:blipFill>
-        <p:spPr>
-          <a:xfrm>
-            <a:off x="4788707" y="3296991"/>
-            <a:ext cx="764568" cy="950698"/>
           </a:xfrm>
           <a:prstGeom prst="rect">
             <a:avLst/>
@@ -11143,7 +15275,7 @@
           <p:nvPr/>
         </p:nvPicPr>
         <p:blipFill>
-          <a:blip r:embed="rId12">
+          <a:blip r:embed="rId6">
             <a:extLst>
               <a:ext uri="{28A0092B-C50C-407E-A947-70E740481C1C}">
                 <a14:useLocalDpi xmlns:a14="http://schemas.microsoft.com/office/drawing/2010/main" val="0"/>
@@ -11156,8 +15288,38 @@
         </p:blipFill>
         <p:spPr>
           <a:xfrm>
-            <a:off x="7535536" y="1879113"/>
+            <a:off x="7246086" y="1883062"/>
             <a:ext cx="1004400" cy="1004400"/>
+          </a:xfrm>
+          <a:prstGeom prst="rect">
+            <a:avLst/>
+          </a:prstGeom>
+        </p:spPr>
+      </p:pic>
+      <p:pic>
+        <p:nvPicPr>
+          <p:cNvPr id="3" name="Picture 2"/>
+          <p:cNvPicPr>
+            <a:picLocks noChangeAspect="1"/>
+          </p:cNvPicPr>
+          <p:nvPr/>
+        </p:nvPicPr>
+        <p:blipFill>
+          <a:blip r:embed="rId7">
+            <a:extLst>
+              <a:ext uri="{28A0092B-C50C-407E-A947-70E740481C1C}">
+                <a14:useLocalDpi xmlns:a14="http://schemas.microsoft.com/office/drawing/2010/main" val="0"/>
+              </a:ext>
+            </a:extLst>
+          </a:blip>
+          <a:stretch>
+            <a:fillRect/>
+          </a:stretch>
+        </p:blipFill>
+        <p:spPr>
+          <a:xfrm>
+            <a:off x="1658790" y="3180288"/>
+            <a:ext cx="2472457" cy="1341983"/>
           </a:xfrm>
           <a:prstGeom prst="rect">
             <a:avLst/>
@@ -11184,7 +15346,7 @@
 </p:sld>
 </file>
 
-<file path=ppt/slides/slide5.xml><?xml version="1.0" encoding="utf-8"?>
+<file path=ppt/slides/slide6.xml><?xml version="1.0" encoding="utf-8"?>
 <p:sld xmlns:a="http://schemas.openxmlformats.org/drawingml/2006/main" xmlns:r="http://schemas.openxmlformats.org/officeDocument/2006/relationships" xmlns:p="http://schemas.openxmlformats.org/presentationml/2006/main">
   <p:cSld>
     <p:spTree>
@@ -11252,7 +15414,7 @@
 </p:sld>
 </file>
 
-<file path=ppt/slides/slide6.xml><?xml version="1.0" encoding="utf-8"?>
+<file path=ppt/slides/slide7.xml><?xml version="1.0" encoding="utf-8"?>
 <p:sld xmlns:a="http://schemas.openxmlformats.org/drawingml/2006/main" xmlns:r="http://schemas.openxmlformats.org/officeDocument/2006/relationships" xmlns:p="http://schemas.openxmlformats.org/presentationml/2006/main">
   <p:cSld>
     <p:spTree>
@@ -11311,6 +15473,13 @@
   <p:clrMapOvr>
     <a:masterClrMapping/>
   </p:clrMapOvr>
+  <p:timing>
+    <p:tnLst>
+      <p:par>
+        <p:cTn id="1" dur="indefinite" restart="never" nodeType="tmRoot"/>
+      </p:par>
+    </p:tnLst>
+  </p:timing>
 </p:sld>
 </file>
 

</xml_diff>

<commit_message>
Finalize project. Upload video and documentation
</commit_message>
<xml_diff>
--- a/documents/Zira - Presentation.pptx
+++ b/documents/Zira - Presentation.pptx
@@ -5,33 +5,32 @@
     <p:sldMasterId id="2147483660" r:id="rId1"/>
   </p:sldMasterIdLst>
   <p:notesMasterIdLst>
-    <p:notesMasterId r:id="rId9"/>
+    <p:notesMasterId r:id="rId8"/>
   </p:notesMasterIdLst>
   <p:sldIdLst>
     <p:sldId id="256" r:id="rId2"/>
-    <p:sldId id="290" r:id="rId3"/>
-    <p:sldId id="272" r:id="rId4"/>
-    <p:sldId id="294" r:id="rId5"/>
-    <p:sldId id="293" r:id="rId6"/>
-    <p:sldId id="292" r:id="rId7"/>
-    <p:sldId id="291" r:id="rId8"/>
+    <p:sldId id="272" r:id="rId3"/>
+    <p:sldId id="294" r:id="rId4"/>
+    <p:sldId id="293" r:id="rId5"/>
+    <p:sldId id="292" r:id="rId6"/>
+    <p:sldId id="291" r:id="rId7"/>
   </p:sldIdLst>
   <p:sldSz cx="9144000" cy="5143500" type="screen16x9"/>
   <p:notesSz cx="6858000" cy="9144000"/>
   <p:embeddedFontLst>
     <p:embeddedFont>
-      <p:font typeface="Montserrat" panose="00000500000000000000" pitchFamily="2" charset="-52"/>
-      <p:regular r:id="rId10"/>
-      <p:bold r:id="rId11"/>
-      <p:italic r:id="rId12"/>
-      <p:boldItalic r:id="rId13"/>
+      <p:font typeface="Fira Sans" panose="020B0604020202020204" charset="0"/>
+      <p:regular r:id="rId9"/>
+      <p:bold r:id="rId10"/>
+      <p:italic r:id="rId11"/>
+      <p:boldItalic r:id="rId12"/>
     </p:embeddedFont>
     <p:embeddedFont>
-      <p:font typeface="Fira Sans" panose="020B0604020202020204" charset="0"/>
-      <p:regular r:id="rId14"/>
-      <p:bold r:id="rId15"/>
-      <p:italic r:id="rId16"/>
-      <p:boldItalic r:id="rId17"/>
+      <p:font typeface="Montserrat" panose="00000500000000000000" pitchFamily="2" charset="-52"/>
+      <p:regular r:id="rId13"/>
+      <p:bold r:id="rId14"/>
+      <p:italic r:id="rId15"/>
+      <p:boldItalic r:id="rId16"/>
     </p:embeddedFont>
   </p:embeddedFontLst>
   <p:defaultTextStyle>
@@ -1454,110 +1453,6 @@
 </p:sldLayout>
 </file>
 
-<file path=ppt/slideLayouts/slideLayout10.xml><?xml version="1.0" encoding="utf-8"?>
-<p:sldLayout xmlns:a="http://schemas.openxmlformats.org/drawingml/2006/main" xmlns:r="http://schemas.openxmlformats.org/officeDocument/2006/relationships" xmlns:p="http://schemas.openxmlformats.org/presentationml/2006/main" matchingName="Blank" type="blank">
-  <p:cSld name="BLANK">
-    <p:spTree>
-      <p:nvGrpSpPr>
-        <p:cNvPr id="1" name="Shape 48"/>
-        <p:cNvGrpSpPr/>
-        <p:nvPr/>
-      </p:nvGrpSpPr>
-      <p:grpSpPr>
-        <a:xfrm>
-          <a:off x="0" y="0"/>
-          <a:ext cx="0" cy="0"/>
-          <a:chOff x="0" y="0"/>
-          <a:chExt cx="0" cy="0"/>
-        </a:xfrm>
-      </p:grpSpPr>
-      <p:sp>
-        <p:nvSpPr>
-          <p:cNvPr id="49" name="Google Shape;49;p12"/>
-          <p:cNvSpPr txBox="1">
-            <a:spLocks noGrp="1"/>
-          </p:cNvSpPr>
-          <p:nvPr>
-            <p:ph type="sldNum" idx="12"/>
-          </p:nvPr>
-        </p:nvSpPr>
-        <p:spPr>
-          <a:xfrm>
-            <a:off x="8472458" y="4663217"/>
-            <a:ext cx="548700" cy="393600"/>
-          </a:xfrm>
-          <a:prstGeom prst="rect">
-            <a:avLst/>
-          </a:prstGeom>
-        </p:spPr>
-        <p:txBody>
-          <a:bodyPr spcFirstLastPara="1" wrap="square" lIns="91425" tIns="91425" rIns="91425" bIns="91425" anchor="ctr" anchorCtr="0">
-            <a:noAutofit/>
-          </a:bodyPr>
-          <a:lstStyle>
-            <a:lvl1pPr lvl="0">
-              <a:buNone/>
-              <a:defRPr/>
-            </a:lvl1pPr>
-            <a:lvl2pPr lvl="1">
-              <a:buNone/>
-              <a:defRPr/>
-            </a:lvl2pPr>
-            <a:lvl3pPr lvl="2">
-              <a:buNone/>
-              <a:defRPr/>
-            </a:lvl3pPr>
-            <a:lvl4pPr lvl="3">
-              <a:buNone/>
-              <a:defRPr/>
-            </a:lvl4pPr>
-            <a:lvl5pPr lvl="4">
-              <a:buNone/>
-              <a:defRPr/>
-            </a:lvl5pPr>
-            <a:lvl6pPr lvl="5">
-              <a:buNone/>
-              <a:defRPr/>
-            </a:lvl6pPr>
-            <a:lvl7pPr lvl="6">
-              <a:buNone/>
-              <a:defRPr/>
-            </a:lvl7pPr>
-            <a:lvl8pPr lvl="7">
-              <a:buNone/>
-              <a:defRPr/>
-            </a:lvl8pPr>
-            <a:lvl9pPr lvl="8">
-              <a:buNone/>
-              <a:defRPr/>
-            </a:lvl9pPr>
-          </a:lstStyle>
-          <a:p>
-            <a:pPr marL="0" lvl="0" indent="0" algn="r" rtl="0">
-              <a:spcBef>
-                <a:spcPts val="0"/>
-              </a:spcBef>
-              <a:spcAft>
-                <a:spcPts val="0"/>
-              </a:spcAft>
-              <a:buNone/>
-            </a:pPr>
-            <a:fld id="{00000000-1234-1234-1234-123412341234}" type="slidenum">
-              <a:rPr lang="en"/>
-              <a:t>‹#›</a:t>
-            </a:fld>
-            <a:endParaRPr/>
-          </a:p>
-        </p:txBody>
-      </p:sp>
-    </p:spTree>
-  </p:cSld>
-  <p:clrMapOvr>
-    <a:masterClrMapping/>
-  </p:clrMapOvr>
-</p:sldLayout>
-</file>
-
 <file path=ppt/slideLayouts/slideLayout2.xml><?xml version="1.0" encoding="utf-8"?>
 <p:sldLayout xmlns:a="http://schemas.openxmlformats.org/drawingml/2006/main" xmlns:r="http://schemas.openxmlformats.org/officeDocument/2006/relationships" xmlns:p="http://schemas.openxmlformats.org/presentationml/2006/main" matchingName="Section header" type="secHead">
   <p:cSld name="SECTION_HEADER">
@@ -3240,564 +3135,6 @@
 </file>
 
 <file path=ppt/slideLayouts/slideLayout7.xml><?xml version="1.0" encoding="utf-8"?>
-<p:sldLayout xmlns:a="http://schemas.openxmlformats.org/drawingml/2006/main" xmlns:r="http://schemas.openxmlformats.org/officeDocument/2006/relationships" xmlns:p="http://schemas.openxmlformats.org/presentationml/2006/main" matchingName="Section title and description">
-  <p:cSld name="SECTION_TITLE_AND_DESCRIPTION">
-    <p:spTree>
-      <p:nvGrpSpPr>
-        <p:cNvPr id="1" name="Shape 35"/>
-        <p:cNvGrpSpPr/>
-        <p:nvPr/>
-      </p:nvGrpSpPr>
-      <p:grpSpPr>
-        <a:xfrm>
-          <a:off x="0" y="0"/>
-          <a:ext cx="0" cy="0"/>
-          <a:chOff x="0" y="0"/>
-          <a:chExt cx="0" cy="0"/>
-        </a:xfrm>
-      </p:grpSpPr>
-      <p:sp>
-        <p:nvSpPr>
-          <p:cNvPr id="36" name="Google Shape;36;p9"/>
-          <p:cNvSpPr/>
-          <p:nvPr/>
-        </p:nvSpPr>
-        <p:spPr>
-          <a:xfrm>
-            <a:off x="4572000" y="-125"/>
-            <a:ext cx="4572000" cy="5143500"/>
-          </a:xfrm>
-          <a:prstGeom prst="rect">
-            <a:avLst/>
-          </a:prstGeom>
-          <a:solidFill>
-            <a:schemeClr val="lt2"/>
-          </a:solidFill>
-          <a:ln>
-            <a:noFill/>
-          </a:ln>
-        </p:spPr>
-        <p:txBody>
-          <a:bodyPr spcFirstLastPara="1" wrap="square" lIns="91425" tIns="91425" rIns="91425" bIns="91425" anchor="ctr" anchorCtr="0">
-            <a:noAutofit/>
-          </a:bodyPr>
-          <a:lstStyle/>
-          <a:p>
-            <a:pPr marL="0" lvl="0" indent="0" algn="l" rtl="0">
-              <a:spcBef>
-                <a:spcPts val="0"/>
-              </a:spcBef>
-              <a:spcAft>
-                <a:spcPts val="0"/>
-              </a:spcAft>
-              <a:buNone/>
-            </a:pPr>
-            <a:endParaRPr/>
-          </a:p>
-        </p:txBody>
-      </p:sp>
-      <p:sp>
-        <p:nvSpPr>
-          <p:cNvPr id="37" name="Google Shape;37;p9"/>
-          <p:cNvSpPr txBox="1">
-            <a:spLocks noGrp="1"/>
-          </p:cNvSpPr>
-          <p:nvPr>
-            <p:ph type="title"/>
-          </p:nvPr>
-        </p:nvSpPr>
-        <p:spPr>
-          <a:xfrm>
-            <a:off x="265500" y="1233175"/>
-            <a:ext cx="4045200" cy="1482300"/>
-          </a:xfrm>
-          <a:prstGeom prst="rect">
-            <a:avLst/>
-          </a:prstGeom>
-        </p:spPr>
-        <p:txBody>
-          <a:bodyPr spcFirstLastPara="1" wrap="square" lIns="91425" tIns="91425" rIns="91425" bIns="91425" anchor="b" anchorCtr="0">
-            <a:noAutofit/>
-          </a:bodyPr>
-          <a:lstStyle>
-            <a:lvl1pPr lvl="0" algn="ctr">
-              <a:spcBef>
-                <a:spcPts val="0"/>
-              </a:spcBef>
-              <a:spcAft>
-                <a:spcPts val="0"/>
-              </a:spcAft>
-              <a:buSzPts val="4200"/>
-              <a:buNone/>
-              <a:defRPr sz="4200"/>
-            </a:lvl1pPr>
-            <a:lvl2pPr lvl="1" algn="ctr">
-              <a:spcBef>
-                <a:spcPts val="0"/>
-              </a:spcBef>
-              <a:spcAft>
-                <a:spcPts val="0"/>
-              </a:spcAft>
-              <a:buSzPts val="4200"/>
-              <a:buNone/>
-              <a:defRPr sz="4200"/>
-            </a:lvl2pPr>
-            <a:lvl3pPr lvl="2" algn="ctr">
-              <a:spcBef>
-                <a:spcPts val="0"/>
-              </a:spcBef>
-              <a:spcAft>
-                <a:spcPts val="0"/>
-              </a:spcAft>
-              <a:buSzPts val="4200"/>
-              <a:buNone/>
-              <a:defRPr sz="4200"/>
-            </a:lvl3pPr>
-            <a:lvl4pPr lvl="3" algn="ctr">
-              <a:spcBef>
-                <a:spcPts val="0"/>
-              </a:spcBef>
-              <a:spcAft>
-                <a:spcPts val="0"/>
-              </a:spcAft>
-              <a:buSzPts val="4200"/>
-              <a:buNone/>
-              <a:defRPr sz="4200"/>
-            </a:lvl4pPr>
-            <a:lvl5pPr lvl="4" algn="ctr">
-              <a:spcBef>
-                <a:spcPts val="0"/>
-              </a:spcBef>
-              <a:spcAft>
-                <a:spcPts val="0"/>
-              </a:spcAft>
-              <a:buSzPts val="4200"/>
-              <a:buNone/>
-              <a:defRPr sz="4200"/>
-            </a:lvl5pPr>
-            <a:lvl6pPr lvl="5" algn="ctr">
-              <a:spcBef>
-                <a:spcPts val="0"/>
-              </a:spcBef>
-              <a:spcAft>
-                <a:spcPts val="0"/>
-              </a:spcAft>
-              <a:buSzPts val="4200"/>
-              <a:buNone/>
-              <a:defRPr sz="4200"/>
-            </a:lvl6pPr>
-            <a:lvl7pPr lvl="6" algn="ctr">
-              <a:spcBef>
-                <a:spcPts val="0"/>
-              </a:spcBef>
-              <a:spcAft>
-                <a:spcPts val="0"/>
-              </a:spcAft>
-              <a:buSzPts val="4200"/>
-              <a:buNone/>
-              <a:defRPr sz="4200"/>
-            </a:lvl7pPr>
-            <a:lvl8pPr lvl="7" algn="ctr">
-              <a:spcBef>
-                <a:spcPts val="0"/>
-              </a:spcBef>
-              <a:spcAft>
-                <a:spcPts val="0"/>
-              </a:spcAft>
-              <a:buSzPts val="4200"/>
-              <a:buNone/>
-              <a:defRPr sz="4200"/>
-            </a:lvl8pPr>
-            <a:lvl9pPr lvl="8" algn="ctr">
-              <a:spcBef>
-                <a:spcPts val="0"/>
-              </a:spcBef>
-              <a:spcAft>
-                <a:spcPts val="0"/>
-              </a:spcAft>
-              <a:buSzPts val="4200"/>
-              <a:buNone/>
-              <a:defRPr sz="4200"/>
-            </a:lvl9pPr>
-          </a:lstStyle>
-          <a:p>
-            <a:endParaRPr/>
-          </a:p>
-        </p:txBody>
-      </p:sp>
-      <p:sp>
-        <p:nvSpPr>
-          <p:cNvPr id="38" name="Google Shape;38;p9"/>
-          <p:cNvSpPr txBox="1">
-            <a:spLocks noGrp="1"/>
-          </p:cNvSpPr>
-          <p:nvPr>
-            <p:ph type="subTitle" idx="1"/>
-          </p:nvPr>
-        </p:nvSpPr>
-        <p:spPr>
-          <a:xfrm>
-            <a:off x="265500" y="2803075"/>
-            <a:ext cx="4045200" cy="1235100"/>
-          </a:xfrm>
-          <a:prstGeom prst="rect">
-            <a:avLst/>
-          </a:prstGeom>
-        </p:spPr>
-        <p:txBody>
-          <a:bodyPr spcFirstLastPara="1" wrap="square" lIns="91425" tIns="91425" rIns="91425" bIns="91425" anchor="t" anchorCtr="0">
-            <a:noAutofit/>
-          </a:bodyPr>
-          <a:lstStyle>
-            <a:lvl1pPr lvl="0" algn="ctr">
-              <a:lnSpc>
-                <a:spcPct val="100000"/>
-              </a:lnSpc>
-              <a:spcBef>
-                <a:spcPts val="0"/>
-              </a:spcBef>
-              <a:spcAft>
-                <a:spcPts val="0"/>
-              </a:spcAft>
-              <a:buSzPts val="2100"/>
-              <a:buNone/>
-              <a:defRPr sz="2100"/>
-            </a:lvl1pPr>
-            <a:lvl2pPr lvl="1" algn="ctr">
-              <a:lnSpc>
-                <a:spcPct val="100000"/>
-              </a:lnSpc>
-              <a:spcBef>
-                <a:spcPts val="0"/>
-              </a:spcBef>
-              <a:spcAft>
-                <a:spcPts val="0"/>
-              </a:spcAft>
-              <a:buSzPts val="2100"/>
-              <a:buNone/>
-              <a:defRPr sz="2100"/>
-            </a:lvl2pPr>
-            <a:lvl3pPr lvl="2" algn="ctr">
-              <a:lnSpc>
-                <a:spcPct val="100000"/>
-              </a:lnSpc>
-              <a:spcBef>
-                <a:spcPts val="0"/>
-              </a:spcBef>
-              <a:spcAft>
-                <a:spcPts val="0"/>
-              </a:spcAft>
-              <a:buSzPts val="2100"/>
-              <a:buNone/>
-              <a:defRPr sz="2100"/>
-            </a:lvl3pPr>
-            <a:lvl4pPr lvl="3" algn="ctr">
-              <a:lnSpc>
-                <a:spcPct val="100000"/>
-              </a:lnSpc>
-              <a:spcBef>
-                <a:spcPts val="0"/>
-              </a:spcBef>
-              <a:spcAft>
-                <a:spcPts val="0"/>
-              </a:spcAft>
-              <a:buSzPts val="2100"/>
-              <a:buNone/>
-              <a:defRPr sz="2100"/>
-            </a:lvl4pPr>
-            <a:lvl5pPr lvl="4" algn="ctr">
-              <a:lnSpc>
-                <a:spcPct val="100000"/>
-              </a:lnSpc>
-              <a:spcBef>
-                <a:spcPts val="0"/>
-              </a:spcBef>
-              <a:spcAft>
-                <a:spcPts val="0"/>
-              </a:spcAft>
-              <a:buSzPts val="2100"/>
-              <a:buNone/>
-              <a:defRPr sz="2100"/>
-            </a:lvl5pPr>
-            <a:lvl6pPr lvl="5" algn="ctr">
-              <a:lnSpc>
-                <a:spcPct val="100000"/>
-              </a:lnSpc>
-              <a:spcBef>
-                <a:spcPts val="0"/>
-              </a:spcBef>
-              <a:spcAft>
-                <a:spcPts val="0"/>
-              </a:spcAft>
-              <a:buSzPts val="2100"/>
-              <a:buNone/>
-              <a:defRPr sz="2100"/>
-            </a:lvl6pPr>
-            <a:lvl7pPr lvl="6" algn="ctr">
-              <a:lnSpc>
-                <a:spcPct val="100000"/>
-              </a:lnSpc>
-              <a:spcBef>
-                <a:spcPts val="0"/>
-              </a:spcBef>
-              <a:spcAft>
-                <a:spcPts val="0"/>
-              </a:spcAft>
-              <a:buSzPts val="2100"/>
-              <a:buNone/>
-              <a:defRPr sz="2100"/>
-            </a:lvl7pPr>
-            <a:lvl8pPr lvl="7" algn="ctr">
-              <a:lnSpc>
-                <a:spcPct val="100000"/>
-              </a:lnSpc>
-              <a:spcBef>
-                <a:spcPts val="0"/>
-              </a:spcBef>
-              <a:spcAft>
-                <a:spcPts val="0"/>
-              </a:spcAft>
-              <a:buSzPts val="2100"/>
-              <a:buNone/>
-              <a:defRPr sz="2100"/>
-            </a:lvl8pPr>
-            <a:lvl9pPr lvl="8" algn="ctr">
-              <a:lnSpc>
-                <a:spcPct val="100000"/>
-              </a:lnSpc>
-              <a:spcBef>
-                <a:spcPts val="0"/>
-              </a:spcBef>
-              <a:spcAft>
-                <a:spcPts val="0"/>
-              </a:spcAft>
-              <a:buSzPts val="2100"/>
-              <a:buNone/>
-              <a:defRPr sz="2100"/>
-            </a:lvl9pPr>
-          </a:lstStyle>
-          <a:p>
-            <a:endParaRPr/>
-          </a:p>
-        </p:txBody>
-      </p:sp>
-      <p:sp>
-        <p:nvSpPr>
-          <p:cNvPr id="39" name="Google Shape;39;p9"/>
-          <p:cNvSpPr txBox="1">
-            <a:spLocks noGrp="1"/>
-          </p:cNvSpPr>
-          <p:nvPr>
-            <p:ph type="body" idx="2"/>
-          </p:nvPr>
-        </p:nvSpPr>
-        <p:spPr>
-          <a:xfrm>
-            <a:off x="4939500" y="724075"/>
-            <a:ext cx="3837000" cy="3695100"/>
-          </a:xfrm>
-          <a:prstGeom prst="rect">
-            <a:avLst/>
-          </a:prstGeom>
-        </p:spPr>
-        <p:txBody>
-          <a:bodyPr spcFirstLastPara="1" wrap="square" lIns="91425" tIns="91425" rIns="91425" bIns="91425" anchor="ctr" anchorCtr="0">
-            <a:noAutofit/>
-          </a:bodyPr>
-          <a:lstStyle>
-            <a:lvl1pPr marL="457200" lvl="0" indent="-342900">
-              <a:spcBef>
-                <a:spcPts val="0"/>
-              </a:spcBef>
-              <a:spcAft>
-                <a:spcPts val="0"/>
-              </a:spcAft>
-              <a:buSzPts val="1800"/>
-              <a:buChar char="●"/>
-              <a:defRPr/>
-            </a:lvl1pPr>
-            <a:lvl2pPr marL="914400" lvl="1" indent="-317500">
-              <a:spcBef>
-                <a:spcPts val="1600"/>
-              </a:spcBef>
-              <a:spcAft>
-                <a:spcPts val="0"/>
-              </a:spcAft>
-              <a:buSzPts val="1400"/>
-              <a:buChar char="○"/>
-              <a:defRPr/>
-            </a:lvl2pPr>
-            <a:lvl3pPr marL="1371600" lvl="2" indent="-317500">
-              <a:spcBef>
-                <a:spcPts val="1600"/>
-              </a:spcBef>
-              <a:spcAft>
-                <a:spcPts val="0"/>
-              </a:spcAft>
-              <a:buSzPts val="1400"/>
-              <a:buChar char="■"/>
-              <a:defRPr/>
-            </a:lvl3pPr>
-            <a:lvl4pPr marL="1828800" lvl="3" indent="-317500">
-              <a:spcBef>
-                <a:spcPts val="1600"/>
-              </a:spcBef>
-              <a:spcAft>
-                <a:spcPts val="0"/>
-              </a:spcAft>
-              <a:buSzPts val="1400"/>
-              <a:buChar char="●"/>
-              <a:defRPr/>
-            </a:lvl4pPr>
-            <a:lvl5pPr marL="2286000" lvl="4" indent="-317500">
-              <a:spcBef>
-                <a:spcPts val="1600"/>
-              </a:spcBef>
-              <a:spcAft>
-                <a:spcPts val="0"/>
-              </a:spcAft>
-              <a:buSzPts val="1400"/>
-              <a:buChar char="○"/>
-              <a:defRPr/>
-            </a:lvl5pPr>
-            <a:lvl6pPr marL="2743200" lvl="5" indent="-317500">
-              <a:spcBef>
-                <a:spcPts val="1600"/>
-              </a:spcBef>
-              <a:spcAft>
-                <a:spcPts val="0"/>
-              </a:spcAft>
-              <a:buSzPts val="1400"/>
-              <a:buChar char="■"/>
-              <a:defRPr/>
-            </a:lvl6pPr>
-            <a:lvl7pPr marL="3200400" lvl="6" indent="-317500">
-              <a:spcBef>
-                <a:spcPts val="1600"/>
-              </a:spcBef>
-              <a:spcAft>
-                <a:spcPts val="0"/>
-              </a:spcAft>
-              <a:buSzPts val="1400"/>
-              <a:buChar char="●"/>
-              <a:defRPr/>
-            </a:lvl7pPr>
-            <a:lvl8pPr marL="3657600" lvl="7" indent="-317500">
-              <a:spcBef>
-                <a:spcPts val="1600"/>
-              </a:spcBef>
-              <a:spcAft>
-                <a:spcPts val="0"/>
-              </a:spcAft>
-              <a:buSzPts val="1400"/>
-              <a:buChar char="○"/>
-              <a:defRPr/>
-            </a:lvl8pPr>
-            <a:lvl9pPr marL="4114800" lvl="8" indent="-317500">
-              <a:spcBef>
-                <a:spcPts val="1600"/>
-              </a:spcBef>
-              <a:spcAft>
-                <a:spcPts val="1600"/>
-              </a:spcAft>
-              <a:buSzPts val="1400"/>
-              <a:buChar char="■"/>
-              <a:defRPr/>
-            </a:lvl9pPr>
-          </a:lstStyle>
-          <a:p>
-            <a:endParaRPr/>
-          </a:p>
-        </p:txBody>
-      </p:sp>
-      <p:sp>
-        <p:nvSpPr>
-          <p:cNvPr id="40" name="Google Shape;40;p9"/>
-          <p:cNvSpPr txBox="1">
-            <a:spLocks noGrp="1"/>
-          </p:cNvSpPr>
-          <p:nvPr>
-            <p:ph type="sldNum" idx="12"/>
-          </p:nvPr>
-        </p:nvSpPr>
-        <p:spPr>
-          <a:xfrm>
-            <a:off x="8472458" y="4663217"/>
-            <a:ext cx="548700" cy="393600"/>
-          </a:xfrm>
-          <a:prstGeom prst="rect">
-            <a:avLst/>
-          </a:prstGeom>
-        </p:spPr>
-        <p:txBody>
-          <a:bodyPr spcFirstLastPara="1" wrap="square" lIns="91425" tIns="91425" rIns="91425" bIns="91425" anchor="ctr" anchorCtr="0">
-            <a:noAutofit/>
-          </a:bodyPr>
-          <a:lstStyle>
-            <a:lvl1pPr lvl="0">
-              <a:buNone/>
-              <a:defRPr/>
-            </a:lvl1pPr>
-            <a:lvl2pPr lvl="1">
-              <a:buNone/>
-              <a:defRPr/>
-            </a:lvl2pPr>
-            <a:lvl3pPr lvl="2">
-              <a:buNone/>
-              <a:defRPr/>
-            </a:lvl3pPr>
-            <a:lvl4pPr lvl="3">
-              <a:buNone/>
-              <a:defRPr/>
-            </a:lvl4pPr>
-            <a:lvl5pPr lvl="4">
-              <a:buNone/>
-              <a:defRPr/>
-            </a:lvl5pPr>
-            <a:lvl6pPr lvl="5">
-              <a:buNone/>
-              <a:defRPr/>
-            </a:lvl6pPr>
-            <a:lvl7pPr lvl="6">
-              <a:buNone/>
-              <a:defRPr/>
-            </a:lvl7pPr>
-            <a:lvl8pPr lvl="7">
-              <a:buNone/>
-              <a:defRPr/>
-            </a:lvl8pPr>
-            <a:lvl9pPr lvl="8">
-              <a:buNone/>
-              <a:defRPr/>
-            </a:lvl9pPr>
-          </a:lstStyle>
-          <a:p>
-            <a:pPr marL="0" lvl="0" indent="0" algn="r" rtl="0">
-              <a:spcBef>
-                <a:spcPts val="0"/>
-              </a:spcBef>
-              <a:spcAft>
-                <a:spcPts val="0"/>
-              </a:spcAft>
-              <a:buNone/>
-            </a:pPr>
-            <a:fld id="{00000000-1234-1234-1234-123412341234}" type="slidenum">
-              <a:rPr lang="en"/>
-              <a:t>‹#›</a:t>
-            </a:fld>
-            <a:endParaRPr/>
-          </a:p>
-        </p:txBody>
-      </p:sp>
-    </p:spTree>
-  </p:cSld>
-  <p:clrMapOvr>
-    <a:masterClrMapping/>
-  </p:clrMapOvr>
-</p:sldLayout>
-</file>
-
-<file path=ppt/slideLayouts/slideLayout8.xml><?xml version="1.0" encoding="utf-8"?>
 <p:sldLayout xmlns:a="http://schemas.openxmlformats.org/drawingml/2006/main" xmlns:r="http://schemas.openxmlformats.org/officeDocument/2006/relationships" xmlns:p="http://schemas.openxmlformats.org/presentationml/2006/main" matchingName="Caption">
   <p:cSld name="CAPTION_ONLY">
     <p:spTree>
@@ -3945,7 +3282,7 @@
 </p:sldLayout>
 </file>
 
-<file path=ppt/slideLayouts/slideLayout9.xml><?xml version="1.0" encoding="utf-8"?>
+<file path=ppt/slideLayouts/slideLayout8.xml><?xml version="1.0" encoding="utf-8"?>
 <p:sldLayout xmlns:a="http://schemas.openxmlformats.org/drawingml/2006/main" xmlns:r="http://schemas.openxmlformats.org/officeDocument/2006/relationships" xmlns:p="http://schemas.openxmlformats.org/presentationml/2006/main" matchingName="Big number">
   <p:cSld name="BIG_NUMBER">
     <p:spTree>
@@ -4225,6 +3562,110 @@
       <p:sp>
         <p:nvSpPr>
           <p:cNvPr id="47" name="Google Shape;47;p11"/>
+          <p:cNvSpPr txBox="1">
+            <a:spLocks noGrp="1"/>
+          </p:cNvSpPr>
+          <p:nvPr>
+            <p:ph type="sldNum" idx="12"/>
+          </p:nvPr>
+        </p:nvSpPr>
+        <p:spPr>
+          <a:xfrm>
+            <a:off x="8472458" y="4663217"/>
+            <a:ext cx="548700" cy="393600"/>
+          </a:xfrm>
+          <a:prstGeom prst="rect">
+            <a:avLst/>
+          </a:prstGeom>
+        </p:spPr>
+        <p:txBody>
+          <a:bodyPr spcFirstLastPara="1" wrap="square" lIns="91425" tIns="91425" rIns="91425" bIns="91425" anchor="ctr" anchorCtr="0">
+            <a:noAutofit/>
+          </a:bodyPr>
+          <a:lstStyle>
+            <a:lvl1pPr lvl="0">
+              <a:buNone/>
+              <a:defRPr/>
+            </a:lvl1pPr>
+            <a:lvl2pPr lvl="1">
+              <a:buNone/>
+              <a:defRPr/>
+            </a:lvl2pPr>
+            <a:lvl3pPr lvl="2">
+              <a:buNone/>
+              <a:defRPr/>
+            </a:lvl3pPr>
+            <a:lvl4pPr lvl="3">
+              <a:buNone/>
+              <a:defRPr/>
+            </a:lvl4pPr>
+            <a:lvl5pPr lvl="4">
+              <a:buNone/>
+              <a:defRPr/>
+            </a:lvl5pPr>
+            <a:lvl6pPr lvl="5">
+              <a:buNone/>
+              <a:defRPr/>
+            </a:lvl6pPr>
+            <a:lvl7pPr lvl="6">
+              <a:buNone/>
+              <a:defRPr/>
+            </a:lvl7pPr>
+            <a:lvl8pPr lvl="7">
+              <a:buNone/>
+              <a:defRPr/>
+            </a:lvl8pPr>
+            <a:lvl9pPr lvl="8">
+              <a:buNone/>
+              <a:defRPr/>
+            </a:lvl9pPr>
+          </a:lstStyle>
+          <a:p>
+            <a:pPr marL="0" lvl="0" indent="0" algn="r" rtl="0">
+              <a:spcBef>
+                <a:spcPts val="0"/>
+              </a:spcBef>
+              <a:spcAft>
+                <a:spcPts val="0"/>
+              </a:spcAft>
+              <a:buNone/>
+            </a:pPr>
+            <a:fld id="{00000000-1234-1234-1234-123412341234}" type="slidenum">
+              <a:rPr lang="en"/>
+              <a:t>‹#›</a:t>
+            </a:fld>
+            <a:endParaRPr/>
+          </a:p>
+        </p:txBody>
+      </p:sp>
+    </p:spTree>
+  </p:cSld>
+  <p:clrMapOvr>
+    <a:masterClrMapping/>
+  </p:clrMapOvr>
+</p:sldLayout>
+</file>
+
+<file path=ppt/slideLayouts/slideLayout9.xml><?xml version="1.0" encoding="utf-8"?>
+<p:sldLayout xmlns:a="http://schemas.openxmlformats.org/drawingml/2006/main" xmlns:r="http://schemas.openxmlformats.org/officeDocument/2006/relationships" xmlns:p="http://schemas.openxmlformats.org/presentationml/2006/main" matchingName="Blank" type="blank">
+  <p:cSld name="BLANK">
+    <p:spTree>
+      <p:nvGrpSpPr>
+        <p:cNvPr id="1" name="Shape 48"/>
+        <p:cNvGrpSpPr/>
+        <p:nvPr/>
+      </p:nvGrpSpPr>
+      <p:grpSpPr>
+        <a:xfrm>
+          <a:off x="0" y="0"/>
+          <a:ext cx="0" cy="0"/>
+          <a:chOff x="0" y="0"/>
+          <a:chExt cx="0" cy="0"/>
+        </a:xfrm>
+      </p:grpSpPr>
+      <p:sp>
+        <p:nvSpPr>
+          <p:cNvPr id="49" name="Google Shape;49;p12"/>
           <p:cNvSpPr txBox="1">
             <a:spLocks noGrp="1"/>
           </p:cNvSpPr>
@@ -4882,10 +4323,9 @@
     <p:sldLayoutId id="2147483651" r:id="rId4"/>
     <p:sldLayoutId id="2147483653" r:id="rId5"/>
     <p:sldLayoutId id="2147483654" r:id="rId6"/>
-    <p:sldLayoutId id="2147483655" r:id="rId7"/>
-    <p:sldLayoutId id="2147483656" r:id="rId8"/>
-    <p:sldLayoutId id="2147483657" r:id="rId9"/>
-    <p:sldLayoutId id="2147483658" r:id="rId10"/>
+    <p:sldLayoutId id="2147483656" r:id="rId7"/>
+    <p:sldLayoutId id="2147483657" r:id="rId8"/>
+    <p:sldLayoutId id="2147483658" r:id="rId9"/>
   </p:sldLayoutIdLst>
   <p:hf sldNum="0" hdr="0" ftr="0" dt="0"/>
   <p:txStyles>
@@ -6507,252 +5947,6 @@
 <file path=ppt/slides/slide2.xml><?xml version="1.0" encoding="utf-8"?>
 <p:sld xmlns:a="http://schemas.openxmlformats.org/drawingml/2006/main" xmlns:r="http://schemas.openxmlformats.org/officeDocument/2006/relationships" xmlns:p="http://schemas.openxmlformats.org/presentationml/2006/main">
   <p:cSld>
-    <p:spTree>
-      <p:nvGrpSpPr>
-        <p:cNvPr id="1" name=""/>
-        <p:cNvGrpSpPr/>
-        <p:nvPr/>
-      </p:nvGrpSpPr>
-      <p:grpSpPr>
-        <a:xfrm>
-          <a:off x="0" y="0"/>
-          <a:ext cx="0" cy="0"/>
-          <a:chOff x="0" y="0"/>
-          <a:chExt cx="0" cy="0"/>
-        </a:xfrm>
-      </p:grpSpPr>
-      <p:sp>
-        <p:nvSpPr>
-          <p:cNvPr id="2" name="Title 1"/>
-          <p:cNvSpPr>
-            <a:spLocks noGrp="1"/>
-          </p:cNvSpPr>
-          <p:nvPr>
-            <p:ph type="title"/>
-          </p:nvPr>
-        </p:nvSpPr>
-        <p:spPr>
-          <a:xfrm>
-            <a:off x="265500" y="167471"/>
-            <a:ext cx="4045200" cy="733772"/>
-          </a:xfrm>
-        </p:spPr>
-        <p:txBody>
-          <a:bodyPr anchor="t"/>
-          <a:lstStyle/>
-          <a:p>
-            <a:r>
-              <a:rPr lang="bg-BG" sz="3200" b="1" dirty="0" smtClean="0">
-                <a:latin typeface="Montserrat" panose="00000500000000000000" pitchFamily="2" charset="-52"/>
-              </a:rPr>
-              <a:t>За мен</a:t>
-            </a:r>
-            <a:endParaRPr lang="en-GB" sz="3200" b="1" dirty="0">
-              <a:latin typeface="Montserrat" panose="00000500000000000000" pitchFamily="2" charset="-52"/>
-            </a:endParaRPr>
-          </a:p>
-        </p:txBody>
-      </p:sp>
-      <p:sp>
-        <p:nvSpPr>
-          <p:cNvPr id="3" name="Subtitle 2"/>
-          <p:cNvSpPr>
-            <a:spLocks noGrp="1"/>
-          </p:cNvSpPr>
-          <p:nvPr>
-            <p:ph type="subTitle" idx="1"/>
-          </p:nvPr>
-        </p:nvSpPr>
-        <p:spPr>
-          <a:xfrm>
-            <a:off x="265500" y="1204519"/>
-            <a:ext cx="4045200" cy="2374140"/>
-          </a:xfrm>
-        </p:spPr>
-        <p:txBody>
-          <a:bodyPr anchor="t"/>
-          <a:lstStyle/>
-          <a:p>
-            <a:pPr marL="0" indent="-285750" algn="l">
-              <a:lnSpc>
-                <a:spcPct val="200000"/>
-              </a:lnSpc>
-              <a:buFont typeface="Wingdings" panose="05000000000000000000" pitchFamily="2" charset="2"/>
-              <a:buChar char="§"/>
-            </a:pPr>
-            <a:r>
-              <a:rPr lang="bg-BG" sz="1600" dirty="0" smtClean="0">
-                <a:solidFill>
-                  <a:schemeClr val="tx1"/>
-                </a:solidFill>
-                <a:latin typeface="Montserrat" panose="00000500000000000000" pitchFamily="2" charset="-52"/>
-              </a:rPr>
-              <a:t>Константин Динев</a:t>
-            </a:r>
-          </a:p>
-          <a:p>
-            <a:pPr marL="0" indent="-285750" algn="l">
-              <a:lnSpc>
-                <a:spcPct val="200000"/>
-              </a:lnSpc>
-              <a:buFont typeface="Wingdings" panose="05000000000000000000" pitchFamily="2" charset="2"/>
-              <a:buChar char="§"/>
-            </a:pPr>
-            <a:r>
-              <a:rPr lang="bg-BG" sz="1600" dirty="0" smtClean="0">
-                <a:solidFill>
-                  <a:schemeClr val="tx1"/>
-                </a:solidFill>
-                <a:latin typeface="Montserrat" panose="00000500000000000000" pitchFamily="2" charset="-52"/>
-              </a:rPr>
-              <a:t>Ученик в ПГКПИ</a:t>
-            </a:r>
-          </a:p>
-          <a:p>
-            <a:pPr marL="0" indent="-285750" algn="l">
-              <a:lnSpc>
-                <a:spcPct val="200000"/>
-              </a:lnSpc>
-              <a:buFont typeface="Wingdings" panose="05000000000000000000" pitchFamily="2" charset="2"/>
-              <a:buChar char="§"/>
-            </a:pPr>
-            <a:r>
-              <a:rPr lang="en-GB" sz="1600" dirty="0" smtClean="0">
-                <a:solidFill>
-                  <a:schemeClr val="tx1"/>
-                </a:solidFill>
-                <a:latin typeface="Montserrat" panose="00000500000000000000" pitchFamily="2" charset="-52"/>
-              </a:rPr>
-              <a:t>C#/Java </a:t>
-            </a:r>
-            <a:r>
-              <a:rPr lang="bg-BG" sz="1600" dirty="0" smtClean="0">
-                <a:solidFill>
-                  <a:schemeClr val="tx1"/>
-                </a:solidFill>
-                <a:latin typeface="Montserrat" panose="00000500000000000000" pitchFamily="2" charset="-52"/>
-              </a:rPr>
-              <a:t>ентусиаст</a:t>
-            </a:r>
-            <a:endParaRPr lang="en-GB" sz="1600" dirty="0" smtClean="0">
-              <a:solidFill>
-                <a:schemeClr val="tx1"/>
-              </a:solidFill>
-              <a:latin typeface="Montserrat" panose="00000500000000000000" pitchFamily="2" charset="-52"/>
-            </a:endParaRPr>
-          </a:p>
-          <a:p>
-            <a:pPr marL="0" indent="-285750" algn="l">
-              <a:lnSpc>
-                <a:spcPct val="200000"/>
-              </a:lnSpc>
-              <a:buFont typeface="Wingdings" panose="05000000000000000000" pitchFamily="2" charset="2"/>
-              <a:buChar char="§"/>
-            </a:pPr>
-            <a:r>
-              <a:rPr lang="bg-BG" sz="1600" dirty="0">
-                <a:solidFill>
-                  <a:schemeClr val="tx1"/>
-                </a:solidFill>
-                <a:latin typeface="Montserrat" panose="00000500000000000000" pitchFamily="2" charset="-52"/>
-              </a:rPr>
-              <a:t>Страст към </a:t>
-            </a:r>
-            <a:r>
-              <a:rPr lang="bg-BG" sz="1600" dirty="0" smtClean="0">
-                <a:solidFill>
-                  <a:schemeClr val="tx1"/>
-                </a:solidFill>
-                <a:latin typeface="Montserrat" panose="00000500000000000000" pitchFamily="2" charset="-52"/>
-              </a:rPr>
-              <a:t>програмирането</a:t>
-            </a:r>
-            <a:endParaRPr lang="en-GB" sz="1600" dirty="0" smtClean="0">
-              <a:solidFill>
-                <a:schemeClr val="tx1"/>
-              </a:solidFill>
-              <a:latin typeface="Montserrat" panose="00000500000000000000" pitchFamily="2" charset="-52"/>
-            </a:endParaRPr>
-          </a:p>
-          <a:p>
-            <a:pPr marL="285750" indent="-285750" algn="l">
-              <a:lnSpc>
-                <a:spcPct val="200000"/>
-              </a:lnSpc>
-              <a:buFont typeface="Wingdings" panose="05000000000000000000" pitchFamily="2" charset="2"/>
-              <a:buChar char="§"/>
-            </a:pPr>
-            <a:endParaRPr lang="bg-BG" sz="1600" dirty="0" smtClean="0">
-              <a:solidFill>
-                <a:schemeClr val="tx1"/>
-              </a:solidFill>
-              <a:latin typeface="Montserrat" panose="00000500000000000000" pitchFamily="2" charset="-52"/>
-            </a:endParaRPr>
-          </a:p>
-        </p:txBody>
-      </p:sp>
-      <p:pic>
-        <p:nvPicPr>
-          <p:cNvPr id="5" name="Picture 4"/>
-          <p:cNvPicPr>
-            <a:picLocks noChangeAspect="1"/>
-          </p:cNvPicPr>
-          <p:nvPr/>
-        </p:nvPicPr>
-        <p:blipFill rotWithShape="1">
-          <a:blip r:embed="rId2">
-            <a:extLst>
-              <a:ext uri="{28A0092B-C50C-407E-A947-70E740481C1C}">
-                <a14:useLocalDpi xmlns:a14="http://schemas.microsoft.com/office/drawing/2010/main" val="0"/>
-              </a:ext>
-            </a:extLst>
-          </a:blip>
-          <a:srcRect l="771" t="3438" r="-771" b="-3438"/>
-          <a:stretch/>
-        </p:blipFill>
-        <p:spPr>
-          <a:xfrm>
-            <a:off x="5688304" y="874930"/>
-            <a:ext cx="2560563" cy="3636000"/>
-          </a:xfrm>
-          <a:prstGeom prst="rect">
-            <a:avLst/>
-          </a:prstGeom>
-          <a:ln>
-            <a:noFill/>
-          </a:ln>
-          <a:effectLst>
-            <a:outerShdw blurRad="292100" dist="139700" dir="2700000" algn="tl" rotWithShape="0">
-              <a:srgbClr val="333333">
-                <a:alpha val="65000"/>
-              </a:srgbClr>
-            </a:outerShdw>
-          </a:effectLst>
-        </p:spPr>
-      </p:pic>
-    </p:spTree>
-    <p:extLst>
-      <p:ext uri="{BB962C8B-B14F-4D97-AF65-F5344CB8AC3E}">
-        <p14:creationId xmlns:p14="http://schemas.microsoft.com/office/powerpoint/2010/main" val="3354559788"/>
-      </p:ext>
-    </p:extLst>
-  </p:cSld>
-  <p:clrMapOvr>
-    <a:masterClrMapping/>
-  </p:clrMapOvr>
-  <p:timing>
-    <p:tnLst>
-      <p:par>
-        <p:cTn id="1" dur="indefinite" restart="never" nodeType="tmRoot"/>
-      </p:par>
-    </p:tnLst>
-  </p:timing>
-</p:sld>
-</file>
-
-<file path=ppt/slides/slide3.xml><?xml version="1.0" encoding="utf-8"?>
-<p:sld xmlns:a="http://schemas.openxmlformats.org/drawingml/2006/main" xmlns:r="http://schemas.openxmlformats.org/officeDocument/2006/relationships" xmlns:p="http://schemas.openxmlformats.org/presentationml/2006/main">
-  <p:cSld>
     <p:bg>
       <p:bgPr>
         <a:solidFill>
@@ -10890,7 +10084,7 @@
 </p:sld>
 </file>
 
-<file path=ppt/slides/slide4.xml><?xml version="1.0" encoding="utf-8"?>
+<file path=ppt/slides/slide3.xml><?xml version="1.0" encoding="utf-8"?>
 <p:sld xmlns:a="http://schemas.openxmlformats.org/drawingml/2006/main" xmlns:r="http://schemas.openxmlformats.org/officeDocument/2006/relationships" xmlns:p="http://schemas.openxmlformats.org/presentationml/2006/main">
   <p:cSld>
     <p:bg>
@@ -15028,7 +14222,7 @@
 </p:sld>
 </file>
 
-<file path=ppt/slides/slide5.xml><?xml version="1.0" encoding="utf-8"?>
+<file path=ppt/slides/slide4.xml><?xml version="1.0" encoding="utf-8"?>
 <p:sld xmlns:a="http://schemas.openxmlformats.org/drawingml/2006/main" xmlns:r="http://schemas.openxmlformats.org/officeDocument/2006/relationships" xmlns:p="http://schemas.openxmlformats.org/presentationml/2006/main">
   <p:cSld>
     <p:spTree>
@@ -15146,20 +14340,7 @@
                 <a:effectLst/>
                 <a:latin typeface="Montserrat" panose="00000500000000000000" pitchFamily="2" charset="-52"/>
               </a:rPr>
-              <a:t> </a:t>
-            </a:r>
-            <a:r>
-              <a:rPr kumimoji="0" lang="bg-BG" altLang="en-US" sz="3200" b="1" i="0" u="none" strike="noStrike" cap="none" normalizeH="0" dirty="0" smtClean="0">
-                <a:ln>
-                  <a:noFill/>
-                </a:ln>
-                <a:solidFill>
-                  <a:schemeClr val="tx1"/>
-                </a:solidFill>
-                <a:effectLst/>
-                <a:latin typeface="Montserrat" panose="00000500000000000000" pitchFamily="2" charset="-52"/>
-              </a:rPr>
-              <a:t>набор</a:t>
+              <a:t> набор</a:t>
             </a:r>
             <a:endParaRPr kumimoji="0" lang="bg-BG" altLang="en-US" sz="6000" b="1" i="0" u="none" strike="noStrike" cap="none" normalizeH="0" baseline="0" dirty="0" smtClean="0">
               <a:ln>
@@ -15196,7 +14377,7 @@
         </p:blipFill>
         <p:spPr>
           <a:xfrm>
-            <a:off x="765992" y="1909302"/>
+            <a:off x="765992" y="1597950"/>
             <a:ext cx="892798" cy="1004400"/>
           </a:xfrm>
           <a:prstGeom prst="rect">
@@ -15226,7 +14407,7 @@
         </p:blipFill>
         <p:spPr>
           <a:xfrm>
-            <a:off x="4131247" y="1909476"/>
+            <a:off x="710278" y="3390798"/>
             <a:ext cx="1004226" cy="1004226"/>
           </a:xfrm>
           <a:prstGeom prst="rect">
@@ -15262,7 +14443,7 @@
         </p:blipFill>
         <p:spPr>
           <a:xfrm>
-            <a:off x="5738101" y="3535089"/>
+            <a:off x="4054260" y="3572079"/>
             <a:ext cx="1057748" cy="842893"/>
           </a:xfrm>
           <a:prstGeom prst="rect">
@@ -15292,7 +14473,7 @@
         </p:blipFill>
         <p:spPr>
           <a:xfrm>
-            <a:off x="7246086" y="1883062"/>
+            <a:off x="7507478" y="1597950"/>
             <a:ext cx="1004400" cy="1004400"/>
           </a:xfrm>
           <a:prstGeom prst="rect">
@@ -15322,8 +14503,32 @@
         </p:blipFill>
         <p:spPr>
           <a:xfrm>
-            <a:off x="1658790" y="3180288"/>
+            <a:off x="6748952" y="3302585"/>
             <a:ext cx="2472457" cy="1341983"/>
+          </a:xfrm>
+          <a:prstGeom prst="rect">
+            <a:avLst/>
+          </a:prstGeom>
+        </p:spPr>
+      </p:pic>
+      <p:pic>
+        <p:nvPicPr>
+          <p:cNvPr id="2" name="Picture 1"/>
+          <p:cNvPicPr>
+            <a:picLocks noChangeAspect="1"/>
+          </p:cNvPicPr>
+          <p:nvPr/>
+        </p:nvPicPr>
+        <p:blipFill>
+          <a:blip r:embed="rId8"/>
+          <a:stretch>
+            <a:fillRect/>
+          </a:stretch>
+        </p:blipFill>
+        <p:spPr>
+          <a:xfrm>
+            <a:off x="4079134" y="1594350"/>
+            <a:ext cx="1008000" cy="1008000"/>
           </a:xfrm>
           <a:prstGeom prst="rect">
             <a:avLst/>
@@ -15350,7 +14555,7 @@
 </p:sld>
 </file>
 
-<file path=ppt/slides/slide6.xml><?xml version="1.0" encoding="utf-8"?>
+<file path=ppt/slides/slide5.xml><?xml version="1.0" encoding="utf-8"?>
 <p:sld xmlns:a="http://schemas.openxmlformats.org/drawingml/2006/main" xmlns:r="http://schemas.openxmlformats.org/officeDocument/2006/relationships" xmlns:p="http://schemas.openxmlformats.org/presentationml/2006/main">
   <p:cSld>
     <p:spTree>
@@ -15418,7 +14623,7 @@
 </p:sld>
 </file>
 
-<file path=ppt/slides/slide7.xml><?xml version="1.0" encoding="utf-8"?>
+<file path=ppt/slides/slide6.xml><?xml version="1.0" encoding="utf-8"?>
 <p:sld xmlns:a="http://schemas.openxmlformats.org/drawingml/2006/main" xmlns:r="http://schemas.openxmlformats.org/officeDocument/2006/relationships" xmlns:p="http://schemas.openxmlformats.org/presentationml/2006/main">
   <p:cSld>
     <p:spTree>

</xml_diff>

<commit_message>
Finalize readme and finalize presentation
</commit_message>
<xml_diff>
--- a/documents/Zira - Presentation.pptx
+++ b/documents/Zira - Presentation.pptx
@@ -5,32 +5,34 @@
     <p:sldMasterId id="2147483660" r:id="rId1"/>
   </p:sldMasterIdLst>
   <p:notesMasterIdLst>
-    <p:notesMasterId r:id="rId8"/>
+    <p:notesMasterId r:id="rId10"/>
   </p:notesMasterIdLst>
   <p:sldIdLst>
     <p:sldId id="256" r:id="rId2"/>
     <p:sldId id="272" r:id="rId3"/>
     <p:sldId id="294" r:id="rId4"/>
-    <p:sldId id="293" r:id="rId5"/>
-    <p:sldId id="292" r:id="rId6"/>
-    <p:sldId id="291" r:id="rId7"/>
+    <p:sldId id="295" r:id="rId5"/>
+    <p:sldId id="293" r:id="rId6"/>
+    <p:sldId id="296" r:id="rId7"/>
+    <p:sldId id="292" r:id="rId8"/>
+    <p:sldId id="291" r:id="rId9"/>
   </p:sldIdLst>
   <p:sldSz cx="9144000" cy="5143500" type="screen16x9"/>
   <p:notesSz cx="6858000" cy="9144000"/>
   <p:embeddedFontLst>
     <p:embeddedFont>
       <p:font typeface="Fira Sans" panose="020B0604020202020204" charset="0"/>
-      <p:regular r:id="rId9"/>
-      <p:bold r:id="rId10"/>
-      <p:italic r:id="rId11"/>
-      <p:boldItalic r:id="rId12"/>
+      <p:regular r:id="rId11"/>
+      <p:bold r:id="rId12"/>
+      <p:italic r:id="rId13"/>
+      <p:boldItalic r:id="rId14"/>
     </p:embeddedFont>
     <p:embeddedFont>
-      <p:font typeface="Montserrat" panose="00000500000000000000" pitchFamily="2" charset="-52"/>
-      <p:regular r:id="rId13"/>
-      <p:bold r:id="rId14"/>
-      <p:italic r:id="rId15"/>
-      <p:boldItalic r:id="rId16"/>
+      <p:font typeface="Montserrat" panose="020B0604020202020204" charset="0"/>
+      <p:regular r:id="rId15"/>
+      <p:bold r:id="rId16"/>
+      <p:italic r:id="rId17"/>
+      <p:boldItalic r:id="rId18"/>
     </p:embeddedFont>
   </p:embeddedFontLst>
   <p:defaultTextStyle>
@@ -934,6 +936,24 @@
           </a:bodyPr>
           <a:lstStyle/>
           <a:p>
+            <a:r>
+              <a:rPr lang="ru-RU" dirty="0"/>
+              <a:t>Създаването на собствено приложение ни позволява пълен контрол върху интерфейса и функциите, които предоставяме на потребителя.</a:t>
+            </a:r>
+          </a:p>
+          <a:p>
+            <a:r>
+              <a:rPr lang="ru-RU" dirty="0"/>
+              <a:t>Всеки потребител има свой собствен профил и данни, които се обработват сигурно.</a:t>
+            </a:r>
+          </a:p>
+          <a:p>
+            <a:r>
+              <a:rPr lang="ru-RU" dirty="0"/>
+              <a:t>Използвани са добри практики при структуриране на бизнес логика, архитектура и слоев модел.</a:t>
+            </a:r>
+          </a:p>
+          <a:p>
             <a:pPr marL="0" lvl="0" indent="0" algn="l" rtl="0">
               <a:spcBef>
                 <a:spcPts val="0"/>
@@ -943,7 +963,7 @@
               </a:spcAft>
               <a:buNone/>
             </a:pPr>
-            <a:endParaRPr/>
+            <a:endParaRPr dirty="0"/>
           </a:p>
         </p:txBody>
       </p:sp>
@@ -1038,6 +1058,24 @@
           </a:bodyPr>
           <a:lstStyle/>
           <a:p>
+            <a:r>
+              <a:rPr lang="ru-RU" dirty="0"/>
+              <a:t>Създаването на собствено приложение ни позволява пълен контрол върху интерфейса и функциите, които предоставяме на потребителя.</a:t>
+            </a:r>
+          </a:p>
+          <a:p>
+            <a:r>
+              <a:rPr lang="ru-RU" dirty="0"/>
+              <a:t>Всеки потребител има свой собствен профил и данни, които се обработват сигурно.</a:t>
+            </a:r>
+          </a:p>
+          <a:p>
+            <a:r>
+              <a:rPr lang="ru-RU" dirty="0"/>
+              <a:t>Използвани са добри практики при структуриране на бизнес логика, архитектура и слоев модел.</a:t>
+            </a:r>
+          </a:p>
+          <a:p>
             <a:pPr marL="0" lvl="0" indent="0" algn="l" rtl="0">
               <a:spcBef>
                 <a:spcPts val="0"/>
@@ -1047,7 +1085,7 @@
               </a:spcAft>
               <a:buNone/>
             </a:pPr>
-            <a:endParaRPr/>
+            <a:endParaRPr dirty="0"/>
           </a:p>
         </p:txBody>
       </p:sp>
@@ -1055,6 +1093,301 @@
     <p:extLst>
       <p:ext uri="{BB962C8B-B14F-4D97-AF65-F5344CB8AC3E}">
         <p14:creationId xmlns:p14="http://schemas.microsoft.com/office/powerpoint/2010/main" val="135952408"/>
+      </p:ext>
+    </p:extLst>
+  </p:cSld>
+  <p:clrMapOvr>
+    <a:masterClrMapping/>
+  </p:clrMapOvr>
+</p:notes>
+</file>
+
+<file path=ppt/notesSlides/notesSlide4.xml><?xml version="1.0" encoding="utf-8"?>
+<p:notes xmlns:a="http://schemas.openxmlformats.org/drawingml/2006/main" xmlns:r="http://schemas.openxmlformats.org/officeDocument/2006/relationships" xmlns:p="http://schemas.openxmlformats.org/presentationml/2006/main" showMasterSp="0" showMasterPhAnim="0">
+  <p:cSld>
+    <p:spTree>
+      <p:nvGrpSpPr>
+        <p:cNvPr id="1" name="Shape 911"/>
+        <p:cNvGrpSpPr/>
+        <p:nvPr/>
+      </p:nvGrpSpPr>
+      <p:grpSpPr>
+        <a:xfrm>
+          <a:off x="0" y="0"/>
+          <a:ext cx="0" cy="0"/>
+          <a:chOff x="0" y="0"/>
+          <a:chExt cx="0" cy="0"/>
+        </a:xfrm>
+      </p:grpSpPr>
+      <p:sp>
+        <p:nvSpPr>
+          <p:cNvPr id="912" name="Google Shape;912;g92701b84aa_0_221:notes"/>
+          <p:cNvSpPr>
+            <a:spLocks noGrp="1" noRot="1" noChangeAspect="1"/>
+          </p:cNvSpPr>
+          <p:nvPr>
+            <p:ph type="sldImg" idx="2"/>
+          </p:nvPr>
+        </p:nvSpPr>
+        <p:spPr>
+          <a:xfrm>
+            <a:off x="381000" y="685800"/>
+            <a:ext cx="6096000" cy="3429000"/>
+          </a:xfrm>
+          <a:custGeom>
+            <a:avLst/>
+            <a:gdLst/>
+            <a:ahLst/>
+            <a:cxnLst/>
+            <a:rect l="l" t="t" r="r" b="b"/>
+            <a:pathLst>
+              <a:path w="120000" h="120000" extrusionOk="0">
+                <a:moveTo>
+                  <a:pt x="0" y="0"/>
+                </a:moveTo>
+                <a:lnTo>
+                  <a:pt x="120000" y="0"/>
+                </a:lnTo>
+                <a:lnTo>
+                  <a:pt x="120000" y="120000"/>
+                </a:lnTo>
+                <a:lnTo>
+                  <a:pt x="0" y="120000"/>
+                </a:lnTo>
+                <a:close/>
+              </a:path>
+            </a:pathLst>
+          </a:custGeom>
+        </p:spPr>
+      </p:sp>
+      <p:sp>
+        <p:nvSpPr>
+          <p:cNvPr id="913" name="Google Shape;913;g92701b84aa_0_221:notes"/>
+          <p:cNvSpPr txBox="1">
+            <a:spLocks noGrp="1"/>
+          </p:cNvSpPr>
+          <p:nvPr>
+            <p:ph type="body" idx="1"/>
+          </p:nvPr>
+        </p:nvSpPr>
+        <p:spPr>
+          <a:xfrm>
+            <a:off x="685800" y="4343400"/>
+            <a:ext cx="5486400" cy="4114800"/>
+          </a:xfrm>
+          <a:prstGeom prst="rect">
+            <a:avLst/>
+          </a:prstGeom>
+        </p:spPr>
+        <p:txBody>
+          <a:bodyPr spcFirstLastPara="1" wrap="square" lIns="91425" tIns="91425" rIns="91425" bIns="91425" anchor="t" anchorCtr="0">
+            <a:noAutofit/>
+          </a:bodyPr>
+          <a:lstStyle/>
+          <a:p>
+            <a:r>
+              <a:rPr lang="ru-RU" dirty="0"/>
+              <a:t>През последните години темата за личните финанси стана по-важна от всякога, особено след инфлационните вълни и икономическите предизвикателства.</a:t>
+            </a:r>
+          </a:p>
+          <a:p>
+            <a:r>
+              <a:rPr lang="ru-RU" dirty="0"/>
+              <a:t>Всекидневни решения като "Колко мога да похарча този месец?" или "Ще имам ли спестявания до края на годината?" често остават без ясен отговор.</a:t>
+            </a:r>
+          </a:p>
+          <a:p>
+            <a:r>
+              <a:rPr lang="ru-RU" dirty="0"/>
+              <a:t>Хората използват много различни начини – от бележки в телефона до електронни таблици, но малко от тях са ефективни или удобни.</a:t>
+            </a:r>
+          </a:p>
+          <a:p>
+            <a:r>
+              <a:rPr lang="ru-RU" dirty="0"/>
+              <a:t>Много потребители се чувстват демотивирани или претоварени от сложни интерфейси и финансови термини.</a:t>
+            </a:r>
+          </a:p>
+          <a:p>
+            <a:r>
+              <a:rPr lang="ru-RU" dirty="0"/>
+              <a:t>Проблемът не е само в събирането на данни, а в липсата на смислена структура, анализ и поведение, базирано на навици.</a:t>
+            </a:r>
+          </a:p>
+          <a:p>
+            <a:r>
+              <a:rPr lang="ru-RU" dirty="0"/>
+              <a:t>Приложенията често не отговарят на личните нужди – например някои хора искат само да следят разходите си, а не да планират в детайли.</a:t>
+            </a:r>
+          </a:p>
+        </p:txBody>
+      </p:sp>
+    </p:spTree>
+    <p:extLst>
+      <p:ext uri="{BB962C8B-B14F-4D97-AF65-F5344CB8AC3E}">
+        <p14:creationId xmlns:p14="http://schemas.microsoft.com/office/powerpoint/2010/main" val="4167933622"/>
+      </p:ext>
+    </p:extLst>
+  </p:cSld>
+  <p:clrMapOvr>
+    <a:masterClrMapping/>
+  </p:clrMapOvr>
+</p:notes>
+</file>
+
+<file path=ppt/notesSlides/notesSlide5.xml><?xml version="1.0" encoding="utf-8"?>
+<p:notes xmlns:a="http://schemas.openxmlformats.org/drawingml/2006/main" xmlns:r="http://schemas.openxmlformats.org/officeDocument/2006/relationships" xmlns:p="http://schemas.openxmlformats.org/presentationml/2006/main">
+  <p:cSld>
+    <p:spTree>
+      <p:nvGrpSpPr>
+        <p:cNvPr id="1" name=""/>
+        <p:cNvGrpSpPr/>
+        <p:nvPr/>
+      </p:nvGrpSpPr>
+      <p:grpSpPr>
+        <a:xfrm>
+          <a:off x="0" y="0"/>
+          <a:ext cx="0" cy="0"/>
+          <a:chOff x="0" y="0"/>
+          <a:chExt cx="0" cy="0"/>
+        </a:xfrm>
+      </p:grpSpPr>
+      <p:sp>
+        <p:nvSpPr>
+          <p:cNvPr id="2" name="Slide Image Placeholder 1"/>
+          <p:cNvSpPr>
+            <a:spLocks noGrp="1" noRot="1" noChangeAspect="1"/>
+          </p:cNvSpPr>
+          <p:nvPr>
+            <p:ph type="sldImg"/>
+          </p:nvPr>
+        </p:nvSpPr>
+        <p:spPr/>
+      </p:sp>
+      <p:sp>
+        <p:nvSpPr>
+          <p:cNvPr id="3" name="Notes Placeholder 2"/>
+          <p:cNvSpPr>
+            <a:spLocks noGrp="1"/>
+          </p:cNvSpPr>
+          <p:nvPr>
+            <p:ph type="body" idx="1"/>
+          </p:nvPr>
+        </p:nvSpPr>
+        <p:spPr/>
+        <p:txBody>
+          <a:bodyPr/>
+          <a:lstStyle/>
+          <a:p>
+            <a:r>
+              <a:rPr lang="ru-RU" b="1" dirty="0"/>
+              <a:t>YNAB</a:t>
+            </a:r>
+            <a:r>
+              <a:rPr lang="ru-RU" dirty="0"/>
+              <a:t>: Силно ориентиран към месечно планиране. Има добра методология, но изисква платен абонамент и не е подходящ за всеки.</a:t>
+            </a:r>
+          </a:p>
+          <a:p>
+            <a:r>
+              <a:rPr lang="ru-RU" b="1" dirty="0"/>
+              <a:t>Mint</a:t>
+            </a:r>
+            <a:r>
+              <a:rPr lang="ru-RU" dirty="0"/>
+              <a:t>: Безплатно, с автоматично свързване с банкови сметки, но слаба поддръжка извън САЩ.</a:t>
+            </a:r>
+          </a:p>
+          <a:p>
+            <a:r>
+              <a:rPr lang="ru-RU" b="1" dirty="0"/>
+              <a:t>PocketGuard</a:t>
+            </a:r>
+            <a:r>
+              <a:rPr lang="ru-RU" dirty="0"/>
+              <a:t>: Опростен интерфейс, подходящ за нови потребители, но с ограничени възможности без платена версия.</a:t>
+            </a:r>
+          </a:p>
+          <a:p>
+            <a:r>
+              <a:rPr lang="ru-RU" b="1" dirty="0"/>
+              <a:t>Goodbudget / Spendee</a:t>
+            </a:r>
+            <a:r>
+              <a:rPr lang="ru-RU" dirty="0"/>
+              <a:t>: Подходящи за споделен бюджет (семейства), но често липсва персонализация или функции за напомняния и цели.</a:t>
+            </a:r>
+          </a:p>
+          <a:p>
+            <a:endParaRPr lang="en-US" dirty="0"/>
+          </a:p>
+        </p:txBody>
+      </p:sp>
+    </p:spTree>
+    <p:extLst>
+      <p:ext uri="{BB962C8B-B14F-4D97-AF65-F5344CB8AC3E}">
+        <p14:creationId xmlns:p14="http://schemas.microsoft.com/office/powerpoint/2010/main" val="800514931"/>
+      </p:ext>
+    </p:extLst>
+  </p:cSld>
+  <p:clrMapOvr>
+    <a:masterClrMapping/>
+  </p:clrMapOvr>
+</p:notes>
+</file>
+
+<file path=ppt/notesSlides/notesSlide6.xml><?xml version="1.0" encoding="utf-8"?>
+<p:notes xmlns:a="http://schemas.openxmlformats.org/drawingml/2006/main" xmlns:r="http://schemas.openxmlformats.org/officeDocument/2006/relationships" xmlns:p="http://schemas.openxmlformats.org/presentationml/2006/main">
+  <p:cSld>
+    <p:spTree>
+      <p:nvGrpSpPr>
+        <p:cNvPr id="1" name=""/>
+        <p:cNvGrpSpPr/>
+        <p:nvPr/>
+      </p:nvGrpSpPr>
+      <p:grpSpPr>
+        <a:xfrm>
+          <a:off x="0" y="0"/>
+          <a:ext cx="0" cy="0"/>
+          <a:chOff x="0" y="0"/>
+          <a:chExt cx="0" cy="0"/>
+        </a:xfrm>
+      </p:grpSpPr>
+      <p:sp>
+        <p:nvSpPr>
+          <p:cNvPr id="2" name="Slide Image Placeholder 1"/>
+          <p:cNvSpPr>
+            <a:spLocks noGrp="1" noRot="1" noChangeAspect="1"/>
+          </p:cNvSpPr>
+          <p:nvPr>
+            <p:ph type="sldImg"/>
+          </p:nvPr>
+        </p:nvSpPr>
+        <p:spPr/>
+      </p:sp>
+      <p:sp>
+        <p:nvSpPr>
+          <p:cNvPr id="3" name="Notes Placeholder 2"/>
+          <p:cNvSpPr>
+            <a:spLocks noGrp="1"/>
+          </p:cNvSpPr>
+          <p:nvPr>
+            <p:ph type="body" idx="1"/>
+          </p:nvPr>
+        </p:nvSpPr>
+        <p:spPr/>
+        <p:txBody>
+          <a:bodyPr/>
+          <a:lstStyle/>
+          <a:p>
+            <a:endParaRPr lang="en-US" dirty="0"/>
+          </a:p>
+        </p:txBody>
+      </p:sp>
+    </p:spTree>
+    <p:extLst>
+      <p:ext uri="{BB962C8B-B14F-4D97-AF65-F5344CB8AC3E}">
+        <p14:creationId xmlns:p14="http://schemas.microsoft.com/office/powerpoint/2010/main" val="293215403"/>
       </p:ext>
     </p:extLst>
   </p:cSld>
@@ -1454,239 +1787,6 @@
 </file>
 
 <file path=ppt/slideLayouts/slideLayout2.xml><?xml version="1.0" encoding="utf-8"?>
-<p:sldLayout xmlns:a="http://schemas.openxmlformats.org/drawingml/2006/main" xmlns:r="http://schemas.openxmlformats.org/officeDocument/2006/relationships" xmlns:p="http://schemas.openxmlformats.org/presentationml/2006/main" matchingName="Section header" type="secHead">
-  <p:cSld name="SECTION_HEADER">
-    <p:spTree>
-      <p:nvGrpSpPr>
-        <p:cNvPr id="1" name="Shape 13"/>
-        <p:cNvGrpSpPr/>
-        <p:nvPr/>
-      </p:nvGrpSpPr>
-      <p:grpSpPr>
-        <a:xfrm>
-          <a:off x="0" y="0"/>
-          <a:ext cx="0" cy="0"/>
-          <a:chOff x="0" y="0"/>
-          <a:chExt cx="0" cy="0"/>
-        </a:xfrm>
-      </p:grpSpPr>
-      <p:sp>
-        <p:nvSpPr>
-          <p:cNvPr id="14" name="Google Shape;14;p3"/>
-          <p:cNvSpPr txBox="1">
-            <a:spLocks noGrp="1"/>
-          </p:cNvSpPr>
-          <p:nvPr>
-            <p:ph type="title"/>
-          </p:nvPr>
-        </p:nvSpPr>
-        <p:spPr>
-          <a:xfrm>
-            <a:off x="311700" y="2150850"/>
-            <a:ext cx="8520600" cy="841800"/>
-          </a:xfrm>
-          <a:prstGeom prst="rect">
-            <a:avLst/>
-          </a:prstGeom>
-        </p:spPr>
-        <p:txBody>
-          <a:bodyPr spcFirstLastPara="1" wrap="square" lIns="91425" tIns="91425" rIns="91425" bIns="91425" anchor="ctr" anchorCtr="0">
-            <a:noAutofit/>
-          </a:bodyPr>
-          <a:lstStyle>
-            <a:lvl1pPr lvl="0" algn="ctr">
-              <a:spcBef>
-                <a:spcPts val="0"/>
-              </a:spcBef>
-              <a:spcAft>
-                <a:spcPts val="0"/>
-              </a:spcAft>
-              <a:buSzPts val="3600"/>
-              <a:buNone/>
-              <a:defRPr sz="3600"/>
-            </a:lvl1pPr>
-            <a:lvl2pPr lvl="1" algn="ctr">
-              <a:spcBef>
-                <a:spcPts val="0"/>
-              </a:spcBef>
-              <a:spcAft>
-                <a:spcPts val="0"/>
-              </a:spcAft>
-              <a:buSzPts val="3600"/>
-              <a:buNone/>
-              <a:defRPr sz="3600"/>
-            </a:lvl2pPr>
-            <a:lvl3pPr lvl="2" algn="ctr">
-              <a:spcBef>
-                <a:spcPts val="0"/>
-              </a:spcBef>
-              <a:spcAft>
-                <a:spcPts val="0"/>
-              </a:spcAft>
-              <a:buSzPts val="3600"/>
-              <a:buNone/>
-              <a:defRPr sz="3600"/>
-            </a:lvl3pPr>
-            <a:lvl4pPr lvl="3" algn="ctr">
-              <a:spcBef>
-                <a:spcPts val="0"/>
-              </a:spcBef>
-              <a:spcAft>
-                <a:spcPts val="0"/>
-              </a:spcAft>
-              <a:buSzPts val="3600"/>
-              <a:buNone/>
-              <a:defRPr sz="3600"/>
-            </a:lvl4pPr>
-            <a:lvl5pPr lvl="4" algn="ctr">
-              <a:spcBef>
-                <a:spcPts val="0"/>
-              </a:spcBef>
-              <a:spcAft>
-                <a:spcPts val="0"/>
-              </a:spcAft>
-              <a:buSzPts val="3600"/>
-              <a:buNone/>
-              <a:defRPr sz="3600"/>
-            </a:lvl5pPr>
-            <a:lvl6pPr lvl="5" algn="ctr">
-              <a:spcBef>
-                <a:spcPts val="0"/>
-              </a:spcBef>
-              <a:spcAft>
-                <a:spcPts val="0"/>
-              </a:spcAft>
-              <a:buSzPts val="3600"/>
-              <a:buNone/>
-              <a:defRPr sz="3600"/>
-            </a:lvl6pPr>
-            <a:lvl7pPr lvl="6" algn="ctr">
-              <a:spcBef>
-                <a:spcPts val="0"/>
-              </a:spcBef>
-              <a:spcAft>
-                <a:spcPts val="0"/>
-              </a:spcAft>
-              <a:buSzPts val="3600"/>
-              <a:buNone/>
-              <a:defRPr sz="3600"/>
-            </a:lvl7pPr>
-            <a:lvl8pPr lvl="7" algn="ctr">
-              <a:spcBef>
-                <a:spcPts val="0"/>
-              </a:spcBef>
-              <a:spcAft>
-                <a:spcPts val="0"/>
-              </a:spcAft>
-              <a:buSzPts val="3600"/>
-              <a:buNone/>
-              <a:defRPr sz="3600"/>
-            </a:lvl8pPr>
-            <a:lvl9pPr lvl="8" algn="ctr">
-              <a:spcBef>
-                <a:spcPts val="0"/>
-              </a:spcBef>
-              <a:spcAft>
-                <a:spcPts val="0"/>
-              </a:spcAft>
-              <a:buSzPts val="3600"/>
-              <a:buNone/>
-              <a:defRPr sz="3600"/>
-            </a:lvl9pPr>
-          </a:lstStyle>
-          <a:p>
-            <a:endParaRPr/>
-          </a:p>
-        </p:txBody>
-      </p:sp>
-      <p:sp>
-        <p:nvSpPr>
-          <p:cNvPr id="15" name="Google Shape;15;p3"/>
-          <p:cNvSpPr txBox="1">
-            <a:spLocks noGrp="1"/>
-          </p:cNvSpPr>
-          <p:nvPr>
-            <p:ph type="sldNum" idx="12"/>
-          </p:nvPr>
-        </p:nvSpPr>
-        <p:spPr>
-          <a:xfrm>
-            <a:off x="8472458" y="4663217"/>
-            <a:ext cx="548700" cy="393600"/>
-          </a:xfrm>
-          <a:prstGeom prst="rect">
-            <a:avLst/>
-          </a:prstGeom>
-        </p:spPr>
-        <p:txBody>
-          <a:bodyPr spcFirstLastPara="1" wrap="square" lIns="91425" tIns="91425" rIns="91425" bIns="91425" anchor="ctr" anchorCtr="0">
-            <a:noAutofit/>
-          </a:bodyPr>
-          <a:lstStyle>
-            <a:lvl1pPr lvl="0">
-              <a:buNone/>
-              <a:defRPr/>
-            </a:lvl1pPr>
-            <a:lvl2pPr lvl="1">
-              <a:buNone/>
-              <a:defRPr/>
-            </a:lvl2pPr>
-            <a:lvl3pPr lvl="2">
-              <a:buNone/>
-              <a:defRPr/>
-            </a:lvl3pPr>
-            <a:lvl4pPr lvl="3">
-              <a:buNone/>
-              <a:defRPr/>
-            </a:lvl4pPr>
-            <a:lvl5pPr lvl="4">
-              <a:buNone/>
-              <a:defRPr/>
-            </a:lvl5pPr>
-            <a:lvl6pPr lvl="5">
-              <a:buNone/>
-              <a:defRPr/>
-            </a:lvl6pPr>
-            <a:lvl7pPr lvl="6">
-              <a:buNone/>
-              <a:defRPr/>
-            </a:lvl7pPr>
-            <a:lvl8pPr lvl="7">
-              <a:buNone/>
-              <a:defRPr/>
-            </a:lvl8pPr>
-            <a:lvl9pPr lvl="8">
-              <a:buNone/>
-              <a:defRPr/>
-            </a:lvl9pPr>
-          </a:lstStyle>
-          <a:p>
-            <a:pPr marL="0" lvl="0" indent="0" algn="r" rtl="0">
-              <a:spcBef>
-                <a:spcPts val="0"/>
-              </a:spcBef>
-              <a:spcAft>
-                <a:spcPts val="0"/>
-              </a:spcAft>
-              <a:buNone/>
-            </a:pPr>
-            <a:fld id="{00000000-1234-1234-1234-123412341234}" type="slidenum">
-              <a:rPr lang="en"/>
-              <a:t>‹#›</a:t>
-            </a:fld>
-            <a:endParaRPr/>
-          </a:p>
-        </p:txBody>
-      </p:sp>
-    </p:spTree>
-  </p:cSld>
-  <p:clrMapOvr>
-    <a:masterClrMapping/>
-  </p:clrMapOvr>
-</p:sldLayout>
-</file>
-
-<file path=ppt/slideLayouts/slideLayout3.xml><?xml version="1.0" encoding="utf-8"?>
 <p:sldLayout xmlns:a="http://schemas.openxmlformats.org/drawingml/2006/main" xmlns:r="http://schemas.openxmlformats.org/officeDocument/2006/relationships" xmlns:p="http://schemas.openxmlformats.org/presentationml/2006/main" matchingName="Title and body" type="tx">
   <p:cSld name="TITLE_AND_BODY">
     <p:spTree>
@@ -2048,7 +2148,7 @@
 </p:sldLayout>
 </file>
 
-<file path=ppt/slideLayouts/slideLayout4.xml><?xml version="1.0" encoding="utf-8"?>
+<file path=ppt/slideLayouts/slideLayout3.xml><?xml version="1.0" encoding="utf-8"?>
 <p:sldLayout xmlns:a="http://schemas.openxmlformats.org/drawingml/2006/main" xmlns:r="http://schemas.openxmlformats.org/officeDocument/2006/relationships" xmlns:p="http://schemas.openxmlformats.org/presentationml/2006/main" matchingName="Title and two columns" type="twoColTx">
   <p:cSld name="TITLE_AND_TWO_COLUMNS">
     <p:spTree>
@@ -2539,7 +2639,7 @@
 </p:sldLayout>
 </file>
 
-<file path=ppt/slideLayouts/slideLayout5.xml><?xml version="1.0" encoding="utf-8"?>
+<file path=ppt/slideLayouts/slideLayout4.xml><?xml version="1.0" encoding="utf-8"?>
 <p:sldLayout xmlns:a="http://schemas.openxmlformats.org/drawingml/2006/main" xmlns:r="http://schemas.openxmlformats.org/officeDocument/2006/relationships" xmlns:p="http://schemas.openxmlformats.org/presentationml/2006/main" matchingName="One column text">
   <p:cSld name="ONE_COLUMN_TEXT">
     <p:spTree>
@@ -2901,7 +3001,7 @@
 </p:sldLayout>
 </file>
 
-<file path=ppt/slideLayouts/slideLayout6.xml><?xml version="1.0" encoding="utf-8"?>
+<file path=ppt/slideLayouts/slideLayout5.xml><?xml version="1.0" encoding="utf-8"?>
 <p:sldLayout xmlns:a="http://schemas.openxmlformats.org/drawingml/2006/main" xmlns:r="http://schemas.openxmlformats.org/officeDocument/2006/relationships" xmlns:p="http://schemas.openxmlformats.org/presentationml/2006/main" matchingName="Main point">
   <p:cSld name="MAIN_POINT">
     <p:spTree>
@@ -3134,7 +3234,7 @@
 </p:sldLayout>
 </file>
 
-<file path=ppt/slideLayouts/slideLayout7.xml><?xml version="1.0" encoding="utf-8"?>
+<file path=ppt/slideLayouts/slideLayout6.xml><?xml version="1.0" encoding="utf-8"?>
 <p:sldLayout xmlns:a="http://schemas.openxmlformats.org/drawingml/2006/main" xmlns:r="http://schemas.openxmlformats.org/officeDocument/2006/relationships" xmlns:p="http://schemas.openxmlformats.org/presentationml/2006/main" matchingName="Caption">
   <p:cSld name="CAPTION_ONLY">
     <p:spTree>
@@ -3282,7 +3382,7 @@
 </p:sldLayout>
 </file>
 
-<file path=ppt/slideLayouts/slideLayout8.xml><?xml version="1.0" encoding="utf-8"?>
+<file path=ppt/slideLayouts/slideLayout7.xml><?xml version="1.0" encoding="utf-8"?>
 <p:sldLayout xmlns:a="http://schemas.openxmlformats.org/drawingml/2006/main" xmlns:r="http://schemas.openxmlformats.org/officeDocument/2006/relationships" xmlns:p="http://schemas.openxmlformats.org/presentationml/2006/main" matchingName="Big number">
   <p:cSld name="BIG_NUMBER">
     <p:spTree>
@@ -3646,7 +3746,7 @@
 </p:sldLayout>
 </file>
 
-<file path=ppt/slideLayouts/slideLayout9.xml><?xml version="1.0" encoding="utf-8"?>
+<file path=ppt/slideLayouts/slideLayout8.xml><?xml version="1.0" encoding="utf-8"?>
 <p:sldLayout xmlns:a="http://schemas.openxmlformats.org/drawingml/2006/main" xmlns:r="http://schemas.openxmlformats.org/officeDocument/2006/relationships" xmlns:p="http://schemas.openxmlformats.org/presentationml/2006/main" matchingName="Blank" type="blank">
   <p:cSld name="BLANK">
     <p:spTree>
@@ -4318,14 +4418,13 @@
   <p:clrMap bg1="lt1" tx1="dk1" bg2="dk2" tx2="lt2" accent1="accent1" accent2="accent2" accent3="accent3" accent4="accent4" accent5="accent5" accent6="accent6" hlink="hlink" folHlink="folHlink"/>
   <p:sldLayoutIdLst>
     <p:sldLayoutId id="2147483648" r:id="rId1"/>
-    <p:sldLayoutId id="2147483649" r:id="rId2"/>
-    <p:sldLayoutId id="2147483650" r:id="rId3"/>
-    <p:sldLayoutId id="2147483651" r:id="rId4"/>
-    <p:sldLayoutId id="2147483653" r:id="rId5"/>
-    <p:sldLayoutId id="2147483654" r:id="rId6"/>
-    <p:sldLayoutId id="2147483656" r:id="rId7"/>
-    <p:sldLayoutId id="2147483657" r:id="rId8"/>
-    <p:sldLayoutId id="2147483658" r:id="rId9"/>
+    <p:sldLayoutId id="2147483650" r:id="rId2"/>
+    <p:sldLayoutId id="2147483651" r:id="rId3"/>
+    <p:sldLayoutId id="2147483653" r:id="rId4"/>
+    <p:sldLayoutId id="2147483654" r:id="rId5"/>
+    <p:sldLayoutId id="2147483656" r:id="rId6"/>
+    <p:sldLayoutId id="2147483657" r:id="rId7"/>
+    <p:sldLayoutId id="2147483658" r:id="rId8"/>
   </p:sldLayoutIdLst>
   <p:hf sldNum="0" hdr="0" ftr="0" dt="0"/>
   <p:txStyles>
@@ -5080,7 +5179,7 @@
               <a:buNone/>
             </a:pPr>
             <a:r>
-              <a:rPr lang="bg-BG" sz="1600" dirty="0" smtClean="0">
+              <a:rPr lang="bg-BG" sz="1600" dirty="0">
                 <a:latin typeface="Montserrat" panose="00000500000000000000" pitchFamily="2" charset="-52"/>
                 <a:ea typeface="Fira Sans"/>
                 <a:cs typeface="Fira Sans"/>
@@ -5132,7 +5231,7 @@
               <a:buNone/>
             </a:pPr>
             <a:r>
-              <a:rPr lang="en" sz="4000" b="1" dirty="0" smtClean="0">
+              <a:rPr lang="en" sz="4000" b="1" dirty="0">
                 <a:latin typeface="Montserrat" panose="00000500000000000000" pitchFamily="2" charset="-52"/>
                 <a:ea typeface="Fira Sans"/>
                 <a:cs typeface="Fira Sans"/>
@@ -5313,31 +5412,7 @@
                 <a:cs typeface="Fira Sans"/>
                 <a:sym typeface="Fira Sans"/>
               </a:rPr>
-              <a:t>2</a:t>
-            </a:r>
-            <a:r>
-              <a:rPr lang="en" sz="2000" b="1" dirty="0" smtClean="0">
-                <a:solidFill>
-                  <a:srgbClr val="4B85CF"/>
-                </a:solidFill>
-                <a:latin typeface="Fira Sans"/>
-                <a:ea typeface="Fira Sans"/>
-                <a:cs typeface="Fira Sans"/>
-                <a:sym typeface="Fira Sans"/>
-              </a:rPr>
-              <a:t>0</a:t>
-            </a:r>
-            <a:r>
-              <a:rPr lang="en" sz="2000" b="1" dirty="0">
-                <a:solidFill>
-                  <a:srgbClr val="4B85CF"/>
-                </a:solidFill>
-                <a:latin typeface="Fira Sans"/>
-                <a:ea typeface="Fira Sans"/>
-                <a:cs typeface="Fira Sans"/>
-                <a:sym typeface="Fira Sans"/>
-              </a:rPr>
-              <a:t>%</a:t>
+              <a:t>20%</a:t>
             </a:r>
             <a:endParaRPr sz="2000" b="1" dirty="0">
               <a:solidFill>
@@ -5934,13 +6009,6 @@
   <p:clrMapOvr>
     <a:masterClrMapping/>
   </p:clrMapOvr>
-  <p:timing>
-    <p:tnLst>
-      <p:par>
-        <p:cTn id="1" dur="indefinite" restart="never" nodeType="tmRoot"/>
-      </p:par>
-    </p:tnLst>
-  </p:timing>
 </p:sld>
 </file>
 
@@ -8318,7 +8386,7 @@
               <a:buNone/>
             </a:pPr>
             <a:r>
-              <a:rPr lang="bg-BG" sz="1700" b="1" dirty="0" smtClean="0">
+              <a:rPr lang="bg-BG" sz="1700" b="1" dirty="0">
                 <a:solidFill>
                   <a:srgbClr val="22C45E"/>
                 </a:solidFill>
@@ -9251,7 +9319,7 @@
                 <a:buNone/>
               </a:pPr>
               <a:r>
-                <a:rPr lang="bg-BG" sz="1700" b="1" dirty="0" smtClean="0">
+                <a:rPr lang="bg-BG" sz="1700" b="1" dirty="0">
                   <a:solidFill>
                     <a:srgbClr val="1AAD7A"/>
                   </a:solidFill>
@@ -9889,7 +9957,7 @@
                 <a:buNone/>
               </a:pPr>
               <a:r>
-                <a:rPr lang="bg-BG" sz="1700" b="1" dirty="0" smtClean="0">
+                <a:rPr lang="bg-BG" sz="1700" b="1" dirty="0">
                   <a:solidFill>
                     <a:srgbClr val="5EB2FC"/>
                   </a:solidFill>
@@ -9948,7 +10016,7 @@
               <a:buNone/>
             </a:pPr>
             <a:r>
-              <a:rPr lang="bg-BG" dirty="0" smtClean="0">
+              <a:rPr lang="bg-BG" dirty="0">
                 <a:latin typeface="Montserrat" panose="00000500000000000000" pitchFamily="2" charset="-52"/>
                 <a:ea typeface="Fira Sans"/>
                 <a:cs typeface="Fira Sans"/>
@@ -10000,7 +10068,7 @@
               <a:buNone/>
             </a:pPr>
             <a:r>
-              <a:rPr lang="bg-BG" dirty="0" smtClean="0">
+              <a:rPr lang="bg-BG" dirty="0">
                 <a:latin typeface="Montserrat" panose="00000500000000000000" pitchFamily="2" charset="-52"/>
                 <a:ea typeface="Fira Sans"/>
                 <a:cs typeface="Fira Sans"/>
@@ -10052,7 +10120,7 @@
               <a:buNone/>
             </a:pPr>
             <a:r>
-              <a:rPr lang="bg-BG" dirty="0" smtClean="0">
+              <a:rPr lang="bg-BG" dirty="0">
                 <a:latin typeface="Montserrat" panose="00000500000000000000" pitchFamily="2" charset="-52"/>
                 <a:ea typeface="Fira Sans"/>
                 <a:cs typeface="Fira Sans"/>
@@ -10074,13 +10142,6 @@
   <p:clrMapOvr>
     <a:masterClrMapping/>
   </p:clrMapOvr>
-  <p:timing>
-    <p:tnLst>
-      <p:par>
-        <p:cTn id="1" dur="indefinite" restart="never" nodeType="tmRoot"/>
-      </p:par>
-    </p:tnLst>
-  </p:timing>
 </p:sld>
 </file>
 
@@ -12450,7 +12511,7 @@
           <a:p>
             <a:pPr lvl="0" algn="ctr"/>
             <a:r>
-              <a:rPr lang="bg-BG" sz="1700" b="1" dirty="0" smtClean="0">
+              <a:rPr lang="bg-BG" sz="1700" b="1" dirty="0">
                 <a:solidFill>
                   <a:srgbClr val="22C45E"/>
                 </a:solidFill>
@@ -13383,7 +13444,7 @@
                 <a:buNone/>
               </a:pPr>
               <a:r>
-                <a:rPr lang="bg-BG" sz="1700" b="1" dirty="0" smtClean="0">
+                <a:rPr lang="bg-BG" sz="1700" b="1" dirty="0">
                   <a:solidFill>
                     <a:srgbClr val="1AAD7A"/>
                   </a:solidFill>
@@ -14021,7 +14082,7 @@
                 <a:buNone/>
               </a:pPr>
               <a:r>
-                <a:rPr lang="bg-BG" sz="1700" b="1" dirty="0" smtClean="0">
+                <a:rPr lang="bg-BG" sz="1700" b="1" dirty="0">
                   <a:solidFill>
                     <a:srgbClr val="5EB2FC"/>
                   </a:solidFill>
@@ -14080,7 +14141,7 @@
               <a:buNone/>
             </a:pPr>
             <a:r>
-              <a:rPr lang="bg-BG" dirty="0" smtClean="0">
+              <a:rPr lang="bg-BG" dirty="0">
                 <a:latin typeface="Montserrat" panose="00000500000000000000" pitchFamily="2" charset="-52"/>
                 <a:ea typeface="Fira Sans"/>
                 <a:cs typeface="Fira Sans"/>
@@ -14124,22 +14185,13 @@
           <a:p>
             <a:pPr lvl="0" algn="r"/>
             <a:r>
-              <a:rPr lang="bg-BG" dirty="0" smtClean="0">
-                <a:latin typeface="Montserrat" panose="00000500000000000000" pitchFamily="2" charset="-52"/>
-                <a:ea typeface="Fira Sans"/>
-                <a:cs typeface="Fira Sans"/>
-                <a:sym typeface="Fira Sans"/>
-              </a:rPr>
-              <a:t>Поддръжка </a:t>
-            </a:r>
-            <a:r>
               <a:rPr lang="bg-BG" dirty="0">
                 <a:latin typeface="Montserrat" panose="00000500000000000000" pitchFamily="2" charset="-52"/>
                 <a:ea typeface="Fira Sans"/>
                 <a:cs typeface="Fira Sans"/>
                 <a:sym typeface="Fira Sans"/>
               </a:rPr>
-              <a:t>на множество валути</a:t>
+              <a:t>Поддръжка на множество валути</a:t>
             </a:r>
             <a:endParaRPr sz="1200" dirty="0">
               <a:latin typeface="Montserrat" panose="00000500000000000000" pitchFamily="2" charset="-52"/>
@@ -14185,7 +14237,7 @@
               <a:buNone/>
             </a:pPr>
             <a:r>
-              <a:rPr lang="bg-BG" dirty="0" smtClean="0">
+              <a:rPr lang="bg-BG" dirty="0">
                 <a:latin typeface="Montserrat" panose="00000500000000000000" pitchFamily="2" charset="-52"/>
                 <a:ea typeface="Fira Sans"/>
                 <a:cs typeface="Fira Sans"/>
@@ -14212,17 +14264,666 @@
   <p:clrMapOvr>
     <a:masterClrMapping/>
   </p:clrMapOvr>
-  <p:timing>
-    <p:tnLst>
-      <p:par>
-        <p:cTn id="1" dur="indefinite" restart="never" nodeType="tmRoot"/>
-      </p:par>
-    </p:tnLst>
-  </p:timing>
 </p:sld>
 </file>
 
 <file path=ppt/slides/slide4.xml><?xml version="1.0" encoding="utf-8"?>
+<p:sld xmlns:a="http://schemas.openxmlformats.org/drawingml/2006/main" xmlns:r="http://schemas.openxmlformats.org/officeDocument/2006/relationships" xmlns:p="http://schemas.openxmlformats.org/presentationml/2006/main">
+  <p:cSld>
+    <p:bg>
+      <p:bgPr>
+        <a:solidFill>
+          <a:schemeClr val="lt1"/>
+        </a:solidFill>
+        <a:effectLst/>
+      </p:bgPr>
+    </p:bg>
+    <p:spTree>
+      <p:nvGrpSpPr>
+        <p:cNvPr id="1" name="Shape 914"/>
+        <p:cNvGrpSpPr/>
+        <p:nvPr/>
+      </p:nvGrpSpPr>
+      <p:grpSpPr>
+        <a:xfrm>
+          <a:off x="0" y="0"/>
+          <a:ext cx="0" cy="0"/>
+          <a:chOff x="0" y="0"/>
+          <a:chExt cx="0" cy="0"/>
+        </a:xfrm>
+      </p:grpSpPr>
+      <p:sp>
+        <p:nvSpPr>
+          <p:cNvPr id="916" name="Google Shape;916;p31"/>
+          <p:cNvSpPr txBox="1"/>
+          <p:nvPr/>
+        </p:nvSpPr>
+        <p:spPr>
+          <a:xfrm>
+            <a:off x="378550" y="99903"/>
+            <a:ext cx="8229600" cy="748780"/>
+          </a:xfrm>
+          <a:prstGeom prst="rect">
+            <a:avLst/>
+          </a:prstGeom>
+          <a:noFill/>
+          <a:ln>
+            <a:noFill/>
+          </a:ln>
+        </p:spPr>
+        <p:txBody>
+          <a:bodyPr spcFirstLastPara="1" wrap="square" lIns="91425" tIns="91425" rIns="91425" bIns="91425" anchor="ctr" anchorCtr="0">
+            <a:noAutofit/>
+          </a:bodyPr>
+          <a:lstStyle/>
+          <a:p>
+            <a:pPr lvl="0" algn="ctr"/>
+            <a:r>
+              <a:rPr lang="bg-BG" sz="3200" b="1" dirty="0">
+                <a:latin typeface="Montserrat" panose="00000500000000000000" pitchFamily="2" charset="-52"/>
+                <a:ea typeface="Fira Sans"/>
+                <a:cs typeface="Fira Sans"/>
+                <a:sym typeface="Fira Sans"/>
+              </a:rPr>
+              <a:t>Актуалност на темата</a:t>
+            </a:r>
+            <a:endParaRPr sz="2800" b="1" dirty="0">
+              <a:latin typeface="Montserrat" panose="00000500000000000000" pitchFamily="2" charset="-52"/>
+              <a:ea typeface="Fira Sans"/>
+              <a:cs typeface="Fira Sans"/>
+              <a:sym typeface="Fira Sans"/>
+            </a:endParaRPr>
+          </a:p>
+        </p:txBody>
+      </p:sp>
+      <p:sp>
+        <p:nvSpPr>
+          <p:cNvPr id="918" name="Google Shape;918;p31"/>
+          <p:cNvSpPr/>
+          <p:nvPr/>
+        </p:nvSpPr>
+        <p:spPr>
+          <a:xfrm>
+            <a:off x="3148650" y="5443487"/>
+            <a:ext cx="2690772" cy="2022102"/>
+          </a:xfrm>
+          <a:custGeom>
+            <a:avLst/>
+            <a:gdLst/>
+            <a:ahLst/>
+            <a:cxnLst/>
+            <a:rect l="l" t="t" r="r" b="b"/>
+            <a:pathLst>
+              <a:path w="69065" h="51902" extrusionOk="0">
+                <a:moveTo>
+                  <a:pt x="34577" y="0"/>
+                </a:moveTo>
+                <a:lnTo>
+                  <a:pt x="1" y="34577"/>
+                </a:lnTo>
+                <a:lnTo>
+                  <a:pt x="26683" y="49892"/>
+                </a:lnTo>
+                <a:lnTo>
+                  <a:pt x="27121" y="50142"/>
+                </a:lnTo>
+                <a:lnTo>
+                  <a:pt x="28005" y="50571"/>
+                </a:lnTo>
+                <a:lnTo>
+                  <a:pt x="28916" y="50946"/>
+                </a:lnTo>
+                <a:lnTo>
+                  <a:pt x="29845" y="51258"/>
+                </a:lnTo>
+                <a:lnTo>
+                  <a:pt x="30791" y="51508"/>
+                </a:lnTo>
+                <a:lnTo>
+                  <a:pt x="31738" y="51705"/>
+                </a:lnTo>
+                <a:lnTo>
+                  <a:pt x="32702" y="51830"/>
+                </a:lnTo>
+                <a:lnTo>
+                  <a:pt x="33667" y="51892"/>
+                </a:lnTo>
+                <a:lnTo>
+                  <a:pt x="34631" y="51901"/>
+                </a:lnTo>
+                <a:lnTo>
+                  <a:pt x="35595" y="51839"/>
+                </a:lnTo>
+                <a:lnTo>
+                  <a:pt x="36560" y="51723"/>
+                </a:lnTo>
+                <a:lnTo>
+                  <a:pt x="37515" y="51535"/>
+                </a:lnTo>
+                <a:lnTo>
+                  <a:pt x="38453" y="51294"/>
+                </a:lnTo>
+                <a:lnTo>
+                  <a:pt x="39382" y="50990"/>
+                </a:lnTo>
+                <a:lnTo>
+                  <a:pt x="40293" y="50624"/>
+                </a:lnTo>
+                <a:lnTo>
+                  <a:pt x="41195" y="50196"/>
+                </a:lnTo>
+                <a:lnTo>
+                  <a:pt x="41623" y="49954"/>
+                </a:lnTo>
+                <a:lnTo>
+                  <a:pt x="69065" y="34488"/>
+                </a:lnTo>
+                <a:lnTo>
+                  <a:pt x="34577" y="0"/>
+                </a:lnTo>
+                <a:close/>
+              </a:path>
+            </a:pathLst>
+          </a:custGeom>
+          <a:solidFill>
+            <a:srgbClr val="4B85CF"/>
+          </a:solidFill>
+          <a:ln>
+            <a:noFill/>
+          </a:ln>
+        </p:spPr>
+        <p:txBody>
+          <a:bodyPr spcFirstLastPara="1" wrap="square" lIns="91425" tIns="91425" rIns="91425" bIns="91425" anchor="ctr" anchorCtr="0">
+            <a:noAutofit/>
+          </a:bodyPr>
+          <a:lstStyle/>
+          <a:p>
+            <a:pPr marL="0" lvl="0" indent="0" algn="l" rtl="0">
+              <a:spcBef>
+                <a:spcPts val="0"/>
+              </a:spcBef>
+              <a:spcAft>
+                <a:spcPts val="0"/>
+              </a:spcAft>
+              <a:buNone/>
+            </a:pPr>
+            <a:endParaRPr>
+              <a:latin typeface="Montserrat" panose="00000500000000000000" pitchFamily="2" charset="-52"/>
+            </a:endParaRPr>
+          </a:p>
+        </p:txBody>
+      </p:sp>
+      <p:sp>
+        <p:nvSpPr>
+          <p:cNvPr id="924" name="Google Shape;924;p31"/>
+          <p:cNvSpPr/>
+          <p:nvPr/>
+        </p:nvSpPr>
+        <p:spPr>
+          <a:xfrm>
+            <a:off x="3444742" y="5382944"/>
+            <a:ext cx="2109061" cy="1579205"/>
+          </a:xfrm>
+          <a:custGeom>
+            <a:avLst/>
+            <a:gdLst/>
+            <a:ahLst/>
+            <a:cxnLst/>
+            <a:rect l="l" t="t" r="r" b="b"/>
+            <a:pathLst>
+              <a:path w="54134" h="40534" extrusionOk="0">
+                <a:moveTo>
+                  <a:pt x="26995" y="0"/>
+                </a:moveTo>
+                <a:lnTo>
+                  <a:pt x="0" y="26987"/>
+                </a:lnTo>
+                <a:lnTo>
+                  <a:pt x="19771" y="38489"/>
+                </a:lnTo>
+                <a:lnTo>
+                  <a:pt x="20217" y="38748"/>
+                </a:lnTo>
+                <a:lnTo>
+                  <a:pt x="21128" y="39194"/>
+                </a:lnTo>
+                <a:lnTo>
+                  <a:pt x="22066" y="39578"/>
+                </a:lnTo>
+                <a:lnTo>
+                  <a:pt x="23021" y="39899"/>
+                </a:lnTo>
+                <a:lnTo>
+                  <a:pt x="23986" y="40158"/>
+                </a:lnTo>
+                <a:lnTo>
+                  <a:pt x="24959" y="40346"/>
+                </a:lnTo>
+                <a:lnTo>
+                  <a:pt x="25951" y="40480"/>
+                </a:lnTo>
+                <a:lnTo>
+                  <a:pt x="26942" y="40533"/>
+                </a:lnTo>
+                <a:lnTo>
+                  <a:pt x="27933" y="40533"/>
+                </a:lnTo>
+                <a:lnTo>
+                  <a:pt x="28915" y="40462"/>
+                </a:lnTo>
+                <a:lnTo>
+                  <a:pt x="29907" y="40328"/>
+                </a:lnTo>
+                <a:lnTo>
+                  <a:pt x="30880" y="40132"/>
+                </a:lnTo>
+                <a:lnTo>
+                  <a:pt x="31844" y="39864"/>
+                </a:lnTo>
+                <a:lnTo>
+                  <a:pt x="32791" y="39542"/>
+                </a:lnTo>
+                <a:lnTo>
+                  <a:pt x="33720" y="39140"/>
+                </a:lnTo>
+                <a:lnTo>
+                  <a:pt x="34630" y="38685"/>
+                </a:lnTo>
+                <a:lnTo>
+                  <a:pt x="35077" y="38426"/>
+                </a:lnTo>
+                <a:lnTo>
+                  <a:pt x="54134" y="27139"/>
+                </a:lnTo>
+                <a:lnTo>
+                  <a:pt x="26995" y="0"/>
+                </a:lnTo>
+                <a:close/>
+              </a:path>
+            </a:pathLst>
+          </a:custGeom>
+          <a:gradFill>
+            <a:gsLst>
+              <a:gs pos="0">
+                <a:srgbClr val="FFFFFF">
+                  <a:alpha val="35686"/>
+                </a:srgbClr>
+              </a:gs>
+              <a:gs pos="100000">
+                <a:srgbClr val="FFFFFF">
+                  <a:alpha val="0"/>
+                </a:srgbClr>
+              </a:gs>
+            </a:gsLst>
+            <a:lin ang="10800025" scaled="0"/>
+          </a:gradFill>
+          <a:ln>
+            <a:noFill/>
+          </a:ln>
+        </p:spPr>
+        <p:txBody>
+          <a:bodyPr spcFirstLastPara="1" wrap="square" lIns="91425" tIns="91425" rIns="91425" bIns="91425" anchor="ctr" anchorCtr="0">
+            <a:noAutofit/>
+          </a:bodyPr>
+          <a:lstStyle/>
+          <a:p>
+            <a:pPr marL="0" lvl="0" indent="0" algn="l" rtl="0">
+              <a:spcBef>
+                <a:spcPts val="0"/>
+              </a:spcBef>
+              <a:spcAft>
+                <a:spcPts val="0"/>
+              </a:spcAft>
+              <a:buNone/>
+            </a:pPr>
+            <a:endParaRPr>
+              <a:latin typeface="Montserrat" panose="00000500000000000000" pitchFamily="2" charset="-52"/>
+            </a:endParaRPr>
+          </a:p>
+        </p:txBody>
+      </p:sp>
+      <p:sp>
+        <p:nvSpPr>
+          <p:cNvPr id="5" name="Rectangle 4">
+            <a:extLst>
+              <a:ext uri="{FF2B5EF4-FFF2-40B4-BE49-F238E27FC236}">
+                <a16:creationId xmlns:a16="http://schemas.microsoft.com/office/drawing/2014/main" id="{448903AB-7ED8-4410-BB26-9FBD7AB6DF9F}"/>
+              </a:ext>
+            </a:extLst>
+          </p:cNvPr>
+          <p:cNvSpPr/>
+          <p:nvPr/>
+        </p:nvSpPr>
+        <p:spPr>
+          <a:xfrm>
+            <a:off x="586150" y="1692823"/>
+            <a:ext cx="4598852" cy="1991379"/>
+          </a:xfrm>
+          <a:prstGeom prst="rect">
+            <a:avLst/>
+          </a:prstGeom>
+        </p:spPr>
+        <p:txBody>
+          <a:bodyPr wrap="square">
+            <a:spAutoFit/>
+          </a:bodyPr>
+          <a:lstStyle/>
+          <a:p>
+            <a:pPr marL="285750" indent="-285750">
+              <a:lnSpc>
+                <a:spcPct val="150000"/>
+              </a:lnSpc>
+              <a:buFont typeface="Arial" panose="020B0604020202020204" pitchFamily="34" charset="0"/>
+              <a:buChar char="•"/>
+            </a:pPr>
+            <a:r>
+              <a:rPr lang="ru-RU" dirty="0">
+                <a:latin typeface="Montserrat" panose="020B0604020202020204" charset="0"/>
+              </a:rPr>
+              <a:t>Повишена нужда от управление на личните финанси;</a:t>
+            </a:r>
+          </a:p>
+          <a:p>
+            <a:pPr marL="285750" indent="-285750">
+              <a:lnSpc>
+                <a:spcPct val="150000"/>
+              </a:lnSpc>
+              <a:buFont typeface="Arial" panose="020B0604020202020204" pitchFamily="34" charset="0"/>
+              <a:buChar char="•"/>
+            </a:pPr>
+            <a:r>
+              <a:rPr lang="ru-RU" dirty="0">
+                <a:latin typeface="Montserrat" panose="020B0604020202020204" charset="0"/>
+              </a:rPr>
+              <a:t>Все повече хора търсят дигитални инструменти за следене на разходи;</a:t>
+            </a:r>
+          </a:p>
+          <a:p>
+            <a:pPr marL="285750" indent="-285750">
+              <a:lnSpc>
+                <a:spcPct val="150000"/>
+              </a:lnSpc>
+              <a:buFont typeface="Arial" panose="020B0604020202020204" pitchFamily="34" charset="0"/>
+              <a:buChar char="•"/>
+            </a:pPr>
+            <a:r>
+              <a:rPr lang="ru-RU" dirty="0">
+                <a:latin typeface="Montserrat" panose="020B0604020202020204" charset="0"/>
+              </a:rPr>
+              <a:t>Финансовата култура на младите хора все още е слаба.</a:t>
+            </a:r>
+            <a:endParaRPr lang="en-US" dirty="0">
+              <a:latin typeface="Montserrat" panose="020B0604020202020204" charset="0"/>
+            </a:endParaRPr>
+          </a:p>
+        </p:txBody>
+      </p:sp>
+      <p:pic>
+        <p:nvPicPr>
+          <p:cNvPr id="6" name="Picture 5">
+            <a:extLst>
+              <a:ext uri="{FF2B5EF4-FFF2-40B4-BE49-F238E27FC236}">
+                <a16:creationId xmlns:a16="http://schemas.microsoft.com/office/drawing/2014/main" id="{D68F8087-71D1-4D41-8312-65282E508713}"/>
+              </a:ext>
+            </a:extLst>
+          </p:cNvPr>
+          <p:cNvPicPr>
+            <a:picLocks noChangeAspect="1"/>
+          </p:cNvPicPr>
+          <p:nvPr/>
+        </p:nvPicPr>
+        <p:blipFill rotWithShape="1">
+          <a:blip r:embed="rId3"/>
+          <a:srcRect b="9630"/>
+          <a:stretch/>
+        </p:blipFill>
+        <p:spPr>
+          <a:xfrm>
+            <a:off x="5286053" y="1138643"/>
+            <a:ext cx="3539276" cy="2979469"/>
+          </a:xfrm>
+          <a:prstGeom prst="rect">
+            <a:avLst/>
+          </a:prstGeom>
+        </p:spPr>
+      </p:pic>
+    </p:spTree>
+    <p:extLst>
+      <p:ext uri="{BB962C8B-B14F-4D97-AF65-F5344CB8AC3E}">
+        <p14:creationId xmlns:p14="http://schemas.microsoft.com/office/powerpoint/2010/main" val="3946437966"/>
+      </p:ext>
+    </p:extLst>
+  </p:cSld>
+  <p:clrMapOvr>
+    <a:masterClrMapping/>
+  </p:clrMapOvr>
+</p:sld>
+</file>
+
+<file path=ppt/slides/slide5.xml><?xml version="1.0" encoding="utf-8"?>
+<p:sld xmlns:a="http://schemas.openxmlformats.org/drawingml/2006/main" xmlns:r="http://schemas.openxmlformats.org/officeDocument/2006/relationships" xmlns:p="http://schemas.openxmlformats.org/presentationml/2006/main">
+  <p:cSld>
+    <p:spTree>
+      <p:nvGrpSpPr>
+        <p:cNvPr id="1" name=""/>
+        <p:cNvGrpSpPr/>
+        <p:nvPr/>
+      </p:nvGrpSpPr>
+      <p:grpSpPr>
+        <a:xfrm>
+          <a:off x="0" y="0"/>
+          <a:ext cx="0" cy="0"/>
+          <a:chOff x="0" y="0"/>
+          <a:chExt cx="0" cy="0"/>
+        </a:xfrm>
+      </p:grpSpPr>
+      <p:sp>
+        <p:nvSpPr>
+          <p:cNvPr id="4" name="Rectangle 1"/>
+          <p:cNvSpPr>
+            <a:spLocks noGrp="1" noChangeArrowheads="1"/>
+          </p:cNvSpPr>
+          <p:nvPr>
+            <p:ph type="title"/>
+          </p:nvPr>
+        </p:nvSpPr>
+        <p:spPr bwMode="auto">
+          <a:xfrm>
+            <a:off x="2404497" y="445568"/>
+            <a:ext cx="4357283" cy="584775"/>
+          </a:xfrm>
+          <a:prstGeom prst="rect">
+            <a:avLst/>
+          </a:prstGeom>
+          <a:noFill/>
+          <a:ln>
+            <a:noFill/>
+          </a:ln>
+          <a:effectLst/>
+          <a:extLst>
+            <a:ext uri="{909E8E84-426E-40DD-AFC4-6F175D3DCCD1}">
+              <a14:hiddenFill xmlns:a14="http://schemas.microsoft.com/office/drawing/2010/main">
+                <a:solidFill>
+                  <a:schemeClr val="accent1"/>
+                </a:solidFill>
+              </a14:hiddenFill>
+            </a:ext>
+            <a:ext uri="{91240B29-F687-4F45-9708-019B960494DF}">
+              <a14:hiddenLine xmlns:a14="http://schemas.microsoft.com/office/drawing/2010/main" w="9525">
+                <a:solidFill>
+                  <a:schemeClr val="tx1"/>
+                </a:solidFill>
+                <a:miter lim="800000"/>
+                <a:headEnd/>
+                <a:tailEnd/>
+              </a14:hiddenLine>
+            </a:ext>
+            <a:ext uri="{AF507438-7753-43E0-B8FC-AC1667EBCBE1}">
+              <a14:hiddenEffects xmlns:a14="http://schemas.microsoft.com/office/drawing/2010/main">
+                <a:effectLst>
+                  <a:outerShdw dist="35921" dir="2700000" algn="ctr" rotWithShape="0">
+                    <a:schemeClr val="bg2"/>
+                  </a:outerShdw>
+                </a:effectLst>
+              </a14:hiddenEffects>
+            </a:ext>
+          </a:extLst>
+        </p:spPr>
+        <p:txBody>
+          <a:bodyPr vert="horz" wrap="none" lIns="91440" tIns="45720" rIns="91440" bIns="45720" numCol="1" anchor="ctr" anchorCtr="0" compatLnSpc="1">
+            <a:prstTxWarp prst="textNoShape">
+              <a:avLst/>
+            </a:prstTxWarp>
+            <a:spAutoFit/>
+          </a:bodyPr>
+          <a:lstStyle/>
+          <a:p>
+            <a:pPr marL="0" marR="0" lvl="0" indent="0" algn="ctr" defTabSz="914400" rtl="0" eaLnBrk="0" fontAlgn="base" latinLnBrk="0" hangingPunct="0">
+              <a:lnSpc>
+                <a:spcPct val="100000"/>
+              </a:lnSpc>
+              <a:spcBef>
+                <a:spcPct val="0"/>
+              </a:spcBef>
+              <a:spcAft>
+                <a:spcPct val="0"/>
+              </a:spcAft>
+              <a:buClrTx/>
+              <a:buSzTx/>
+              <a:buFontTx/>
+              <a:buNone/>
+              <a:tabLst/>
+            </a:pPr>
+            <a:r>
+              <a:rPr kumimoji="0" lang="bg-BG" altLang="en-US" sz="3200" b="1" i="0" u="none" strike="noStrike" cap="none" normalizeH="0" baseline="0" dirty="0">
+                <a:ln>
+                  <a:noFill/>
+                </a:ln>
+                <a:solidFill>
+                  <a:schemeClr val="tx1"/>
+                </a:solidFill>
+                <a:effectLst/>
+                <a:latin typeface="Montserrat" panose="00000500000000000000" pitchFamily="2" charset="-52"/>
+              </a:rPr>
+              <a:t>Подобни решения</a:t>
+            </a:r>
+            <a:endParaRPr kumimoji="0" lang="bg-BG" altLang="en-US" sz="6000" b="1" i="0" u="none" strike="noStrike" cap="none" normalizeH="0" baseline="0" dirty="0">
+              <a:ln>
+                <a:noFill/>
+              </a:ln>
+              <a:solidFill>
+                <a:schemeClr val="tx1"/>
+              </a:solidFill>
+              <a:effectLst/>
+              <a:latin typeface="Montserrat" panose="00000500000000000000" pitchFamily="2" charset="-52"/>
+            </a:endParaRPr>
+          </a:p>
+        </p:txBody>
+      </p:sp>
+      <p:pic>
+        <p:nvPicPr>
+          <p:cNvPr id="7" name="Picture 6">
+            <a:extLst>
+              <a:ext uri="{FF2B5EF4-FFF2-40B4-BE49-F238E27FC236}">
+                <a16:creationId xmlns:a16="http://schemas.microsoft.com/office/drawing/2014/main" id="{F529BB0D-DB70-418F-A844-582B9C4598AA}"/>
+              </a:ext>
+            </a:extLst>
+          </p:cNvPr>
+          <p:cNvPicPr>
+            <a:picLocks noChangeAspect="1"/>
+          </p:cNvPicPr>
+          <p:nvPr/>
+        </p:nvPicPr>
+        <p:blipFill>
+          <a:blip r:embed="rId3"/>
+          <a:stretch>
+            <a:fillRect/>
+          </a:stretch>
+        </p:blipFill>
+        <p:spPr>
+          <a:xfrm>
+            <a:off x="644660" y="2066423"/>
+            <a:ext cx="1737560" cy="1737560"/>
+          </a:xfrm>
+          <a:prstGeom prst="rect">
+            <a:avLst/>
+          </a:prstGeom>
+        </p:spPr>
+      </p:pic>
+      <p:pic>
+        <p:nvPicPr>
+          <p:cNvPr id="8" name="Picture 7">
+            <a:extLst>
+              <a:ext uri="{FF2B5EF4-FFF2-40B4-BE49-F238E27FC236}">
+                <a16:creationId xmlns:a16="http://schemas.microsoft.com/office/drawing/2014/main" id="{22F2263F-7BE3-4A48-92FC-85F96E14ED6C}"/>
+              </a:ext>
+            </a:extLst>
+          </p:cNvPr>
+          <p:cNvPicPr>
+            <a:picLocks noChangeAspect="1"/>
+          </p:cNvPicPr>
+          <p:nvPr/>
+        </p:nvPicPr>
+        <p:blipFill>
+          <a:blip r:embed="rId4"/>
+          <a:stretch>
+            <a:fillRect/>
+          </a:stretch>
+        </p:blipFill>
+        <p:spPr>
+          <a:xfrm>
+            <a:off x="3026400" y="2065183"/>
+            <a:ext cx="3091199" cy="1738800"/>
+          </a:xfrm>
+          <a:prstGeom prst="rect">
+            <a:avLst/>
+          </a:prstGeom>
+        </p:spPr>
+      </p:pic>
+      <p:pic>
+        <p:nvPicPr>
+          <p:cNvPr id="10" name="Picture 9">
+            <a:extLst>
+              <a:ext uri="{FF2B5EF4-FFF2-40B4-BE49-F238E27FC236}">
+                <a16:creationId xmlns:a16="http://schemas.microsoft.com/office/drawing/2014/main" id="{14977B92-CA5C-4CCB-BFFF-89745F8DA102}"/>
+              </a:ext>
+            </a:extLst>
+          </p:cNvPr>
+          <p:cNvPicPr>
+            <a:picLocks noChangeAspect="1"/>
+          </p:cNvPicPr>
+          <p:nvPr/>
+        </p:nvPicPr>
+        <p:blipFill>
+          <a:blip r:embed="rId5"/>
+          <a:stretch>
+            <a:fillRect/>
+          </a:stretch>
+        </p:blipFill>
+        <p:spPr>
+          <a:xfrm>
+            <a:off x="6761780" y="2081963"/>
+            <a:ext cx="1737560" cy="1737560"/>
+          </a:xfrm>
+          <a:prstGeom prst="rect">
+            <a:avLst/>
+          </a:prstGeom>
+        </p:spPr>
+      </p:pic>
+    </p:spTree>
+    <p:extLst>
+      <p:ext uri="{BB962C8B-B14F-4D97-AF65-F5344CB8AC3E}">
+        <p14:creationId xmlns:p14="http://schemas.microsoft.com/office/powerpoint/2010/main" val="4265776532"/>
+      </p:ext>
+    </p:extLst>
+  </p:cSld>
+  <p:clrMapOvr>
+    <a:masterClrMapping/>
+  </p:clrMapOvr>
+</p:sld>
+</file>
+
+<file path=ppt/slides/slide6.xml><?xml version="1.0" encoding="utf-8"?>
 <p:sld xmlns:a="http://schemas.openxmlformats.org/drawingml/2006/main" xmlns:r="http://schemas.openxmlformats.org/officeDocument/2006/relationships" xmlns:p="http://schemas.openxmlformats.org/presentationml/2006/main">
   <p:cSld>
     <p:spTree>
@@ -14317,7 +15018,7 @@
               <a:tabLst/>
             </a:pPr>
             <a:r>
-              <a:rPr kumimoji="0" lang="bg-BG" altLang="en-US" sz="3200" b="1" i="0" u="none" strike="noStrike" cap="none" normalizeH="0" baseline="0" dirty="0" smtClean="0">
+              <a:rPr kumimoji="0" lang="bg-BG" altLang="en-US" sz="3200" b="1" i="0" u="none" strike="noStrike" cap="none" normalizeH="0" baseline="0" dirty="0">
                 <a:ln>
                   <a:noFill/>
                 </a:ln>
@@ -14330,7 +15031,7 @@
               <a:t>Технически</a:t>
             </a:r>
             <a:r>
-              <a:rPr kumimoji="0" lang="bg-BG" altLang="en-US" sz="3200" b="1" i="0" u="none" strike="noStrike" cap="none" normalizeH="0" dirty="0" smtClean="0">
+              <a:rPr kumimoji="0" lang="bg-BG" altLang="en-US" sz="3200" b="1" i="0" u="none" strike="noStrike" cap="none" normalizeH="0" dirty="0">
                 <a:ln>
                   <a:noFill/>
                 </a:ln>
@@ -14342,7 +15043,7 @@
               </a:rPr>
               <a:t> набор</a:t>
             </a:r>
-            <a:endParaRPr kumimoji="0" lang="bg-BG" altLang="en-US" sz="6000" b="1" i="0" u="none" strike="noStrike" cap="none" normalizeH="0" baseline="0" dirty="0" smtClean="0">
+            <a:endParaRPr kumimoji="0" lang="bg-BG" altLang="en-US" sz="6000" b="1" i="0" u="none" strike="noStrike" cap="none" normalizeH="0" baseline="0" dirty="0">
               <a:ln>
                 <a:noFill/>
               </a:ln>
@@ -14538,24 +15239,17 @@
     </p:spTree>
     <p:extLst>
       <p:ext uri="{BB962C8B-B14F-4D97-AF65-F5344CB8AC3E}">
-        <p14:creationId xmlns:p14="http://schemas.microsoft.com/office/powerpoint/2010/main" val="4265776532"/>
+        <p14:creationId xmlns:p14="http://schemas.microsoft.com/office/powerpoint/2010/main" val="2232140752"/>
       </p:ext>
     </p:extLst>
   </p:cSld>
   <p:clrMapOvr>
     <a:masterClrMapping/>
   </p:clrMapOvr>
-  <p:timing>
-    <p:tnLst>
-      <p:par>
-        <p:cTn id="1" dur="indefinite" restart="never" nodeType="tmRoot"/>
-      </p:par>
-    </p:tnLst>
-  </p:timing>
 </p:sld>
 </file>
 
-<file path=ppt/slides/slide5.xml><?xml version="1.0" encoding="utf-8"?>
+<file path=ppt/slides/slide7.xml><?xml version="1.0" encoding="utf-8"?>
 <p:sld xmlns:a="http://schemas.openxmlformats.org/drawingml/2006/main" xmlns:r="http://schemas.openxmlformats.org/officeDocument/2006/relationships" xmlns:p="http://schemas.openxmlformats.org/presentationml/2006/main">
   <p:cSld>
     <p:spTree>
@@ -14613,17 +15307,10 @@
   <p:clrMapOvr>
     <a:masterClrMapping/>
   </p:clrMapOvr>
-  <p:timing>
-    <p:tnLst>
-      <p:par>
-        <p:cTn id="1" dur="indefinite" restart="never" nodeType="tmRoot"/>
-      </p:par>
-    </p:tnLst>
-  </p:timing>
 </p:sld>
 </file>
 
-<file path=ppt/slides/slide6.xml><?xml version="1.0" encoding="utf-8"?>
+<file path=ppt/slides/slide8.xml><?xml version="1.0" encoding="utf-8"?>
 <p:sld xmlns:a="http://schemas.openxmlformats.org/drawingml/2006/main" xmlns:r="http://schemas.openxmlformats.org/officeDocument/2006/relationships" xmlns:p="http://schemas.openxmlformats.org/presentationml/2006/main">
   <p:cSld>
     <p:spTree>
@@ -14661,7 +15348,7 @@
           <a:lstStyle/>
           <a:p>
             <a:r>
-              <a:rPr lang="bg-BG" b="1" dirty="0" smtClean="0">
+              <a:rPr lang="bg-BG" b="1" dirty="0">
                 <a:latin typeface="Montserrat" panose="00000500000000000000" pitchFamily="2" charset="-52"/>
               </a:rPr>
               <a:t>Благодаря за вниманието</a:t>
@@ -14682,13 +15369,6 @@
   <p:clrMapOvr>
     <a:masterClrMapping/>
   </p:clrMapOvr>
-  <p:timing>
-    <p:tnLst>
-      <p:par>
-        <p:cTn id="1" dur="indefinite" restart="never" nodeType="tmRoot"/>
-      </p:par>
-    </p:tnLst>
-  </p:timing>
 </p:sld>
 </file>
 

</xml_diff>